<commit_message>
Full file set WIP
</commit_message>
<xml_diff>
--- a/Rlearning/RL_ICSE.pptx
+++ b/Rlearning/RL_ICSE.pptx
@@ -4,12 +4,20 @@
   <p:sldMasterIdLst>
     <p:sldMasterId id="2147483648" r:id="rId1"/>
   </p:sldMasterIdLst>
+  <p:notesMasterIdLst>
+    <p:notesMasterId r:id="rId12"/>
+  </p:notesMasterIdLst>
   <p:sldIdLst>
     <p:sldId id="256" r:id="rId2"/>
     <p:sldId id="260" r:id="rId3"/>
     <p:sldId id="257" r:id="rId4"/>
     <p:sldId id="258" r:id="rId5"/>
-    <p:sldId id="259" r:id="rId6"/>
+    <p:sldId id="261" r:id="rId6"/>
+    <p:sldId id="259" r:id="rId7"/>
+    <p:sldId id="1818" r:id="rId8"/>
+    <p:sldId id="1527" r:id="rId9"/>
+    <p:sldId id="1532" r:id="rId10"/>
+    <p:sldId id="294" r:id="rId11"/>
   </p:sldIdLst>
   <p:sldSz cx="12192000" cy="6858000"/>
   <p:notesSz cx="6858000" cy="9144000"/>
@@ -108,6 +116,11 @@
       </a:defRPr>
     </a:lvl9pPr>
   </p:defaultTextStyle>
+  <p:extLst>
+    <p:ext uri="{EFAFB233-063F-42B5-8137-9DF3F51BA10A}">
+      <p15:sldGuideLst xmlns:p15="http://schemas.microsoft.com/office/powerpoint/2012/main"/>
+    </p:ext>
+  </p:extLst>
 </p:presentation>
 </file>
 
@@ -608,6 +621,981 @@
 </pc:chgInfo>
 </file>
 
+<file path=ppt/notesMasters/notesMaster1.xml><?xml version="1.0" encoding="utf-8"?>
+<p:notesMaster xmlns:a="http://schemas.openxmlformats.org/drawingml/2006/main" xmlns:r="http://schemas.openxmlformats.org/officeDocument/2006/relationships" xmlns:p="http://schemas.openxmlformats.org/presentationml/2006/main">
+  <p:cSld>
+    <p:bg>
+      <p:bgRef idx="1001">
+        <a:schemeClr val="bg1"/>
+      </p:bgRef>
+    </p:bg>
+    <p:spTree>
+      <p:nvGrpSpPr>
+        <p:cNvPr id="1" name=""/>
+        <p:cNvGrpSpPr/>
+        <p:nvPr/>
+      </p:nvGrpSpPr>
+      <p:grpSpPr>
+        <a:xfrm>
+          <a:off x="0" y="0"/>
+          <a:ext cx="0" cy="0"/>
+          <a:chOff x="0" y="0"/>
+          <a:chExt cx="0" cy="0"/>
+        </a:xfrm>
+      </p:grpSpPr>
+      <p:sp>
+        <p:nvSpPr>
+          <p:cNvPr id="2" name="Header Placeholder 1"/>
+          <p:cNvSpPr>
+            <a:spLocks noGrp="1"/>
+          </p:cNvSpPr>
+          <p:nvPr>
+            <p:ph type="hdr" sz="quarter"/>
+          </p:nvPr>
+        </p:nvSpPr>
+        <p:spPr>
+          <a:xfrm>
+            <a:off x="0" y="0"/>
+            <a:ext cx="2971800" cy="458788"/>
+          </a:xfrm>
+          <a:prstGeom prst="rect">
+            <a:avLst/>
+          </a:prstGeom>
+        </p:spPr>
+        <p:txBody>
+          <a:bodyPr vert="horz" lIns="91440" tIns="45720" rIns="91440" bIns="45720" rtlCol="0"/>
+          <a:lstStyle>
+            <a:lvl1pPr algn="l">
+              <a:defRPr sz="1200"/>
+            </a:lvl1pPr>
+          </a:lstStyle>
+          <a:p>
+            <a:endParaRPr lang="en-US"/>
+          </a:p>
+        </p:txBody>
+      </p:sp>
+      <p:sp>
+        <p:nvSpPr>
+          <p:cNvPr id="3" name="Date Placeholder 2"/>
+          <p:cNvSpPr>
+            <a:spLocks noGrp="1"/>
+          </p:cNvSpPr>
+          <p:nvPr>
+            <p:ph type="dt" idx="1"/>
+          </p:nvPr>
+        </p:nvSpPr>
+        <p:spPr>
+          <a:xfrm>
+            <a:off x="3884613" y="0"/>
+            <a:ext cx="2971800" cy="458788"/>
+          </a:xfrm>
+          <a:prstGeom prst="rect">
+            <a:avLst/>
+          </a:prstGeom>
+        </p:spPr>
+        <p:txBody>
+          <a:bodyPr vert="horz" lIns="91440" tIns="45720" rIns="91440" bIns="45720" rtlCol="0"/>
+          <a:lstStyle>
+            <a:lvl1pPr algn="r">
+              <a:defRPr sz="1200"/>
+            </a:lvl1pPr>
+          </a:lstStyle>
+          <a:p>
+            <a:fld id="{D9DB8AE1-6326-4480-B3DC-D996E7F03AAE}" type="datetimeFigureOut">
+              <a:rPr lang="en-US" smtClean="0"/>
+              <a:t>5/24/2019</a:t>
+            </a:fld>
+            <a:endParaRPr lang="en-US"/>
+          </a:p>
+        </p:txBody>
+      </p:sp>
+      <p:sp>
+        <p:nvSpPr>
+          <p:cNvPr id="4" name="Slide Image Placeholder 3"/>
+          <p:cNvSpPr>
+            <a:spLocks noGrp="1" noRot="1" noChangeAspect="1"/>
+          </p:cNvSpPr>
+          <p:nvPr>
+            <p:ph type="sldImg" idx="2"/>
+          </p:nvPr>
+        </p:nvSpPr>
+        <p:spPr>
+          <a:xfrm>
+            <a:off x="685800" y="1143000"/>
+            <a:ext cx="5486400" cy="3086100"/>
+          </a:xfrm>
+          <a:prstGeom prst="rect">
+            <a:avLst/>
+          </a:prstGeom>
+          <a:noFill/>
+          <a:ln w="12700">
+            <a:solidFill>
+              <a:prstClr val="black"/>
+            </a:solidFill>
+          </a:ln>
+        </p:spPr>
+        <p:txBody>
+          <a:bodyPr vert="horz" lIns="91440" tIns="45720" rIns="91440" bIns="45720" rtlCol="0" anchor="ctr"/>
+          <a:lstStyle/>
+          <a:p>
+            <a:endParaRPr lang="en-US"/>
+          </a:p>
+        </p:txBody>
+      </p:sp>
+      <p:sp>
+        <p:nvSpPr>
+          <p:cNvPr id="5" name="Notes Placeholder 4"/>
+          <p:cNvSpPr>
+            <a:spLocks noGrp="1"/>
+          </p:cNvSpPr>
+          <p:nvPr>
+            <p:ph type="body" sz="quarter" idx="3"/>
+          </p:nvPr>
+        </p:nvSpPr>
+        <p:spPr>
+          <a:xfrm>
+            <a:off x="685800" y="4400550"/>
+            <a:ext cx="5486400" cy="3600450"/>
+          </a:xfrm>
+          <a:prstGeom prst="rect">
+            <a:avLst/>
+          </a:prstGeom>
+        </p:spPr>
+        <p:txBody>
+          <a:bodyPr vert="horz" lIns="91440" tIns="45720" rIns="91440" bIns="45720" rtlCol="0"/>
+          <a:lstStyle/>
+          <a:p>
+            <a:pPr lvl="0"/>
+            <a:r>
+              <a:rPr lang="en-US"/>
+              <a:t>Click to edit Master text styles</a:t>
+            </a:r>
+          </a:p>
+          <a:p>
+            <a:pPr lvl="1"/>
+            <a:r>
+              <a:rPr lang="en-US"/>
+              <a:t>Second level</a:t>
+            </a:r>
+          </a:p>
+          <a:p>
+            <a:pPr lvl="2"/>
+            <a:r>
+              <a:rPr lang="en-US"/>
+              <a:t>Third level</a:t>
+            </a:r>
+          </a:p>
+          <a:p>
+            <a:pPr lvl="3"/>
+            <a:r>
+              <a:rPr lang="en-US"/>
+              <a:t>Fourth level</a:t>
+            </a:r>
+          </a:p>
+          <a:p>
+            <a:pPr lvl="4"/>
+            <a:r>
+              <a:rPr lang="en-US"/>
+              <a:t>Fifth level</a:t>
+            </a:r>
+          </a:p>
+        </p:txBody>
+      </p:sp>
+      <p:sp>
+        <p:nvSpPr>
+          <p:cNvPr id="6" name="Footer Placeholder 5"/>
+          <p:cNvSpPr>
+            <a:spLocks noGrp="1"/>
+          </p:cNvSpPr>
+          <p:nvPr>
+            <p:ph type="ftr" sz="quarter" idx="4"/>
+          </p:nvPr>
+        </p:nvSpPr>
+        <p:spPr>
+          <a:xfrm>
+            <a:off x="0" y="8685213"/>
+            <a:ext cx="2971800" cy="458787"/>
+          </a:xfrm>
+          <a:prstGeom prst="rect">
+            <a:avLst/>
+          </a:prstGeom>
+        </p:spPr>
+        <p:txBody>
+          <a:bodyPr vert="horz" lIns="91440" tIns="45720" rIns="91440" bIns="45720" rtlCol="0" anchor="b"/>
+          <a:lstStyle>
+            <a:lvl1pPr algn="l">
+              <a:defRPr sz="1200"/>
+            </a:lvl1pPr>
+          </a:lstStyle>
+          <a:p>
+            <a:endParaRPr lang="en-US"/>
+          </a:p>
+        </p:txBody>
+      </p:sp>
+      <p:sp>
+        <p:nvSpPr>
+          <p:cNvPr id="7" name="Slide Number Placeholder 6"/>
+          <p:cNvSpPr>
+            <a:spLocks noGrp="1"/>
+          </p:cNvSpPr>
+          <p:nvPr>
+            <p:ph type="sldNum" sz="quarter" idx="5"/>
+          </p:nvPr>
+        </p:nvSpPr>
+        <p:spPr>
+          <a:xfrm>
+            <a:off x="3884613" y="8685213"/>
+            <a:ext cx="2971800" cy="458787"/>
+          </a:xfrm>
+          <a:prstGeom prst="rect">
+            <a:avLst/>
+          </a:prstGeom>
+        </p:spPr>
+        <p:txBody>
+          <a:bodyPr vert="horz" lIns="91440" tIns="45720" rIns="91440" bIns="45720" rtlCol="0" anchor="b"/>
+          <a:lstStyle>
+            <a:lvl1pPr algn="r">
+              <a:defRPr sz="1200"/>
+            </a:lvl1pPr>
+          </a:lstStyle>
+          <a:p>
+            <a:fld id="{71423B44-2615-4523-B5E8-651F67C02481}" type="slidenum">
+              <a:rPr lang="en-US" smtClean="0"/>
+              <a:t>‹#›</a:t>
+            </a:fld>
+            <a:endParaRPr lang="en-US"/>
+          </a:p>
+        </p:txBody>
+      </p:sp>
+    </p:spTree>
+    <p:extLst>
+      <p:ext uri="{BB962C8B-B14F-4D97-AF65-F5344CB8AC3E}">
+        <p14:creationId xmlns:p14="http://schemas.microsoft.com/office/powerpoint/2010/main" val="315416002"/>
+      </p:ext>
+    </p:extLst>
+  </p:cSld>
+  <p:clrMap bg1="lt1" tx1="dk1" bg2="lt2" tx2="dk2" accent1="accent1" accent2="accent2" accent3="accent3" accent4="accent4" accent5="accent5" accent6="accent6" hlink="hlink" folHlink="folHlink"/>
+  <p:notesStyle>
+    <a:lvl1pPr marL="0" algn="l" defTabSz="914400" rtl="0" eaLnBrk="1" latinLnBrk="0" hangingPunct="1">
+      <a:defRPr sz="1200" kern="1200">
+        <a:solidFill>
+          <a:schemeClr val="tx1"/>
+        </a:solidFill>
+        <a:latin typeface="+mn-lt"/>
+        <a:ea typeface="+mn-ea"/>
+        <a:cs typeface="+mn-cs"/>
+      </a:defRPr>
+    </a:lvl1pPr>
+    <a:lvl2pPr marL="457200" algn="l" defTabSz="914400" rtl="0" eaLnBrk="1" latinLnBrk="0" hangingPunct="1">
+      <a:defRPr sz="1200" kern="1200">
+        <a:solidFill>
+          <a:schemeClr val="tx1"/>
+        </a:solidFill>
+        <a:latin typeface="+mn-lt"/>
+        <a:ea typeface="+mn-ea"/>
+        <a:cs typeface="+mn-cs"/>
+      </a:defRPr>
+    </a:lvl2pPr>
+    <a:lvl3pPr marL="914400" algn="l" defTabSz="914400" rtl="0" eaLnBrk="1" latinLnBrk="0" hangingPunct="1">
+      <a:defRPr sz="1200" kern="1200">
+        <a:solidFill>
+          <a:schemeClr val="tx1"/>
+        </a:solidFill>
+        <a:latin typeface="+mn-lt"/>
+        <a:ea typeface="+mn-ea"/>
+        <a:cs typeface="+mn-cs"/>
+      </a:defRPr>
+    </a:lvl3pPr>
+    <a:lvl4pPr marL="1371600" algn="l" defTabSz="914400" rtl="0" eaLnBrk="1" latinLnBrk="0" hangingPunct="1">
+      <a:defRPr sz="1200" kern="1200">
+        <a:solidFill>
+          <a:schemeClr val="tx1"/>
+        </a:solidFill>
+        <a:latin typeface="+mn-lt"/>
+        <a:ea typeface="+mn-ea"/>
+        <a:cs typeface="+mn-cs"/>
+      </a:defRPr>
+    </a:lvl4pPr>
+    <a:lvl5pPr marL="1828800" algn="l" defTabSz="914400" rtl="0" eaLnBrk="1" latinLnBrk="0" hangingPunct="1">
+      <a:defRPr sz="1200" kern="1200">
+        <a:solidFill>
+          <a:schemeClr val="tx1"/>
+        </a:solidFill>
+        <a:latin typeface="+mn-lt"/>
+        <a:ea typeface="+mn-ea"/>
+        <a:cs typeface="+mn-cs"/>
+      </a:defRPr>
+    </a:lvl5pPr>
+    <a:lvl6pPr marL="2286000" algn="l" defTabSz="914400" rtl="0" eaLnBrk="1" latinLnBrk="0" hangingPunct="1">
+      <a:defRPr sz="1200" kern="1200">
+        <a:solidFill>
+          <a:schemeClr val="tx1"/>
+        </a:solidFill>
+        <a:latin typeface="+mn-lt"/>
+        <a:ea typeface="+mn-ea"/>
+        <a:cs typeface="+mn-cs"/>
+      </a:defRPr>
+    </a:lvl6pPr>
+    <a:lvl7pPr marL="2743200" algn="l" defTabSz="914400" rtl="0" eaLnBrk="1" latinLnBrk="0" hangingPunct="1">
+      <a:defRPr sz="1200" kern="1200">
+        <a:solidFill>
+          <a:schemeClr val="tx1"/>
+        </a:solidFill>
+        <a:latin typeface="+mn-lt"/>
+        <a:ea typeface="+mn-ea"/>
+        <a:cs typeface="+mn-cs"/>
+      </a:defRPr>
+    </a:lvl7pPr>
+    <a:lvl8pPr marL="3200400" algn="l" defTabSz="914400" rtl="0" eaLnBrk="1" latinLnBrk="0" hangingPunct="1">
+      <a:defRPr sz="1200" kern="1200">
+        <a:solidFill>
+          <a:schemeClr val="tx1"/>
+        </a:solidFill>
+        <a:latin typeface="+mn-lt"/>
+        <a:ea typeface="+mn-ea"/>
+        <a:cs typeface="+mn-cs"/>
+      </a:defRPr>
+    </a:lvl8pPr>
+    <a:lvl9pPr marL="3657600" algn="l" defTabSz="914400" rtl="0" eaLnBrk="1" latinLnBrk="0" hangingPunct="1">
+      <a:defRPr sz="1200" kern="1200">
+        <a:solidFill>
+          <a:schemeClr val="tx1"/>
+        </a:solidFill>
+        <a:latin typeface="+mn-lt"/>
+        <a:ea typeface="+mn-ea"/>
+        <a:cs typeface="+mn-cs"/>
+      </a:defRPr>
+    </a:lvl9pPr>
+  </p:notesStyle>
+</p:notesMaster>
+</file>
+
+<file path=ppt/notesSlides/notesSlide1.xml><?xml version="1.0" encoding="utf-8"?>
+<p:notes xmlns:a="http://schemas.openxmlformats.org/drawingml/2006/main" xmlns:r="http://schemas.openxmlformats.org/officeDocument/2006/relationships" xmlns:p="http://schemas.openxmlformats.org/presentationml/2006/main">
+  <p:cSld>
+    <p:spTree>
+      <p:nvGrpSpPr>
+        <p:cNvPr id="1" name=""/>
+        <p:cNvGrpSpPr/>
+        <p:nvPr/>
+      </p:nvGrpSpPr>
+      <p:grpSpPr>
+        <a:xfrm>
+          <a:off x="0" y="0"/>
+          <a:ext cx="0" cy="0"/>
+          <a:chOff x="0" y="0"/>
+          <a:chExt cx="0" cy="0"/>
+        </a:xfrm>
+      </p:grpSpPr>
+      <p:sp>
+        <p:nvSpPr>
+          <p:cNvPr id="2" name="Slide Image Placeholder 1"/>
+          <p:cNvSpPr>
+            <a:spLocks noGrp="1" noRot="1" noChangeAspect="1"/>
+          </p:cNvSpPr>
+          <p:nvPr>
+            <p:ph type="sldImg"/>
+          </p:nvPr>
+        </p:nvSpPr>
+        <p:spPr/>
+      </p:sp>
+      <p:sp>
+        <p:nvSpPr>
+          <p:cNvPr id="3" name="Notes Placeholder 2"/>
+          <p:cNvSpPr>
+            <a:spLocks noGrp="1"/>
+          </p:cNvSpPr>
+          <p:nvPr>
+            <p:ph type="body" idx="1"/>
+          </p:nvPr>
+        </p:nvSpPr>
+        <p:spPr/>
+        <p:txBody>
+          <a:bodyPr/>
+          <a:lstStyle/>
+          <a:p>
+            <a:r>
+              <a:rPr lang="en-US" dirty="0"/>
+              <a:t>The “turtle’s eye view” of ROC curves is described here:</a:t>
+            </a:r>
+          </a:p>
+          <a:p>
+            <a:r>
+              <a:rPr lang="en-US" dirty="0"/>
+              <a:t>https://blog.revolutionanalytics.com/2016/08/roc-curves-in-two-lines-of-code.html</a:t>
+            </a:r>
+          </a:p>
+        </p:txBody>
+      </p:sp>
+      <p:sp>
+        <p:nvSpPr>
+          <p:cNvPr id="4" name="Header Placeholder 3"/>
+          <p:cNvSpPr>
+            <a:spLocks noGrp="1"/>
+          </p:cNvSpPr>
+          <p:nvPr>
+            <p:ph type="hdr" sz="quarter" idx="10"/>
+          </p:nvPr>
+        </p:nvSpPr>
+        <p:spPr/>
+        <p:txBody>
+          <a:bodyPr/>
+          <a:lstStyle/>
+          <a:p>
+            <a:endParaRPr lang="en-US" dirty="0"/>
+          </a:p>
+        </p:txBody>
+      </p:sp>
+      <p:sp>
+        <p:nvSpPr>
+          <p:cNvPr id="5" name="Footer Placeholder 4"/>
+          <p:cNvSpPr>
+            <a:spLocks noGrp="1"/>
+          </p:cNvSpPr>
+          <p:nvPr>
+            <p:ph type="ftr" sz="quarter" idx="11"/>
+          </p:nvPr>
+        </p:nvSpPr>
+        <p:spPr/>
+        <p:txBody>
+          <a:bodyPr/>
+          <a:lstStyle/>
+          <a:p>
+            <a:pPr defTabSz="914099" eaLnBrk="0" hangingPunct="0"/>
+            <a:r>
+              <a:rPr lang="en-US" sz="400" dirty="0">
+                <a:gradFill>
+                  <a:gsLst>
+                    <a:gs pos="0">
+                      <a:prstClr val="black"/>
+                    </a:gs>
+                    <a:gs pos="100000">
+                      <a:prstClr val="black"/>
+                    </a:gs>
+                  </a:gsLst>
+                  <a:lin ang="5400000" scaled="0"/>
+                </a:gradFill>
+                <a:latin typeface="Segoe UI" pitchFamily="34" charset="0"/>
+                <a:ea typeface="Segoe UI" pitchFamily="34" charset="0"/>
+                <a:cs typeface="Segoe UI" pitchFamily="34" charset="0"/>
+              </a:rPr>
+              <a:t>© Microsoft Corporation. All rights reserved. MICROSOFT MAKES NO WARRANTIES, EXPRESS, IMPLIED OR STATUTORY, AS TO THE INFORMATION IN THIS PRESENTATION.</a:t>
+            </a:r>
+          </a:p>
+        </p:txBody>
+      </p:sp>
+      <p:sp>
+        <p:nvSpPr>
+          <p:cNvPr id="6" name="Date Placeholder 5"/>
+          <p:cNvSpPr>
+            <a:spLocks noGrp="1"/>
+          </p:cNvSpPr>
+          <p:nvPr>
+            <p:ph type="dt" idx="12"/>
+          </p:nvPr>
+        </p:nvSpPr>
+        <p:spPr/>
+        <p:txBody>
+          <a:bodyPr/>
+          <a:lstStyle/>
+          <a:p>
+            <a:fld id="{9427A7F7-BB1E-479D-AFAA-B52F4D0C99F2}" type="datetime8">
+              <a:rPr lang="en-US" smtClean="0"/>
+              <a:t>5/24/2019 2:35 PM</a:t>
+            </a:fld>
+            <a:endParaRPr lang="en-US" dirty="0"/>
+          </a:p>
+        </p:txBody>
+      </p:sp>
+      <p:sp>
+        <p:nvSpPr>
+          <p:cNvPr id="7" name="Slide Number Placeholder 6"/>
+          <p:cNvSpPr>
+            <a:spLocks noGrp="1"/>
+          </p:cNvSpPr>
+          <p:nvPr>
+            <p:ph type="sldNum" sz="quarter" idx="13"/>
+          </p:nvPr>
+        </p:nvSpPr>
+        <p:spPr/>
+        <p:txBody>
+          <a:bodyPr/>
+          <a:lstStyle/>
+          <a:p>
+            <a:fld id="{B4008EB6-D09E-4580-8CD6-DDB14511944F}" type="slidenum">
+              <a:rPr lang="en-US" smtClean="0"/>
+              <a:pPr/>
+              <a:t>7</a:t>
+            </a:fld>
+            <a:endParaRPr lang="en-US" dirty="0"/>
+          </a:p>
+        </p:txBody>
+      </p:sp>
+    </p:spTree>
+    <p:extLst>
+      <p:ext uri="{BB962C8B-B14F-4D97-AF65-F5344CB8AC3E}">
+        <p14:creationId xmlns:p14="http://schemas.microsoft.com/office/powerpoint/2010/main" val="1116266893"/>
+      </p:ext>
+    </p:extLst>
+  </p:cSld>
+  <p:clrMapOvr>
+    <a:masterClrMapping/>
+  </p:clrMapOvr>
+</p:notes>
+</file>
+
+<file path=ppt/notesSlides/notesSlide2.xml><?xml version="1.0" encoding="utf-8"?>
+<p:notes xmlns:a="http://schemas.openxmlformats.org/drawingml/2006/main" xmlns:r="http://schemas.openxmlformats.org/officeDocument/2006/relationships" xmlns:p="http://schemas.openxmlformats.org/presentationml/2006/main">
+  <p:cSld>
+    <p:spTree>
+      <p:nvGrpSpPr>
+        <p:cNvPr id="1" name=""/>
+        <p:cNvGrpSpPr/>
+        <p:nvPr/>
+      </p:nvGrpSpPr>
+      <p:grpSpPr>
+        <a:xfrm>
+          <a:off x="0" y="0"/>
+          <a:ext cx="0" cy="0"/>
+          <a:chOff x="0" y="0"/>
+          <a:chExt cx="0" cy="0"/>
+        </a:xfrm>
+      </p:grpSpPr>
+      <p:sp>
+        <p:nvSpPr>
+          <p:cNvPr id="2" name="Slide Image Placeholder 1"/>
+          <p:cNvSpPr>
+            <a:spLocks noGrp="1" noRot="1" noChangeAspect="1"/>
+          </p:cNvSpPr>
+          <p:nvPr>
+            <p:ph type="sldImg"/>
+          </p:nvPr>
+        </p:nvSpPr>
+        <p:spPr/>
+      </p:sp>
+      <p:sp>
+        <p:nvSpPr>
+          <p:cNvPr id="3" name="Notes Placeholder 2"/>
+          <p:cNvSpPr>
+            <a:spLocks noGrp="1"/>
+          </p:cNvSpPr>
+          <p:nvPr>
+            <p:ph type="body" idx="1"/>
+          </p:nvPr>
+        </p:nvSpPr>
+        <p:spPr/>
+        <p:txBody>
+          <a:bodyPr/>
+          <a:lstStyle/>
+          <a:p>
+            <a:endParaRPr lang="en-US"/>
+          </a:p>
+        </p:txBody>
+      </p:sp>
+      <p:sp>
+        <p:nvSpPr>
+          <p:cNvPr id="4" name="Header Placeholder 3"/>
+          <p:cNvSpPr>
+            <a:spLocks noGrp="1"/>
+          </p:cNvSpPr>
+          <p:nvPr>
+            <p:ph type="hdr" sz="quarter" idx="10"/>
+          </p:nvPr>
+        </p:nvSpPr>
+        <p:spPr/>
+        <p:txBody>
+          <a:bodyPr/>
+          <a:lstStyle/>
+          <a:p>
+            <a:endParaRPr lang="en-US"/>
+          </a:p>
+        </p:txBody>
+      </p:sp>
+      <p:sp>
+        <p:nvSpPr>
+          <p:cNvPr id="5" name="Footer Placeholder 4"/>
+          <p:cNvSpPr>
+            <a:spLocks noGrp="1"/>
+          </p:cNvSpPr>
+          <p:nvPr>
+            <p:ph type="ftr" sz="quarter" idx="11"/>
+          </p:nvPr>
+        </p:nvSpPr>
+        <p:spPr/>
+        <p:txBody>
+          <a:bodyPr/>
+          <a:lstStyle/>
+          <a:p>
+            <a:pPr defTabSz="914099" eaLnBrk="0" hangingPunct="0"/>
+            <a:r>
+              <a:rPr lang="en-US" sz="400">
+                <a:gradFill>
+                  <a:gsLst>
+                    <a:gs pos="0">
+                      <a:prstClr val="black"/>
+                    </a:gs>
+                    <a:gs pos="100000">
+                      <a:prstClr val="black"/>
+                    </a:gs>
+                  </a:gsLst>
+                  <a:lin ang="5400000" scaled="0"/>
+                </a:gradFill>
+                <a:latin typeface="Segoe UI" pitchFamily="34" charset="0"/>
+                <a:ea typeface="Segoe UI" pitchFamily="34" charset="0"/>
+                <a:cs typeface="Segoe UI" pitchFamily="34" charset="0"/>
+              </a:rPr>
+              <a:t>© Microsoft Corporation. All rights reserved. MICROSOFT MAKES NO WARRANTIES, EXPRESS, IMPLIED OR STATUTORY, AS TO THE INFORMATION IN THIS PRESENTATION.</a:t>
+            </a:r>
+          </a:p>
+        </p:txBody>
+      </p:sp>
+      <p:sp>
+        <p:nvSpPr>
+          <p:cNvPr id="6" name="Date Placeholder 5"/>
+          <p:cNvSpPr>
+            <a:spLocks noGrp="1"/>
+          </p:cNvSpPr>
+          <p:nvPr>
+            <p:ph type="dt" idx="12"/>
+          </p:nvPr>
+        </p:nvSpPr>
+        <p:spPr/>
+        <p:txBody>
+          <a:bodyPr/>
+          <a:lstStyle/>
+          <a:p>
+            <a:fld id="{B16574EE-8191-4BCC-ABE6-D00A4F4D7690}" type="datetime8">
+              <a:rPr lang="en-US" smtClean="0"/>
+              <a:t>5/24/2019 2:28 PM</a:t>
+            </a:fld>
+            <a:endParaRPr lang="en-US"/>
+          </a:p>
+        </p:txBody>
+      </p:sp>
+      <p:sp>
+        <p:nvSpPr>
+          <p:cNvPr id="7" name="Slide Number Placeholder 6"/>
+          <p:cNvSpPr>
+            <a:spLocks noGrp="1"/>
+          </p:cNvSpPr>
+          <p:nvPr>
+            <p:ph type="sldNum" sz="quarter" idx="13"/>
+          </p:nvPr>
+        </p:nvSpPr>
+        <p:spPr/>
+        <p:txBody>
+          <a:bodyPr/>
+          <a:lstStyle/>
+          <a:p>
+            <a:fld id="{B4008EB6-D09E-4580-8CD6-DDB14511944F}" type="slidenum">
+              <a:rPr lang="en-US" smtClean="0"/>
+              <a:pPr/>
+              <a:t>8</a:t>
+            </a:fld>
+            <a:endParaRPr lang="en-US"/>
+          </a:p>
+        </p:txBody>
+      </p:sp>
+    </p:spTree>
+    <p:extLst>
+      <p:ext uri="{BB962C8B-B14F-4D97-AF65-F5344CB8AC3E}">
+        <p14:creationId xmlns:p14="http://schemas.microsoft.com/office/powerpoint/2010/main" val="511922872"/>
+      </p:ext>
+    </p:extLst>
+  </p:cSld>
+  <p:clrMapOvr>
+    <a:masterClrMapping/>
+  </p:clrMapOvr>
+</p:notes>
+</file>
+
+<file path=ppt/notesSlides/notesSlide3.xml><?xml version="1.0" encoding="utf-8"?>
+<p:notes xmlns:a="http://schemas.openxmlformats.org/drawingml/2006/main" xmlns:r="http://schemas.openxmlformats.org/officeDocument/2006/relationships" xmlns:p="http://schemas.openxmlformats.org/presentationml/2006/main">
+  <p:cSld>
+    <p:spTree>
+      <p:nvGrpSpPr>
+        <p:cNvPr id="1" name=""/>
+        <p:cNvGrpSpPr/>
+        <p:nvPr/>
+      </p:nvGrpSpPr>
+      <p:grpSpPr>
+        <a:xfrm>
+          <a:off x="0" y="0"/>
+          <a:ext cx="0" cy="0"/>
+          <a:chOff x="0" y="0"/>
+          <a:chExt cx="0" cy="0"/>
+        </a:xfrm>
+      </p:grpSpPr>
+      <p:sp>
+        <p:nvSpPr>
+          <p:cNvPr id="2" name="Slide Image Placeholder 1"/>
+          <p:cNvSpPr>
+            <a:spLocks noGrp="1" noRot="1" noChangeAspect="1"/>
+          </p:cNvSpPr>
+          <p:nvPr>
+            <p:ph type="sldImg"/>
+          </p:nvPr>
+        </p:nvSpPr>
+        <p:spPr>
+          <a:xfrm>
+            <a:off x="381000" y="685800"/>
+            <a:ext cx="6096000" cy="3429000"/>
+          </a:xfrm>
+        </p:spPr>
+      </p:sp>
+      <p:sp>
+        <p:nvSpPr>
+          <p:cNvPr id="3" name="Notes Placeholder 2"/>
+          <p:cNvSpPr>
+            <a:spLocks noGrp="1"/>
+          </p:cNvSpPr>
+          <p:nvPr>
+            <p:ph type="body" idx="1"/>
+          </p:nvPr>
+        </p:nvSpPr>
+        <p:spPr/>
+        <p:txBody>
+          <a:bodyPr>
+            <a:normAutofit/>
+          </a:bodyPr>
+          <a:lstStyle/>
+          <a:p>
+            <a:endParaRPr lang="en-US"/>
+          </a:p>
+        </p:txBody>
+      </p:sp>
+      <p:sp>
+        <p:nvSpPr>
+          <p:cNvPr id="4" name="Header Placeholder 3"/>
+          <p:cNvSpPr>
+            <a:spLocks noGrp="1"/>
+          </p:cNvSpPr>
+          <p:nvPr>
+            <p:ph type="hdr" sz="quarter" idx="10"/>
+          </p:nvPr>
+        </p:nvSpPr>
+        <p:spPr>
+          <a:xfrm>
+            <a:off x="0" y="0"/>
+            <a:ext cx="2971800" cy="457200"/>
+          </a:xfrm>
+          <a:prstGeom prst="rect">
+            <a:avLst/>
+          </a:prstGeom>
+        </p:spPr>
+        <p:txBody>
+          <a:bodyPr/>
+          <a:lstStyle/>
+          <a:p>
+            <a:endParaRPr lang="en-US">
+              <a:solidFill>
+                <a:prstClr val="black"/>
+              </a:solidFill>
+            </a:endParaRPr>
+          </a:p>
+        </p:txBody>
+      </p:sp>
+      <p:sp>
+        <p:nvSpPr>
+          <p:cNvPr id="5" name="Date Placeholder 4"/>
+          <p:cNvSpPr>
+            <a:spLocks noGrp="1"/>
+          </p:cNvSpPr>
+          <p:nvPr>
+            <p:ph type="dt" idx="11"/>
+          </p:nvPr>
+        </p:nvSpPr>
+        <p:spPr/>
+        <p:txBody>
+          <a:bodyPr/>
+          <a:lstStyle/>
+          <a:p>
+            <a:fld id="{0ECFDC7D-F4BE-4668-920D-08874925A5D7}" type="datetime8">
+              <a:rPr lang="en-US" smtClean="0">
+                <a:solidFill>
+                  <a:prstClr val="black"/>
+                </a:solidFill>
+              </a:rPr>
+              <a:t>5/24/2019 2:27 PM</a:t>
+            </a:fld>
+            <a:endParaRPr lang="en-US">
+              <a:solidFill>
+                <a:prstClr val="black"/>
+              </a:solidFill>
+            </a:endParaRPr>
+          </a:p>
+        </p:txBody>
+      </p:sp>
+      <p:sp>
+        <p:nvSpPr>
+          <p:cNvPr id="7" name="Slide Number Placeholder 6"/>
+          <p:cNvSpPr>
+            <a:spLocks noGrp="1"/>
+          </p:cNvSpPr>
+          <p:nvPr>
+            <p:ph type="sldNum" sz="quarter" idx="13"/>
+          </p:nvPr>
+        </p:nvSpPr>
+        <p:spPr/>
+        <p:txBody>
+          <a:bodyPr/>
+          <a:lstStyle/>
+          <a:p>
+            <a:fld id="{EC87E0CF-87F6-4B58-B8B8-DCAB2DAAF3CA}" type="slidenum">
+              <a:rPr lang="en-US" smtClean="0">
+                <a:solidFill>
+                  <a:prstClr val="black"/>
+                </a:solidFill>
+              </a:rPr>
+              <a:pPr/>
+              <a:t>9</a:t>
+            </a:fld>
+            <a:endParaRPr lang="en-US">
+              <a:solidFill>
+                <a:prstClr val="black"/>
+              </a:solidFill>
+            </a:endParaRPr>
+          </a:p>
+        </p:txBody>
+      </p:sp>
+      <p:sp>
+        <p:nvSpPr>
+          <p:cNvPr id="6" name="Footer Placeholder 5"/>
+          <p:cNvSpPr>
+            <a:spLocks noGrp="1"/>
+          </p:cNvSpPr>
+          <p:nvPr>
+            <p:ph type="ftr" sz="quarter" idx="14"/>
+          </p:nvPr>
+        </p:nvSpPr>
+        <p:spPr/>
+        <p:txBody>
+          <a:bodyPr/>
+          <a:lstStyle/>
+          <a:p>
+            <a:pPr defTabSz="914099" eaLnBrk="0" hangingPunct="0"/>
+            <a:r>
+              <a:rPr lang="en-US" sz="400">
+                <a:gradFill>
+                  <a:gsLst>
+                    <a:gs pos="0">
+                      <a:prstClr val="black"/>
+                    </a:gs>
+                    <a:gs pos="100000">
+                      <a:prstClr val="black"/>
+                    </a:gs>
+                  </a:gsLst>
+                  <a:lin ang="5400000" scaled="0"/>
+                </a:gradFill>
+                <a:latin typeface="Segoe UI" pitchFamily="34" charset="0"/>
+                <a:ea typeface="Segoe UI" pitchFamily="34" charset="0"/>
+                <a:cs typeface="Segoe UI" pitchFamily="34" charset="0"/>
+              </a:rPr>
+              <a:t>© Microsoft Corporation. All rights reserved. MICROSOFT MAKES NO WARRANTIES, EXPRESS, IMPLIED OR STATUTORY, AS TO THE INFORMATION IN THIS PRESENTATION.</a:t>
+            </a:r>
+          </a:p>
+        </p:txBody>
+      </p:sp>
+    </p:spTree>
+    <p:extLst>
+      <p:ext uri="{BB962C8B-B14F-4D97-AF65-F5344CB8AC3E}">
+        <p14:creationId xmlns:p14="http://schemas.microsoft.com/office/powerpoint/2010/main" val="2185510719"/>
+      </p:ext>
+    </p:extLst>
+  </p:cSld>
+  <p:clrMapOvr>
+    <a:masterClrMapping/>
+  </p:clrMapOvr>
+</p:notes>
+</file>
+
+<file path=ppt/notesSlides/notesSlide4.xml><?xml version="1.0" encoding="utf-8"?>
+<p:notes xmlns:a="http://schemas.openxmlformats.org/drawingml/2006/main" xmlns:r="http://schemas.openxmlformats.org/officeDocument/2006/relationships" xmlns:p="http://schemas.openxmlformats.org/presentationml/2006/main">
+  <p:cSld>
+    <p:spTree>
+      <p:nvGrpSpPr>
+        <p:cNvPr id="1" name=""/>
+        <p:cNvGrpSpPr/>
+        <p:nvPr/>
+      </p:nvGrpSpPr>
+      <p:grpSpPr>
+        <a:xfrm>
+          <a:off x="0" y="0"/>
+          <a:ext cx="0" cy="0"/>
+          <a:chOff x="0" y="0"/>
+          <a:chExt cx="0" cy="0"/>
+        </a:xfrm>
+      </p:grpSpPr>
+      <p:sp>
+        <p:nvSpPr>
+          <p:cNvPr id="2" name="Slide Image Placeholder 1"/>
+          <p:cNvSpPr>
+            <a:spLocks noGrp="1" noRot="1" noChangeAspect="1"/>
+          </p:cNvSpPr>
+          <p:nvPr>
+            <p:ph type="sldImg"/>
+          </p:nvPr>
+        </p:nvSpPr>
+        <p:spPr/>
+      </p:sp>
+      <p:sp>
+        <p:nvSpPr>
+          <p:cNvPr id="3" name="Notes Placeholder 2"/>
+          <p:cNvSpPr>
+            <a:spLocks noGrp="1"/>
+          </p:cNvSpPr>
+          <p:nvPr>
+            <p:ph type="body" idx="1"/>
+          </p:nvPr>
+        </p:nvSpPr>
+        <p:spPr/>
+        <p:txBody>
+          <a:bodyPr/>
+          <a:lstStyle/>
+          <a:p>
+            <a:r>
+              <a:rPr lang="en-US" dirty="0"/>
+              <a:t>ML code is just the little black box in the middle.</a:t>
+            </a:r>
+          </a:p>
+        </p:txBody>
+      </p:sp>
+      <p:sp>
+        <p:nvSpPr>
+          <p:cNvPr id="4" name="Slide Number Placeholder 3"/>
+          <p:cNvSpPr>
+            <a:spLocks noGrp="1"/>
+          </p:cNvSpPr>
+          <p:nvPr>
+            <p:ph type="sldNum" sz="quarter" idx="5"/>
+          </p:nvPr>
+        </p:nvSpPr>
+        <p:spPr/>
+        <p:txBody>
+          <a:bodyPr/>
+          <a:lstStyle/>
+          <a:p>
+            <a:fld id="{77CBE162-B8EB-4035-9401-9F47107154AE}" type="slidenum">
+              <a:rPr lang="en-US" smtClean="0"/>
+              <a:t>10</a:t>
+            </a:fld>
+            <a:endParaRPr lang="en-US"/>
+          </a:p>
+        </p:txBody>
+      </p:sp>
+    </p:spTree>
+    <p:extLst>
+      <p:ext uri="{BB962C8B-B14F-4D97-AF65-F5344CB8AC3E}">
+        <p14:creationId xmlns:p14="http://schemas.microsoft.com/office/powerpoint/2010/main" val="336152967"/>
+      </p:ext>
+    </p:extLst>
+  </p:cSld>
+  <p:clrMapOvr>
+    <a:masterClrMapping/>
+  </p:clrMapOvr>
+</p:notes>
+</file>
+
 <file path=ppt/slideLayouts/slideLayout1.xml><?xml version="1.0" encoding="utf-8"?>
 <p:sldLayout xmlns:a="http://schemas.openxmlformats.org/drawingml/2006/main" xmlns:r="http://schemas.openxmlformats.org/officeDocument/2006/relationships" xmlns:p="http://schemas.openxmlformats.org/presentationml/2006/main" type="title" preserve="1">
   <p:cSld name="Title Slide">
@@ -755,7 +1743,7 @@
           <a:p>
             <a:fld id="{2FC94C11-1D8C-4CD4-9951-2FEE5D70BA6C}" type="datetimeFigureOut">
               <a:rPr lang="en-US" smtClean="0"/>
-              <a:t>5/20/2019</a:t>
+              <a:t>5/24/2019</a:t>
             </a:fld>
             <a:endParaRPr lang="en-US"/>
           </a:p>
@@ -953,7 +1941,7 @@
           <a:p>
             <a:fld id="{2FC94C11-1D8C-4CD4-9951-2FEE5D70BA6C}" type="datetimeFigureOut">
               <a:rPr lang="en-US" smtClean="0"/>
-              <a:t>5/20/2019</a:t>
+              <a:t>5/24/2019</a:t>
             </a:fld>
             <a:endParaRPr lang="en-US"/>
           </a:p>
@@ -1161,7 +2149,7 @@
           <a:p>
             <a:fld id="{2FC94C11-1D8C-4CD4-9951-2FEE5D70BA6C}" type="datetimeFigureOut">
               <a:rPr lang="en-US" smtClean="0"/>
-              <a:t>5/20/2019</a:t>
+              <a:t>5/24/2019</a:t>
             </a:fld>
             <a:endParaRPr lang="en-US"/>
           </a:p>
@@ -1231,6 +2219,492 @@
   <p:clrMapOvr>
     <a:masterClrMapping/>
   </p:clrMapOvr>
+</p:sldLayout>
+</file>
+
+<file path=ppt/slideLayouts/slideLayout12.xml><?xml version="1.0" encoding="utf-8"?>
+<p:sldLayout xmlns:a="http://schemas.openxmlformats.org/drawingml/2006/main" xmlns:r="http://schemas.openxmlformats.org/officeDocument/2006/relationships" xmlns:p="http://schemas.openxmlformats.org/presentationml/2006/main" userDrawn="1">
+  <p:cSld name="Closing logo slide">
+    <p:bg>
+      <p:bgRef idx="1001">
+        <a:schemeClr val="bg2"/>
+      </p:bgRef>
+    </p:bg>
+    <p:spTree>
+      <p:nvGrpSpPr>
+        <p:cNvPr id="1" name=""/>
+        <p:cNvGrpSpPr/>
+        <p:nvPr/>
+      </p:nvGrpSpPr>
+      <p:grpSpPr>
+        <a:xfrm>
+          <a:off x="0" y="0"/>
+          <a:ext cx="0" cy="0"/>
+          <a:chOff x="0" y="0"/>
+          <a:chExt cx="0" cy="0"/>
+        </a:xfrm>
+      </p:grpSpPr>
+      <p:pic>
+        <p:nvPicPr>
+          <p:cNvPr id="5" name="MS logo white - EMF" descr="Microsoft logo white text version">
+            <a:extLst>
+              <a:ext uri="{FF2B5EF4-FFF2-40B4-BE49-F238E27FC236}">
+                <a16:creationId xmlns:a16="http://schemas.microsoft.com/office/drawing/2014/main" id="{70D3778F-A717-44C8-9013-FF206B15DD6D}"/>
+              </a:ext>
+            </a:extLst>
+          </p:cNvPr>
+          <p:cNvPicPr>
+            <a:picLocks noChangeAspect="1"/>
+          </p:cNvPicPr>
+          <p:nvPr userDrawn="1"/>
+        </p:nvPicPr>
+        <p:blipFill>
+          <a:blip r:embed="rId2"/>
+          <a:stretch>
+            <a:fillRect/>
+          </a:stretch>
+        </p:blipFill>
+        <p:spPr bwMode="black">
+          <a:xfrm>
+            <a:off x="584200" y="585788"/>
+            <a:ext cx="1366245" cy="292608"/>
+          </a:xfrm>
+          <a:prstGeom prst="rect">
+            <a:avLst/>
+          </a:prstGeom>
+        </p:spPr>
+      </p:pic>
+      <p:sp>
+        <p:nvSpPr>
+          <p:cNvPr id="2" name="Text Box 3" descr="This is a copyright notice that should be included on the final slide."/>
+          <p:cNvSpPr txBox="1">
+            <a:spLocks noChangeArrowheads="1"/>
+          </p:cNvSpPr>
+          <p:nvPr userDrawn="1"/>
+        </p:nvSpPr>
+        <p:spPr bwMode="blackWhite">
+          <a:xfrm>
+            <a:off x="584200" y="6161316"/>
+            <a:ext cx="4482124" cy="107722"/>
+          </a:xfrm>
+          <a:prstGeom prst="rect">
+            <a:avLst/>
+          </a:prstGeom>
+          <a:noFill/>
+          <a:ln w="12700">
+            <a:noFill/>
+            <a:miter lim="800000"/>
+            <a:headEnd type="none" w="sm" len="sm"/>
+            <a:tailEnd type="none" w="sm" len="sm"/>
+          </a:ln>
+          <a:effectLst/>
+        </p:spPr>
+        <p:txBody>
+          <a:bodyPr vert="horz" wrap="square" lIns="0" tIns="0" rIns="0" bIns="0" numCol="1" anchor="b" anchorCtr="0" compatLnSpc="1">
+            <a:prstTxWarp prst="textNoShape">
+              <a:avLst/>
+            </a:prstTxWarp>
+            <a:spAutoFit/>
+          </a:bodyPr>
+          <a:lstStyle/>
+          <a:p>
+            <a:pPr defTabSz="932290" eaLnBrk="0" hangingPunct="0"/>
+            <a:r>
+              <a:rPr lang="en-US" sz="700">
+                <a:gradFill>
+                  <a:gsLst>
+                    <a:gs pos="0">
+                      <a:schemeClr val="tx1"/>
+                    </a:gs>
+                    <a:gs pos="100000">
+                      <a:schemeClr val="tx1"/>
+                    </a:gs>
+                  </a:gsLst>
+                  <a:lin ang="5400000" scaled="0"/>
+                </a:gradFill>
+                <a:cs typeface="Segoe UI" pitchFamily="34" charset="0"/>
+              </a:rPr>
+              <a:t>© Copyright Microsoft Corporation. All rights reserved. </a:t>
+            </a:r>
+          </a:p>
+        </p:txBody>
+      </p:sp>
+    </p:spTree>
+    <p:extLst>
+      <p:ext uri="{BB962C8B-B14F-4D97-AF65-F5344CB8AC3E}">
+        <p14:creationId xmlns:p14="http://schemas.microsoft.com/office/powerpoint/2010/main" val="1604766988"/>
+      </p:ext>
+    </p:extLst>
+  </p:cSld>
+  <p:clrMapOvr>
+    <a:overrideClrMapping bg1="dk1" tx1="lt1" bg2="dk2" tx2="lt2" accent1="accent1" accent2="accent2" accent3="accent3" accent4="accent4" accent5="accent5" accent6="accent6" hlink="hlink" folHlink="folHlink"/>
+  </p:clrMapOvr>
+  <p:transition>
+    <p:fade/>
+  </p:transition>
+</p:sldLayout>
+</file>
+
+<file path=ppt/slideLayouts/slideLayout13.xml><?xml version="1.0" encoding="utf-8"?>
+<p:sldLayout xmlns:a="http://schemas.openxmlformats.org/drawingml/2006/main" xmlns:r="http://schemas.openxmlformats.org/officeDocument/2006/relationships" xmlns:p="http://schemas.openxmlformats.org/presentationml/2006/main" userDrawn="1">
+  <p:cSld name="Demo slide">
+    <p:bg>
+      <p:bgRef idx="1001">
+        <a:schemeClr val="bg2"/>
+      </p:bgRef>
+    </p:bg>
+    <p:spTree>
+      <p:nvGrpSpPr>
+        <p:cNvPr id="1" name=""/>
+        <p:cNvGrpSpPr/>
+        <p:nvPr/>
+      </p:nvGrpSpPr>
+      <p:grpSpPr>
+        <a:xfrm>
+          <a:off x="0" y="0"/>
+          <a:ext cx="0" cy="0"/>
+          <a:chOff x="0" y="0"/>
+          <a:chExt cx="0" cy="0"/>
+        </a:xfrm>
+      </p:grpSpPr>
+      <p:pic>
+        <p:nvPicPr>
+          <p:cNvPr id="4" name="Picture 3">
+            <a:extLst>
+              <a:ext uri="{FF2B5EF4-FFF2-40B4-BE49-F238E27FC236}">
+                <a16:creationId xmlns:a16="http://schemas.microsoft.com/office/drawing/2014/main" id="{EC769323-1BEB-4120-81D6-CF4C467A047A}"/>
+              </a:ext>
+            </a:extLst>
+          </p:cNvPr>
+          <p:cNvPicPr>
+            <a:picLocks noChangeAspect="1"/>
+          </p:cNvPicPr>
+          <p:nvPr userDrawn="1"/>
+        </p:nvPicPr>
+        <p:blipFill>
+          <a:blip r:embed="rId2">
+            <a:extLst>
+              <a:ext uri="{BEBA8EAE-BF5A-486C-A8C5-ECC9F3942E4B}">
+                <a14:imgProps xmlns:a14="http://schemas.microsoft.com/office/drawing/2010/main">
+                  <a14:imgLayer r:embed="rId3">
+                    <a14:imgEffect>
+                      <a14:brightnessContrast bright="-20000"/>
+                    </a14:imgEffect>
+                  </a14:imgLayer>
+                </a14:imgProps>
+              </a:ext>
+            </a:extLst>
+          </a:blip>
+          <a:stretch>
+            <a:fillRect/>
+          </a:stretch>
+        </p:blipFill>
+        <p:spPr bwMode="ltGray">
+          <a:xfrm flipH="1">
+            <a:off x="5095" y="1825"/>
+            <a:ext cx="12181810" cy="6854348"/>
+          </a:xfrm>
+          <a:prstGeom prst="rect">
+            <a:avLst/>
+          </a:prstGeom>
+        </p:spPr>
+      </p:pic>
+      <p:sp>
+        <p:nvSpPr>
+          <p:cNvPr id="2" name="Title 1"/>
+          <p:cNvSpPr>
+            <a:spLocks noGrp="1"/>
+          </p:cNvSpPr>
+          <p:nvPr>
+            <p:ph type="title" hasCustomPrompt="1"/>
+          </p:nvPr>
+        </p:nvSpPr>
+        <p:spPr>
+          <a:xfrm>
+            <a:off x="585216" y="3033223"/>
+            <a:ext cx="9144000" cy="498598"/>
+          </a:xfrm>
+          <a:noFill/>
+        </p:spPr>
+        <p:txBody>
+          <a:bodyPr lIns="0" tIns="0" rIns="0" bIns="0" anchor="b" anchorCtr="0">
+            <a:spAutoFit/>
+          </a:bodyPr>
+          <a:lstStyle>
+            <a:lvl1pPr algn="l" defTabSz="932742" rtl="0" eaLnBrk="1" latinLnBrk="0" hangingPunct="1">
+              <a:lnSpc>
+                <a:spcPct val="90000"/>
+              </a:lnSpc>
+              <a:spcBef>
+                <a:spcPct val="0"/>
+              </a:spcBef>
+              <a:buNone/>
+              <a:defRPr lang="en-US" sz="3600" b="0" kern="1200" cap="none" spc="-50" baseline="0" dirty="0">
+                <a:ln w="3175">
+                  <a:noFill/>
+                </a:ln>
+                <a:solidFill>
+                  <a:srgbClr val="FFFFFF"/>
+                </a:solidFill>
+                <a:effectLst/>
+                <a:latin typeface="+mj-lt"/>
+                <a:ea typeface="+mn-ea"/>
+                <a:cs typeface="Segoe UI" pitchFamily="34" charset="0"/>
+              </a:defRPr>
+            </a:lvl1pPr>
+          </a:lstStyle>
+          <a:p>
+            <a:r>
+              <a:rPr lang="en-US"/>
+              <a:t>Demo title</a:t>
+            </a:r>
+          </a:p>
+        </p:txBody>
+      </p:sp>
+      <p:sp>
+        <p:nvSpPr>
+          <p:cNvPr id="5" name="Text Placeholder 4"/>
+          <p:cNvSpPr>
+            <a:spLocks noGrp="1"/>
+          </p:cNvSpPr>
+          <p:nvPr>
+            <p:ph type="body" sz="quarter" idx="12" hasCustomPrompt="1"/>
+          </p:nvPr>
+        </p:nvSpPr>
+        <p:spPr>
+          <a:xfrm>
+            <a:off x="585216" y="3977319"/>
+            <a:ext cx="9144000" cy="338554"/>
+          </a:xfrm>
+          <a:noFill/>
+        </p:spPr>
+        <p:txBody>
+          <a:bodyPr lIns="0" tIns="0" rIns="0" bIns="0">
+            <a:spAutoFit/>
+          </a:bodyPr>
+          <a:lstStyle>
+            <a:lvl1pPr marL="0" indent="0">
+              <a:spcBef>
+                <a:spcPts val="0"/>
+              </a:spcBef>
+              <a:spcAft>
+                <a:spcPts val="0"/>
+              </a:spcAft>
+              <a:buFont typeface="Arial" panose="020B0604020202020204" pitchFamily="34" charset="0"/>
+              <a:buNone/>
+              <a:defRPr sz="2200" spc="0" baseline="0">
+                <a:gradFill>
+                  <a:gsLst>
+                    <a:gs pos="30519">
+                      <a:srgbClr val="FFFFFF"/>
+                    </a:gs>
+                    <a:gs pos="51000">
+                      <a:srgbClr val="FFFFFF"/>
+                    </a:gs>
+                  </a:gsLst>
+                  <a:lin ang="5400000" scaled="0"/>
+                </a:gradFill>
+                <a:latin typeface="+mn-lt"/>
+              </a:defRPr>
+            </a:lvl1pPr>
+          </a:lstStyle>
+          <a:p>
+            <a:pPr lvl="0"/>
+            <a:r>
+              <a:rPr lang="en-US"/>
+              <a:t>Speaker name</a:t>
+            </a:r>
+          </a:p>
+        </p:txBody>
+      </p:sp>
+    </p:spTree>
+    <p:extLst>
+      <p:ext uri="{BB962C8B-B14F-4D97-AF65-F5344CB8AC3E}">
+        <p14:creationId xmlns:p14="http://schemas.microsoft.com/office/powerpoint/2010/main" val="1113005362"/>
+      </p:ext>
+    </p:extLst>
+  </p:cSld>
+  <p:clrMapOvr>
+    <a:overrideClrMapping bg1="dk1" tx1="lt1" bg2="dk2" tx2="lt2" accent1="accent1" accent2="accent2" accent3="accent3" accent4="accent4" accent5="accent5" accent6="accent6" hlink="hlink" folHlink="folHlink"/>
+  </p:clrMapOvr>
+  <mc:AlternateContent xmlns:mc="http://schemas.openxmlformats.org/markup-compatibility/2006" xmlns:p14="http://schemas.microsoft.com/office/powerpoint/2010/main">
+    <mc:Choice Requires="p14">
+      <p:transition spd="med" p14:dur="700">
+        <p:fade/>
+      </p:transition>
+    </mc:Choice>
+    <mc:Fallback xmlns="">
+      <p:transition spd="med">
+        <p:fade/>
+      </p:transition>
+    </mc:Fallback>
+  </mc:AlternateContent>
+  <p:extLst>
+    <p:ext uri="{DCECCB84-F9BA-43D5-87BE-67443E8EF086}">
+      <p15:sldGuideLst xmlns:p15="http://schemas.microsoft.com/office/powerpoint/2012/main">
+        <p15:guide id="1" orient="horz" pos="2160">
+          <p15:clr>
+            <a:srgbClr val="FBAE40"/>
+          </p15:clr>
+        </p15:guide>
+        <p15:guide id="2" pos="6135">
+          <p15:clr>
+            <a:srgbClr val="5ACBF0"/>
+          </p15:clr>
+        </p15:guide>
+        <p15:guide id="3" orient="horz" pos="1910">
+          <p15:clr>
+            <a:srgbClr val="5ACBF0"/>
+          </p15:clr>
+        </p15:guide>
+        <p15:guide id="4" orient="horz" pos="2505">
+          <p15:clr>
+            <a:srgbClr val="5ACBF0"/>
+          </p15:clr>
+        </p15:guide>
+      </p15:sldGuideLst>
+    </p:ext>
+  </p:extLst>
+</p:sldLayout>
+</file>
+
+<file path=ppt/slideLayouts/slideLayout14.xml><?xml version="1.0" encoding="utf-8"?>
+<p:sldLayout xmlns:a="http://schemas.openxmlformats.org/drawingml/2006/main" xmlns:r="http://schemas.openxmlformats.org/officeDocument/2006/relationships" xmlns:p="http://schemas.openxmlformats.org/presentationml/2006/main" userDrawn="1">
+  <p:cSld name="1_Title and Content">
+    <p:spTree>
+      <p:nvGrpSpPr>
+        <p:cNvPr id="1" name=""/>
+        <p:cNvGrpSpPr/>
+        <p:nvPr/>
+      </p:nvGrpSpPr>
+      <p:grpSpPr>
+        <a:xfrm>
+          <a:off x="0" y="0"/>
+          <a:ext cx="0" cy="0"/>
+          <a:chOff x="0" y="0"/>
+          <a:chExt cx="0" cy="0"/>
+        </a:xfrm>
+      </p:grpSpPr>
+      <p:sp>
+        <p:nvSpPr>
+          <p:cNvPr id="2" name="Title 1">
+            <a:extLst>
+              <a:ext uri="{FF2B5EF4-FFF2-40B4-BE49-F238E27FC236}">
+                <a16:creationId xmlns:a16="http://schemas.microsoft.com/office/drawing/2014/main" id="{22FCFEFD-88E5-4869-B5C3-1611B0B50E15}"/>
+              </a:ext>
+            </a:extLst>
+          </p:cNvPr>
+          <p:cNvSpPr>
+            <a:spLocks noGrp="1"/>
+          </p:cNvSpPr>
+          <p:nvPr>
+            <p:ph type="title"/>
+          </p:nvPr>
+        </p:nvSpPr>
+        <p:spPr/>
+        <p:txBody>
+          <a:bodyPr/>
+          <a:lstStyle/>
+          <a:p>
+            <a:r>
+              <a:rPr lang="en-US"/>
+              <a:t>Click to edit Master title style</a:t>
+            </a:r>
+            <a:endParaRPr lang="en-US" dirty="0"/>
+          </a:p>
+        </p:txBody>
+      </p:sp>
+      <p:sp>
+        <p:nvSpPr>
+          <p:cNvPr id="3" name="Text Placeholder 2"/>
+          <p:cNvSpPr>
+            <a:spLocks noGrp="1"/>
+          </p:cNvSpPr>
+          <p:nvPr>
+            <p:ph type="body" sz="quarter" idx="10"/>
+          </p:nvPr>
+        </p:nvSpPr>
+        <p:spPr>
+          <a:xfrm>
+            <a:off x="584200" y="1435497"/>
+            <a:ext cx="11018520" cy="2308324"/>
+          </a:xfrm>
+        </p:spPr>
+        <p:txBody>
+          <a:bodyPr/>
+          <a:lstStyle/>
+          <a:p>
+            <a:pPr lvl="0"/>
+            <a:r>
+              <a:rPr lang="en-US"/>
+              <a:t>Edit Master text styles</a:t>
+            </a:r>
+          </a:p>
+          <a:p>
+            <a:pPr lvl="1"/>
+            <a:r>
+              <a:rPr lang="en-US"/>
+              <a:t>Second level</a:t>
+            </a:r>
+          </a:p>
+          <a:p>
+            <a:pPr lvl="2"/>
+            <a:r>
+              <a:rPr lang="en-US"/>
+              <a:t>Third level</a:t>
+            </a:r>
+          </a:p>
+          <a:p>
+            <a:pPr lvl="3"/>
+            <a:r>
+              <a:rPr lang="en-US"/>
+              <a:t>Fourth level</a:t>
+            </a:r>
+          </a:p>
+          <a:p>
+            <a:pPr lvl="4"/>
+            <a:r>
+              <a:rPr lang="en-US"/>
+              <a:t>Fifth level</a:t>
+            </a:r>
+            <a:endParaRPr lang="en-US" dirty="0"/>
+          </a:p>
+        </p:txBody>
+      </p:sp>
+    </p:spTree>
+    <p:extLst>
+      <p:ext uri="{BB962C8B-B14F-4D97-AF65-F5344CB8AC3E}">
+        <p14:creationId xmlns:p14="http://schemas.microsoft.com/office/powerpoint/2010/main" val="1113482933"/>
+      </p:ext>
+    </p:extLst>
+  </p:cSld>
+  <p:clrMapOvr>
+    <a:masterClrMapping/>
+  </p:clrMapOvr>
+  <p:transition>
+    <p:fade/>
+  </p:transition>
+  <p:extLst>
+    <p:ext uri="{DCECCB84-F9BA-43D5-87BE-67443E8EF086}">
+      <p15:sldGuideLst xmlns:p15="http://schemas.microsoft.com/office/powerpoint/2012/main">
+        <p15:guide id="2" orient="horz" pos="1272">
+          <p15:clr>
+            <a:srgbClr val="5ACBF0"/>
+          </p15:clr>
+        </p15:guide>
+        <p15:guide id="3" orient="horz" pos="288">
+          <p15:clr>
+            <a:srgbClr val="5ACBF0"/>
+          </p15:clr>
+        </p15:guide>
+        <p15:guide id="5" orient="horz" pos="904">
+          <p15:clr>
+            <a:srgbClr val="5ACBF0"/>
+          </p15:clr>
+        </p15:guide>
+      </p15:sldGuideLst>
+    </p:ext>
+  </p:extLst>
 </p:sldLayout>
 </file>
 
@@ -1359,7 +2833,7 @@
           <a:p>
             <a:fld id="{2FC94C11-1D8C-4CD4-9951-2FEE5D70BA6C}" type="datetimeFigureOut">
               <a:rPr lang="en-US" smtClean="0"/>
-              <a:t>5/20/2019</a:t>
+              <a:t>5/24/2019</a:t>
             </a:fld>
             <a:endParaRPr lang="en-US"/>
           </a:p>
@@ -1634,7 +3108,7 @@
           <a:p>
             <a:fld id="{2FC94C11-1D8C-4CD4-9951-2FEE5D70BA6C}" type="datetimeFigureOut">
               <a:rPr lang="en-US" smtClean="0"/>
-              <a:t>5/20/2019</a:t>
+              <a:t>5/24/2019</a:t>
             </a:fld>
             <a:endParaRPr lang="en-US"/>
           </a:p>
@@ -1899,7 +3373,7 @@
           <a:p>
             <a:fld id="{2FC94C11-1D8C-4CD4-9951-2FEE5D70BA6C}" type="datetimeFigureOut">
               <a:rPr lang="en-US" smtClean="0"/>
-              <a:t>5/20/2019</a:t>
+              <a:t>5/24/2019</a:t>
             </a:fld>
             <a:endParaRPr lang="en-US"/>
           </a:p>
@@ -2311,7 +3785,7 @@
           <a:p>
             <a:fld id="{2FC94C11-1D8C-4CD4-9951-2FEE5D70BA6C}" type="datetimeFigureOut">
               <a:rPr lang="en-US" smtClean="0"/>
-              <a:t>5/20/2019</a:t>
+              <a:t>5/24/2019</a:t>
             </a:fld>
             <a:endParaRPr lang="en-US"/>
           </a:p>
@@ -2452,7 +3926,7 @@
           <a:p>
             <a:fld id="{2FC94C11-1D8C-4CD4-9951-2FEE5D70BA6C}" type="datetimeFigureOut">
               <a:rPr lang="en-US" smtClean="0"/>
-              <a:t>5/20/2019</a:t>
+              <a:t>5/24/2019</a:t>
             </a:fld>
             <a:endParaRPr lang="en-US"/>
           </a:p>
@@ -2565,7 +4039,7 @@
           <a:p>
             <a:fld id="{2FC94C11-1D8C-4CD4-9951-2FEE5D70BA6C}" type="datetimeFigureOut">
               <a:rPr lang="en-US" smtClean="0"/>
-              <a:t>5/20/2019</a:t>
+              <a:t>5/24/2019</a:t>
             </a:fld>
             <a:endParaRPr lang="en-US"/>
           </a:p>
@@ -2876,7 +4350,7 @@
           <a:p>
             <a:fld id="{2FC94C11-1D8C-4CD4-9951-2FEE5D70BA6C}" type="datetimeFigureOut">
               <a:rPr lang="en-US" smtClean="0"/>
-              <a:t>5/20/2019</a:t>
+              <a:t>5/24/2019</a:t>
             </a:fld>
             <a:endParaRPr lang="en-US"/>
           </a:p>
@@ -3164,7 +4638,7 @@
           <a:p>
             <a:fld id="{2FC94C11-1D8C-4CD4-9951-2FEE5D70BA6C}" type="datetimeFigureOut">
               <a:rPr lang="en-US" smtClean="0"/>
-              <a:t>5/20/2019</a:t>
+              <a:t>5/24/2019</a:t>
             </a:fld>
             <a:endParaRPr lang="en-US"/>
           </a:p>
@@ -3405,7 +4879,7 @@
           <a:p>
             <a:fld id="{2FC94C11-1D8C-4CD4-9951-2FEE5D70BA6C}" type="datetimeFigureOut">
               <a:rPr lang="en-US" smtClean="0"/>
-              <a:t>5/20/2019</a:t>
+              <a:t>5/24/2019</a:t>
             </a:fld>
             <a:endParaRPr lang="en-US"/>
           </a:p>
@@ -3521,6 +4995,9 @@
     <p:sldLayoutId id="2147483657" r:id="rId9"/>
     <p:sldLayoutId id="2147483658" r:id="rId10"/>
     <p:sldLayoutId id="2147483659" r:id="rId11"/>
+    <p:sldLayoutId id="2147483660" r:id="rId12"/>
+    <p:sldLayoutId id="2147483661" r:id="rId13"/>
+    <p:sldLayoutId id="2147483662" r:id="rId14"/>
   </p:sldLayoutIdLst>
   <p:txStyles>
     <p:titleStyle>
@@ -3878,6 +5355,96 @@
 </p:sld>
 </file>
 
+<file path=ppt/slides/slide10.xml><?xml version="1.0" encoding="utf-8"?>
+<p:sld xmlns:a="http://schemas.openxmlformats.org/drawingml/2006/main" xmlns:r="http://schemas.openxmlformats.org/officeDocument/2006/relationships" xmlns:p="http://schemas.openxmlformats.org/presentationml/2006/main">
+  <p:cSld>
+    <p:spTree>
+      <p:nvGrpSpPr>
+        <p:cNvPr id="1" name=""/>
+        <p:cNvGrpSpPr/>
+        <p:nvPr/>
+      </p:nvGrpSpPr>
+      <p:grpSpPr>
+        <a:xfrm>
+          <a:off x="0" y="0"/>
+          <a:ext cx="0" cy="0"/>
+          <a:chOff x="0" y="0"/>
+          <a:chExt cx="0" cy="0"/>
+        </a:xfrm>
+      </p:grpSpPr>
+      <p:pic>
+        <p:nvPicPr>
+          <p:cNvPr id="2" name="Picture 1">
+            <a:extLst>
+              <a:ext uri="{FF2B5EF4-FFF2-40B4-BE49-F238E27FC236}">
+                <a16:creationId xmlns:a16="http://schemas.microsoft.com/office/drawing/2014/main" id="{7AB5897F-0B97-45FF-B14B-A90914DE3D0F}"/>
+              </a:ext>
+            </a:extLst>
+          </p:cNvPr>
+          <p:cNvPicPr>
+            <a:picLocks noChangeAspect="1"/>
+          </p:cNvPicPr>
+          <p:nvPr/>
+        </p:nvPicPr>
+        <p:blipFill>
+          <a:blip r:embed="rId3"/>
+          <a:stretch>
+            <a:fillRect/>
+          </a:stretch>
+        </p:blipFill>
+        <p:spPr>
+          <a:xfrm>
+            <a:off x="0" y="2648438"/>
+            <a:ext cx="12192000" cy="4196756"/>
+          </a:xfrm>
+          <a:prstGeom prst="rect">
+            <a:avLst/>
+          </a:prstGeom>
+        </p:spPr>
+      </p:pic>
+      <p:pic>
+        <p:nvPicPr>
+          <p:cNvPr id="4" name="Picture 3">
+            <a:extLst>
+              <a:ext uri="{FF2B5EF4-FFF2-40B4-BE49-F238E27FC236}">
+                <a16:creationId xmlns:a16="http://schemas.microsoft.com/office/drawing/2014/main" id="{43A3DBB0-ECA5-4FBA-966C-218F33611A48}"/>
+              </a:ext>
+            </a:extLst>
+          </p:cNvPr>
+          <p:cNvPicPr>
+            <a:picLocks noChangeAspect="1"/>
+          </p:cNvPicPr>
+          <p:nvPr/>
+        </p:nvPicPr>
+        <p:blipFill>
+          <a:blip r:embed="rId4"/>
+          <a:stretch>
+            <a:fillRect/>
+          </a:stretch>
+        </p:blipFill>
+        <p:spPr>
+          <a:xfrm>
+            <a:off x="797859" y="90774"/>
+            <a:ext cx="10596282" cy="2639319"/>
+          </a:xfrm>
+          <a:prstGeom prst="rect">
+            <a:avLst/>
+          </a:prstGeom>
+        </p:spPr>
+      </p:pic>
+    </p:spTree>
+    <p:extLst>
+      <p:ext uri="{BB962C8B-B14F-4D97-AF65-F5344CB8AC3E}">
+        <p14:creationId xmlns:p14="http://schemas.microsoft.com/office/powerpoint/2010/main" val="3446311145"/>
+      </p:ext>
+    </p:extLst>
+  </p:cSld>
+  <p:clrMapOvr>
+    <a:masterClrMapping/>
+  </p:clrMapOvr>
+</p:sld>
+</file>
+
 <file path=ppt/slides/slide2.xml><?xml version="1.0" encoding="utf-8"?>
 <p:sld xmlns:a="http://schemas.openxmlformats.org/drawingml/2006/main" xmlns:r="http://schemas.openxmlformats.org/officeDocument/2006/relationships" xmlns:p="http://schemas.openxmlformats.org/presentationml/2006/main">
   <p:cSld>
@@ -5929,6 +7496,96 @@
 </file>
 
 <file path=ppt/slides/slide5.xml><?xml version="1.0" encoding="utf-8"?>
+<p:sld xmlns:a="http://schemas.openxmlformats.org/drawingml/2006/main" xmlns:r="http://schemas.openxmlformats.org/officeDocument/2006/relationships" xmlns:p="http://schemas.openxmlformats.org/presentationml/2006/main">
+  <p:cSld>
+    <p:spTree>
+      <p:nvGrpSpPr>
+        <p:cNvPr id="1" name=""/>
+        <p:cNvGrpSpPr/>
+        <p:nvPr/>
+      </p:nvGrpSpPr>
+      <p:grpSpPr>
+        <a:xfrm>
+          <a:off x="0" y="0"/>
+          <a:ext cx="0" cy="0"/>
+          <a:chOff x="0" y="0"/>
+          <a:chExt cx="0" cy="0"/>
+        </a:xfrm>
+      </p:grpSpPr>
+      <p:sp>
+        <p:nvSpPr>
+          <p:cNvPr id="2" name="Title 1">
+            <a:extLst>
+              <a:ext uri="{FF2B5EF4-FFF2-40B4-BE49-F238E27FC236}">
+                <a16:creationId xmlns:a16="http://schemas.microsoft.com/office/drawing/2014/main" id="{A1AF1A93-E386-4651-A227-5D6CA7810ED3}"/>
+              </a:ext>
+            </a:extLst>
+          </p:cNvPr>
+          <p:cNvSpPr>
+            <a:spLocks noGrp="1"/>
+          </p:cNvSpPr>
+          <p:nvPr>
+            <p:ph type="title"/>
+          </p:nvPr>
+        </p:nvSpPr>
+        <p:spPr/>
+        <p:txBody>
+          <a:bodyPr>
+            <a:normAutofit/>
+          </a:bodyPr>
+          <a:lstStyle/>
+          <a:p>
+            <a:r>
+              <a:rPr lang="en-US" sz="2400" dirty="0"/>
+              <a:t>(This should look familiar). </a:t>
+            </a:r>
+          </a:p>
+        </p:txBody>
+      </p:sp>
+      <p:pic>
+        <p:nvPicPr>
+          <p:cNvPr id="3" name="Picture 2">
+            <a:extLst>
+              <a:ext uri="{FF2B5EF4-FFF2-40B4-BE49-F238E27FC236}">
+                <a16:creationId xmlns:a16="http://schemas.microsoft.com/office/drawing/2014/main" id="{FFCB11D1-22BE-492F-86EB-4FA243610A79}"/>
+              </a:ext>
+            </a:extLst>
+          </p:cNvPr>
+          <p:cNvPicPr>
+            <a:picLocks noChangeAspect="1"/>
+          </p:cNvPicPr>
+          <p:nvPr/>
+        </p:nvPicPr>
+        <p:blipFill>
+          <a:blip r:embed="rId2"/>
+          <a:stretch>
+            <a:fillRect/>
+          </a:stretch>
+        </p:blipFill>
+        <p:spPr>
+          <a:xfrm>
+            <a:off x="2679973" y="1690688"/>
+            <a:ext cx="4924425" cy="4981575"/>
+          </a:xfrm>
+          <a:prstGeom prst="rect">
+            <a:avLst/>
+          </a:prstGeom>
+        </p:spPr>
+      </p:pic>
+    </p:spTree>
+    <p:extLst>
+      <p:ext uri="{BB962C8B-B14F-4D97-AF65-F5344CB8AC3E}">
+        <p14:creationId xmlns:p14="http://schemas.microsoft.com/office/powerpoint/2010/main" val="3105768420"/>
+      </p:ext>
+    </p:extLst>
+  </p:cSld>
+  <p:clrMapOvr>
+    <a:masterClrMapping/>
+  </p:clrMapOvr>
+</p:sld>
+</file>
+
+<file path=ppt/slides/slide6.xml><?xml version="1.0" encoding="utf-8"?>
 <p:sld xmlns:a="http://schemas.openxmlformats.org/drawingml/2006/main" xmlns:r="http://schemas.openxmlformats.org/officeDocument/2006/relationships" xmlns:p="http://schemas.openxmlformats.org/presentationml/2006/main">
   <p:cSld>
     <p:bg>
@@ -6270,6 +7927,665 @@
   <p:clrMapOvr>
     <a:masterClrMapping/>
   </p:clrMapOvr>
+</p:sld>
+</file>
+
+<file path=ppt/slides/slide7.xml><?xml version="1.0" encoding="utf-8"?>
+<p:sld xmlns:a="http://schemas.openxmlformats.org/drawingml/2006/main" xmlns:r="http://schemas.openxmlformats.org/officeDocument/2006/relationships" xmlns:p="http://schemas.openxmlformats.org/presentationml/2006/main">
+  <p:cSld>
+    <p:spTree>
+      <p:nvGrpSpPr>
+        <p:cNvPr id="1" name=""/>
+        <p:cNvGrpSpPr/>
+        <p:nvPr/>
+      </p:nvGrpSpPr>
+      <p:grpSpPr>
+        <a:xfrm>
+          <a:off x="0" y="0"/>
+          <a:ext cx="0" cy="0"/>
+          <a:chOff x="0" y="0"/>
+          <a:chExt cx="0" cy="0"/>
+        </a:xfrm>
+      </p:grpSpPr>
+      <p:sp>
+        <p:nvSpPr>
+          <p:cNvPr id="17" name="Title 16"/>
+          <p:cNvSpPr>
+            <a:spLocks noGrp="1"/>
+          </p:cNvSpPr>
+          <p:nvPr>
+            <p:ph type="title"/>
+          </p:nvPr>
+        </p:nvSpPr>
+        <p:spPr>
+          <a:xfrm>
+            <a:off x="540557" y="337935"/>
+            <a:ext cx="3395910" cy="677108"/>
+          </a:xfrm>
+        </p:spPr>
+        <p:txBody>
+          <a:bodyPr>
+            <a:normAutofit fontScale="90000"/>
+          </a:bodyPr>
+          <a:lstStyle/>
+          <a:p>
+            <a:r>
+              <a:rPr lang="en-US" sz="4400" dirty="0"/>
+              <a:t>ROC Curve:</a:t>
+            </a:r>
+            <a:endParaRPr lang="en-US" i="1" dirty="0"/>
+          </a:p>
+        </p:txBody>
+      </p:sp>
+      <p:pic>
+        <p:nvPicPr>
+          <p:cNvPr id="2" name="Picture 1">
+            <a:extLst>
+              <a:ext uri="{FF2B5EF4-FFF2-40B4-BE49-F238E27FC236}">
+                <a16:creationId xmlns:a16="http://schemas.microsoft.com/office/drawing/2014/main" id="{2FAE9FDC-1A86-406B-B3FD-C028F2102168}"/>
+              </a:ext>
+            </a:extLst>
+          </p:cNvPr>
+          <p:cNvPicPr>
+            <a:picLocks noChangeAspect="1"/>
+          </p:cNvPicPr>
+          <p:nvPr/>
+        </p:nvPicPr>
+        <p:blipFill>
+          <a:blip r:embed="rId3"/>
+          <a:stretch>
+            <a:fillRect/>
+          </a:stretch>
+        </p:blipFill>
+        <p:spPr>
+          <a:xfrm>
+            <a:off x="5001937" y="0"/>
+            <a:ext cx="6858000" cy="6858000"/>
+          </a:xfrm>
+          <a:prstGeom prst="rect">
+            <a:avLst/>
+          </a:prstGeom>
+        </p:spPr>
+      </p:pic>
+      <p:pic>
+        <p:nvPicPr>
+          <p:cNvPr id="4" name="Picture 3">
+            <a:extLst>
+              <a:ext uri="{FF2B5EF4-FFF2-40B4-BE49-F238E27FC236}">
+                <a16:creationId xmlns:a16="http://schemas.microsoft.com/office/drawing/2014/main" id="{9A22576E-6C0B-4CEA-A590-0A1B20BA1EE7}"/>
+              </a:ext>
+            </a:extLst>
+          </p:cNvPr>
+          <p:cNvPicPr>
+            <a:picLocks noChangeAspect="1"/>
+          </p:cNvPicPr>
+          <p:nvPr/>
+        </p:nvPicPr>
+        <p:blipFill>
+          <a:blip r:embed="rId4"/>
+          <a:stretch>
+            <a:fillRect/>
+          </a:stretch>
+        </p:blipFill>
+        <p:spPr>
+          <a:xfrm>
+            <a:off x="8169678" y="3658953"/>
+            <a:ext cx="3200400" cy="2143125"/>
+          </a:xfrm>
+          <a:prstGeom prst="rect">
+            <a:avLst/>
+          </a:prstGeom>
+        </p:spPr>
+      </p:pic>
+      <p:sp>
+        <p:nvSpPr>
+          <p:cNvPr id="3" name="TextBox 2">
+            <a:extLst>
+              <a:ext uri="{FF2B5EF4-FFF2-40B4-BE49-F238E27FC236}">
+                <a16:creationId xmlns:a16="http://schemas.microsoft.com/office/drawing/2014/main" id="{EAAF5BA1-6045-4A5B-B1FF-C0A6B9AF8469}"/>
+              </a:ext>
+            </a:extLst>
+          </p:cNvPr>
+          <p:cNvSpPr txBox="1"/>
+          <p:nvPr/>
+        </p:nvSpPr>
+        <p:spPr>
+          <a:xfrm rot="16200000">
+            <a:off x="4618713" y="3052859"/>
+            <a:ext cx="1256306" cy="369332"/>
+          </a:xfrm>
+          <a:prstGeom prst="rect">
+            <a:avLst/>
+          </a:prstGeom>
+          <a:solidFill>
+            <a:schemeClr val="bg1"/>
+          </a:solidFill>
+        </p:spPr>
+        <p:txBody>
+          <a:bodyPr wrap="square" lIns="0" tIns="0" rIns="0" bIns="0" rtlCol="0">
+            <a:spAutoFit/>
+          </a:bodyPr>
+          <a:lstStyle/>
+          <a:p>
+            <a:pPr algn="ctr"/>
+            <a:r>
+              <a:rPr lang="en-US" sz="2400" b="1" dirty="0">
+                <a:gradFill>
+                  <a:gsLst>
+                    <a:gs pos="2917">
+                      <a:schemeClr val="tx1"/>
+                    </a:gs>
+                    <a:gs pos="30000">
+                      <a:schemeClr val="tx1"/>
+                    </a:gs>
+                  </a:gsLst>
+                  <a:lin ang="5400000" scaled="0"/>
+                </a:gradFill>
+              </a:rPr>
+              <a:t>TPR</a:t>
+            </a:r>
+          </a:p>
+        </p:txBody>
+      </p:sp>
+      <p:sp>
+        <p:nvSpPr>
+          <p:cNvPr id="6" name="TextBox 5">
+            <a:extLst>
+              <a:ext uri="{FF2B5EF4-FFF2-40B4-BE49-F238E27FC236}">
+                <a16:creationId xmlns:a16="http://schemas.microsoft.com/office/drawing/2014/main" id="{BE60F883-87DA-448C-B213-93926057AF8C}"/>
+              </a:ext>
+            </a:extLst>
+          </p:cNvPr>
+          <p:cNvSpPr txBox="1"/>
+          <p:nvPr/>
+        </p:nvSpPr>
+        <p:spPr>
+          <a:xfrm>
+            <a:off x="5803124" y="6211669"/>
+            <a:ext cx="5658394" cy="646331"/>
+          </a:xfrm>
+          <a:prstGeom prst="rect">
+            <a:avLst/>
+          </a:prstGeom>
+          <a:solidFill>
+            <a:schemeClr val="bg1"/>
+          </a:solidFill>
+        </p:spPr>
+        <p:txBody>
+          <a:bodyPr wrap="square" lIns="0" tIns="0" rIns="0" bIns="0" rtlCol="0">
+            <a:spAutoFit/>
+          </a:bodyPr>
+          <a:lstStyle/>
+          <a:p>
+            <a:pPr algn="ctr"/>
+            <a:r>
+              <a:rPr lang="en-US" sz="1800" dirty="0">
+                <a:gradFill>
+                  <a:gsLst>
+                    <a:gs pos="2917">
+                      <a:schemeClr val="tx1"/>
+                    </a:gs>
+                    <a:gs pos="30000">
+                      <a:schemeClr val="tx1"/>
+                    </a:gs>
+                  </a:gsLst>
+                  <a:lin ang="5400000" scaled="0"/>
+                </a:gradFill>
+              </a:rPr>
+              <a:t>0.0            0.2            0.4            0.6            0.8            1.0</a:t>
+            </a:r>
+          </a:p>
+          <a:p>
+            <a:pPr algn="ctr"/>
+            <a:r>
+              <a:rPr lang="en-US" sz="2400" b="1" dirty="0">
+                <a:gradFill>
+                  <a:gsLst>
+                    <a:gs pos="2917">
+                      <a:schemeClr val="tx1"/>
+                    </a:gs>
+                    <a:gs pos="30000">
+                      <a:schemeClr val="tx1"/>
+                    </a:gs>
+                  </a:gsLst>
+                  <a:lin ang="5400000" scaled="0"/>
+                </a:gradFill>
+              </a:rPr>
+              <a:t>FPR</a:t>
+            </a:r>
+          </a:p>
+        </p:txBody>
+      </p:sp>
+      <p:sp>
+        <p:nvSpPr>
+          <p:cNvPr id="5" name="TextBox 4">
+            <a:extLst>
+              <a:ext uri="{FF2B5EF4-FFF2-40B4-BE49-F238E27FC236}">
+                <a16:creationId xmlns:a16="http://schemas.microsoft.com/office/drawing/2014/main" id="{29FF9A4C-2DF9-4F1B-B6CC-D794A3C87590}"/>
+              </a:ext>
+            </a:extLst>
+          </p:cNvPr>
+          <p:cNvSpPr txBox="1"/>
+          <p:nvPr/>
+        </p:nvSpPr>
+        <p:spPr>
+          <a:xfrm>
+            <a:off x="548640" y="1160901"/>
+            <a:ext cx="3495796" cy="5539978"/>
+          </a:xfrm>
+          <a:prstGeom prst="rect">
+            <a:avLst/>
+          </a:prstGeom>
+          <a:noFill/>
+        </p:spPr>
+        <p:txBody>
+          <a:bodyPr wrap="square" lIns="0" tIns="0" rIns="0" bIns="0" rtlCol="0">
+            <a:spAutoFit/>
+          </a:bodyPr>
+          <a:lstStyle/>
+          <a:p>
+            <a:pPr marL="342900" indent="-342900">
+              <a:buFont typeface="Arial" panose="020B0604020202020204" pitchFamily="34" charset="0"/>
+              <a:buChar char="•"/>
+            </a:pPr>
+            <a:r>
+              <a:rPr lang="en-US" sz="2400" dirty="0">
+                <a:gradFill>
+                  <a:gsLst>
+                    <a:gs pos="2917">
+                      <a:schemeClr val="tx1"/>
+                    </a:gs>
+                    <a:gs pos="30000">
+                      <a:schemeClr val="tx1"/>
+                    </a:gs>
+                  </a:gsLst>
+                  <a:lin ang="5400000" scaled="0"/>
+                </a:gradFill>
+              </a:rPr>
+              <a:t>sort test cases by their score from the model</a:t>
+            </a:r>
+          </a:p>
+          <a:p>
+            <a:pPr marL="342900" indent="-342900">
+              <a:buFont typeface="Arial" panose="020B0604020202020204" pitchFamily="34" charset="0"/>
+              <a:buChar char="•"/>
+            </a:pPr>
+            <a:endParaRPr lang="en-US" sz="2400" dirty="0">
+              <a:gradFill>
+                <a:gsLst>
+                  <a:gs pos="2917">
+                    <a:schemeClr val="tx1"/>
+                  </a:gs>
+                  <a:gs pos="30000">
+                    <a:schemeClr val="tx1"/>
+                  </a:gs>
+                </a:gsLst>
+                <a:lin ang="5400000" scaled="0"/>
+              </a:gradFill>
+            </a:endParaRPr>
+          </a:p>
+          <a:p>
+            <a:pPr marL="342900" indent="-342900">
+              <a:buFont typeface="Arial" panose="020B0604020202020204" pitchFamily="34" charset="0"/>
+              <a:buChar char="•"/>
+            </a:pPr>
+            <a:r>
+              <a:rPr lang="en-US" sz="2400" dirty="0">
+                <a:gradFill>
+                  <a:gsLst>
+                    <a:gs pos="2917">
+                      <a:schemeClr val="tx1"/>
+                    </a:gs>
+                    <a:gs pos="30000">
+                      <a:schemeClr val="tx1"/>
+                    </a:gs>
+                  </a:gsLst>
+                  <a:lin ang="5400000" scaled="0"/>
+                </a:gradFill>
+              </a:rPr>
+              <a:t>march along the sequence, stepping up for positives and right for negatives</a:t>
+            </a:r>
+          </a:p>
+          <a:p>
+            <a:endParaRPr lang="en-US" sz="2400" dirty="0">
+              <a:gradFill>
+                <a:gsLst>
+                  <a:gs pos="2917">
+                    <a:schemeClr val="tx1"/>
+                  </a:gs>
+                  <a:gs pos="30000">
+                    <a:schemeClr val="tx1"/>
+                  </a:gs>
+                </a:gsLst>
+                <a:lin ang="5400000" scaled="0"/>
+              </a:gradFill>
+            </a:endParaRPr>
+          </a:p>
+          <a:p>
+            <a:r>
+              <a:rPr lang="en-US" sz="2400" dirty="0">
+                <a:gradFill>
+                  <a:gsLst>
+                    <a:gs pos="2917">
+                      <a:schemeClr val="tx1"/>
+                    </a:gs>
+                    <a:gs pos="30000">
+                      <a:schemeClr val="tx1"/>
+                    </a:gs>
+                  </a:gsLst>
+                  <a:lin ang="5400000" scaled="0"/>
+                </a:gradFill>
+              </a:rPr>
+              <a:t>This is the same as scanning across possible cutoff threshold values.</a:t>
+            </a:r>
+          </a:p>
+          <a:p>
+            <a:endParaRPr lang="en-US" sz="2400" dirty="0">
+              <a:gradFill>
+                <a:gsLst>
+                  <a:gs pos="2917">
+                    <a:schemeClr val="tx1"/>
+                  </a:gs>
+                  <a:gs pos="30000">
+                    <a:schemeClr val="tx1"/>
+                  </a:gs>
+                </a:gsLst>
+                <a:lin ang="5400000" scaled="0"/>
+              </a:gradFill>
+            </a:endParaRPr>
+          </a:p>
+          <a:p>
+            <a:r>
+              <a:rPr lang="en-US" sz="2400" dirty="0">
+                <a:gradFill>
+                  <a:gsLst>
+                    <a:gs pos="2917">
+                      <a:schemeClr val="tx1"/>
+                    </a:gs>
+                    <a:gs pos="30000">
+                      <a:schemeClr val="tx1"/>
+                    </a:gs>
+                  </a:gsLst>
+                  <a:lin ang="5400000" scaled="0"/>
+                </a:gradFill>
+              </a:rPr>
+              <a:t>The slope of the curve shows the concentration of positives</a:t>
+            </a:r>
+            <a:r>
+              <a:rPr lang="en-US" sz="2000" dirty="0">
+                <a:gradFill>
+                  <a:gsLst>
+                    <a:gs pos="2917">
+                      <a:schemeClr val="tx1"/>
+                    </a:gs>
+                    <a:gs pos="30000">
+                      <a:schemeClr val="tx1"/>
+                    </a:gs>
+                  </a:gsLst>
+                  <a:lin ang="5400000" scaled="0"/>
+                </a:gradFill>
+              </a:rPr>
+              <a:t>.</a:t>
+            </a:r>
+          </a:p>
+        </p:txBody>
+      </p:sp>
+    </p:spTree>
+    <p:extLst>
+      <p:ext uri="{BB962C8B-B14F-4D97-AF65-F5344CB8AC3E}">
+        <p14:creationId xmlns:p14="http://schemas.microsoft.com/office/powerpoint/2010/main" val="1611868248"/>
+      </p:ext>
+    </p:extLst>
+  </p:cSld>
+  <p:clrMapOvr>
+    <a:masterClrMapping/>
+  </p:clrMapOvr>
+  <mc:AlternateContent xmlns:mc="http://schemas.openxmlformats.org/markup-compatibility/2006" xmlns:p14="http://schemas.microsoft.com/office/powerpoint/2010/main">
+    <mc:Choice Requires="p14">
+      <p:transition spd="med" p14:dur="700">
+        <p:fade/>
+      </p:transition>
+    </mc:Choice>
+    <mc:Fallback xmlns="">
+      <p:transition spd="med">
+        <p:fade/>
+      </p:transition>
+    </mc:Fallback>
+  </mc:AlternateContent>
+  <p:timing>
+    <p:tnLst>
+      <p:par>
+        <p:cTn id="1" dur="indefinite" restart="never" nodeType="tmRoot">
+          <p:childTnLst>
+            <p:seq concurrent="1" nextAc="seek">
+              <p:cTn id="2" dur="indefinite" nodeType="mainSeq">
+                <p:childTnLst>
+                  <p:par>
+                    <p:cTn id="3" fill="hold">
+                      <p:stCondLst>
+                        <p:cond delay="indefinite"/>
+                      </p:stCondLst>
+                      <p:childTnLst>
+                        <p:par>
+                          <p:cTn id="4" fill="hold">
+                            <p:stCondLst>
+                              <p:cond delay="0"/>
+                            </p:stCondLst>
+                            <p:childTnLst>
+                              <p:par>
+                                <p:cTn id="5" presetID="1" presetClass="entr" presetSubtype="0" fill="hold" grpId="0" nodeType="clickEffect">
+                                  <p:stCondLst>
+                                    <p:cond delay="0"/>
+                                  </p:stCondLst>
+                                  <p:childTnLst>
+                                    <p:set>
+                                      <p:cBhvr>
+                                        <p:cTn id="6" dur="1" fill="hold">
+                                          <p:stCondLst>
+                                            <p:cond delay="0"/>
+                                          </p:stCondLst>
+                                        </p:cTn>
+                                        <p:tgtEl>
+                                          <p:spTgt spid="6"/>
+                                        </p:tgtEl>
+                                        <p:attrNameLst>
+                                          <p:attrName>style.visibility</p:attrName>
+                                        </p:attrNameLst>
+                                      </p:cBhvr>
+                                      <p:to>
+                                        <p:strVal val="visible"/>
+                                      </p:to>
+                                    </p:set>
+                                  </p:childTnLst>
+                                </p:cTn>
+                              </p:par>
+                              <p:par>
+                                <p:cTn id="7" presetID="1" presetClass="entr" presetSubtype="0" fill="hold" grpId="0" nodeType="withEffect">
+                                  <p:stCondLst>
+                                    <p:cond delay="0"/>
+                                  </p:stCondLst>
+                                  <p:childTnLst>
+                                    <p:set>
+                                      <p:cBhvr>
+                                        <p:cTn id="8" dur="1" fill="hold">
+                                          <p:stCondLst>
+                                            <p:cond delay="0"/>
+                                          </p:stCondLst>
+                                        </p:cTn>
+                                        <p:tgtEl>
+                                          <p:spTgt spid="3"/>
+                                        </p:tgtEl>
+                                        <p:attrNameLst>
+                                          <p:attrName>style.visibility</p:attrName>
+                                        </p:attrNameLst>
+                                      </p:cBhvr>
+                                      <p:to>
+                                        <p:strVal val="visible"/>
+                                      </p:to>
+                                    </p:set>
+                                  </p:childTnLst>
+                                </p:cTn>
+                              </p:par>
+                            </p:childTnLst>
+                          </p:cTn>
+                        </p:par>
+                      </p:childTnLst>
+                    </p:cTn>
+                  </p:par>
+                </p:childTnLst>
+              </p:cTn>
+              <p:prevCondLst>
+                <p:cond evt="onPrev" delay="0">
+                  <p:tgtEl>
+                    <p:sldTgt/>
+                  </p:tgtEl>
+                </p:cond>
+              </p:prevCondLst>
+              <p:nextCondLst>
+                <p:cond evt="onNext" delay="0">
+                  <p:tgtEl>
+                    <p:sldTgt/>
+                  </p:tgtEl>
+                </p:cond>
+              </p:nextCondLst>
+            </p:seq>
+          </p:childTnLst>
+        </p:cTn>
+      </p:par>
+    </p:tnLst>
+    <p:bldLst>
+      <p:bldP spid="3" grpId="0" animBg="1"/>
+      <p:bldP spid="6" grpId="0" animBg="1"/>
+    </p:bldLst>
+  </p:timing>
+</p:sld>
+</file>
+
+<file path=ppt/slides/slide8.xml><?xml version="1.0" encoding="utf-8"?>
+<p:sld xmlns:a="http://schemas.openxmlformats.org/drawingml/2006/main" xmlns:r="http://schemas.openxmlformats.org/officeDocument/2006/relationships" xmlns:p="http://schemas.openxmlformats.org/presentationml/2006/main">
+  <p:cSld>
+    <p:spTree>
+      <p:nvGrpSpPr>
+        <p:cNvPr id="1" name=""/>
+        <p:cNvGrpSpPr/>
+        <p:nvPr/>
+      </p:nvGrpSpPr>
+      <p:grpSpPr>
+        <a:xfrm>
+          <a:off x="0" y="0"/>
+          <a:ext cx="0" cy="0"/>
+          <a:chOff x="0" y="0"/>
+          <a:chExt cx="0" cy="0"/>
+        </a:xfrm>
+      </p:grpSpPr>
+      <p:sp>
+        <p:nvSpPr>
+          <p:cNvPr id="3" name="Title 2"/>
+          <p:cNvSpPr>
+            <a:spLocks noGrp="1"/>
+          </p:cNvSpPr>
+          <p:nvPr>
+            <p:ph type="title"/>
+          </p:nvPr>
+        </p:nvSpPr>
+        <p:spPr/>
+        <p:txBody>
+          <a:bodyPr/>
+          <a:lstStyle/>
+          <a:p>
+            <a:r>
+              <a:rPr lang="en-US"/>
+              <a:t>Demo</a:t>
+            </a:r>
+          </a:p>
+        </p:txBody>
+      </p:sp>
+      <p:sp>
+        <p:nvSpPr>
+          <p:cNvPr id="4" name="Text Placeholder 3"/>
+          <p:cNvSpPr>
+            <a:spLocks noGrp="1"/>
+          </p:cNvSpPr>
+          <p:nvPr>
+            <p:ph type="body" sz="quarter" idx="12"/>
+          </p:nvPr>
+        </p:nvSpPr>
+        <p:spPr/>
+        <p:txBody>
+          <a:bodyPr/>
+          <a:lstStyle/>
+          <a:p>
+            <a:r>
+              <a:rPr lang="en-US"/>
+              <a:t>Speaker name</a:t>
+            </a:r>
+          </a:p>
+        </p:txBody>
+      </p:sp>
+    </p:spTree>
+    <p:extLst>
+      <p:ext uri="{BB962C8B-B14F-4D97-AF65-F5344CB8AC3E}">
+        <p14:creationId xmlns:p14="http://schemas.microsoft.com/office/powerpoint/2010/main" val="203203085"/>
+      </p:ext>
+    </p:extLst>
+  </p:cSld>
+  <p:clrMapOvr>
+    <a:masterClrMapping/>
+  </p:clrMapOvr>
+  <mc:AlternateContent xmlns:mc="http://schemas.openxmlformats.org/markup-compatibility/2006" xmlns:p14="http://schemas.microsoft.com/office/powerpoint/2010/main">
+    <mc:Choice Requires="p14">
+      <p:transition spd="med" p14:dur="700">
+        <p:fade/>
+      </p:transition>
+    </mc:Choice>
+    <mc:Fallback xmlns="">
+      <p:transition spd="med">
+        <p:fade/>
+      </p:transition>
+    </mc:Fallback>
+  </mc:AlternateContent>
+</p:sld>
+</file>
+
+<file path=ppt/slides/slide9.xml><?xml version="1.0" encoding="utf-8"?>
+<p:sld xmlns:a="http://schemas.openxmlformats.org/drawingml/2006/main" xmlns:r="http://schemas.openxmlformats.org/officeDocument/2006/relationships" xmlns:p="http://schemas.openxmlformats.org/presentationml/2006/main">
+  <p:cSld>
+    <p:spTree>
+      <p:nvGrpSpPr>
+        <p:cNvPr id="1" name=""/>
+        <p:cNvGrpSpPr/>
+        <p:nvPr/>
+      </p:nvGrpSpPr>
+      <p:grpSpPr>
+        <a:xfrm>
+          <a:off x="0" y="0"/>
+          <a:ext cx="0" cy="0"/>
+          <a:chOff x="0" y="0"/>
+          <a:chExt cx="0" cy="0"/>
+        </a:xfrm>
+      </p:grpSpPr>
+    </p:spTree>
+    <p:extLst>
+      <p:ext uri="{BB962C8B-B14F-4D97-AF65-F5344CB8AC3E}">
+        <p14:creationId xmlns:p14="http://schemas.microsoft.com/office/powerpoint/2010/main" val="2402828649"/>
+      </p:ext>
+    </p:extLst>
+  </p:cSld>
+  <p:clrMapOvr>
+    <a:masterClrMapping/>
+  </p:clrMapOvr>
+  <mc:AlternateContent xmlns:mc="http://schemas.openxmlformats.org/markup-compatibility/2006" xmlns:p14="http://schemas.microsoft.com/office/powerpoint/2010/main">
+    <mc:Choice Requires="p14">
+      <p:transition spd="med" p14:dur="700">
+        <p:fade/>
+      </p:transition>
+    </mc:Choice>
+    <mc:Fallback xmlns="">
+      <p:transition spd="med">
+        <p:fade/>
+      </p:transition>
+    </mc:Fallback>
+  </mc:AlternateContent>
 </p:sld>
 </file>
 
@@ -6566,4 +8882,299 @@
     </a:ext>
   </a:extLst>
 </a:theme>
+</file>
+
+<file path=ppt/theme/theme2.xml><?xml version="1.0" encoding="utf-8"?>
+<a:theme xmlns:a="http://schemas.openxmlformats.org/drawingml/2006/main" name="Office Theme">
+  <a:themeElements>
+    <a:clrScheme name="Office">
+      <a:dk1>
+        <a:sysClr val="windowText" lastClr="000000"/>
+      </a:dk1>
+      <a:lt1>
+        <a:sysClr val="window" lastClr="FFFFFF"/>
+      </a:lt1>
+      <a:dk2>
+        <a:srgbClr val="44546A"/>
+      </a:dk2>
+      <a:lt2>
+        <a:srgbClr val="E7E6E6"/>
+      </a:lt2>
+      <a:accent1>
+        <a:srgbClr val="4472C4"/>
+      </a:accent1>
+      <a:accent2>
+        <a:srgbClr val="ED7D31"/>
+      </a:accent2>
+      <a:accent3>
+        <a:srgbClr val="A5A5A5"/>
+      </a:accent3>
+      <a:accent4>
+        <a:srgbClr val="FFC000"/>
+      </a:accent4>
+      <a:accent5>
+        <a:srgbClr val="5B9BD5"/>
+      </a:accent5>
+      <a:accent6>
+        <a:srgbClr val="70AD47"/>
+      </a:accent6>
+      <a:hlink>
+        <a:srgbClr val="0563C1"/>
+      </a:hlink>
+      <a:folHlink>
+        <a:srgbClr val="954F72"/>
+      </a:folHlink>
+    </a:clrScheme>
+    <a:fontScheme name="Office">
+      <a:majorFont>
+        <a:latin typeface="Calibri Light" panose="020F0302020204030204"/>
+        <a:ea typeface=""/>
+        <a:cs typeface=""/>
+        <a:font script="Jpan" typeface="游ゴシック Light"/>
+        <a:font script="Hang" typeface="맑은 고딕"/>
+        <a:font script="Hans" typeface="等线 Light"/>
+        <a:font script="Hant" typeface="新細明體"/>
+        <a:font script="Arab" typeface="Times New Roman"/>
+        <a:font script="Hebr" typeface="Times New Roman"/>
+        <a:font script="Thai" typeface="Angsana New"/>
+        <a:font script="Ethi" typeface="Nyala"/>
+        <a:font script="Beng" typeface="Vrinda"/>
+        <a:font script="Gujr" typeface="Shruti"/>
+        <a:font script="Khmr" typeface="MoolBoran"/>
+        <a:font script="Knda" typeface="Tunga"/>
+        <a:font script="Guru" typeface="Raavi"/>
+        <a:font script="Cans" typeface="Euphemia"/>
+        <a:font script="Cher" typeface="Plantagenet Cherokee"/>
+        <a:font script="Yiii" typeface="Microsoft Yi Baiti"/>
+        <a:font script="Tibt" typeface="Microsoft Himalaya"/>
+        <a:font script="Thaa" typeface="MV Boli"/>
+        <a:font script="Deva" typeface="Mangal"/>
+        <a:font script="Telu" typeface="Gautami"/>
+        <a:font script="Taml" typeface="Latha"/>
+        <a:font script="Syrc" typeface="Estrangelo Edessa"/>
+        <a:font script="Orya" typeface="Kalinga"/>
+        <a:font script="Mlym" typeface="Kartika"/>
+        <a:font script="Laoo" typeface="DokChampa"/>
+        <a:font script="Sinh" typeface="Iskoola Pota"/>
+        <a:font script="Mong" typeface="Mongolian Baiti"/>
+        <a:font script="Viet" typeface="Times New Roman"/>
+        <a:font script="Uigh" typeface="Microsoft Uighur"/>
+        <a:font script="Geor" typeface="Sylfaen"/>
+        <a:font script="Armn" typeface="Arial"/>
+        <a:font script="Bugi" typeface="Leelawadee UI"/>
+        <a:font script="Bopo" typeface="Microsoft JhengHei"/>
+        <a:font script="Java" typeface="Javanese Text"/>
+        <a:font script="Lisu" typeface="Segoe UI"/>
+        <a:font script="Mymr" typeface="Myanmar Text"/>
+        <a:font script="Nkoo" typeface="Ebrima"/>
+        <a:font script="Olck" typeface="Nirmala UI"/>
+        <a:font script="Osma" typeface="Ebrima"/>
+        <a:font script="Phag" typeface="Phagspa"/>
+        <a:font script="Syrn" typeface="Estrangelo Edessa"/>
+        <a:font script="Syrj" typeface="Estrangelo Edessa"/>
+        <a:font script="Syre" typeface="Estrangelo Edessa"/>
+        <a:font script="Sora" typeface="Nirmala UI"/>
+        <a:font script="Tale" typeface="Microsoft Tai Le"/>
+        <a:font script="Talu" typeface="Microsoft New Tai Lue"/>
+        <a:font script="Tfng" typeface="Ebrima"/>
+      </a:majorFont>
+      <a:minorFont>
+        <a:latin typeface="Calibri" panose="020F0502020204030204"/>
+        <a:ea typeface=""/>
+        <a:cs typeface=""/>
+        <a:font script="Jpan" typeface="游ゴシック"/>
+        <a:font script="Hang" typeface="맑은 고딕"/>
+        <a:font script="Hans" typeface="等线"/>
+        <a:font script="Hant" typeface="新細明體"/>
+        <a:font script="Arab" typeface="Arial"/>
+        <a:font script="Hebr" typeface="Arial"/>
+        <a:font script="Thai" typeface="Cordia New"/>
+        <a:font script="Ethi" typeface="Nyala"/>
+        <a:font script="Beng" typeface="Vrinda"/>
+        <a:font script="Gujr" typeface="Shruti"/>
+        <a:font script="Khmr" typeface="DaunPenh"/>
+        <a:font script="Knda" typeface="Tunga"/>
+        <a:font script="Guru" typeface="Raavi"/>
+        <a:font script="Cans" typeface="Euphemia"/>
+        <a:font script="Cher" typeface="Plantagenet Cherokee"/>
+        <a:font script="Yiii" typeface="Microsoft Yi Baiti"/>
+        <a:font script="Tibt" typeface="Microsoft Himalaya"/>
+        <a:font script="Thaa" typeface="MV Boli"/>
+        <a:font script="Deva" typeface="Mangal"/>
+        <a:font script="Telu" typeface="Gautami"/>
+        <a:font script="Taml" typeface="Latha"/>
+        <a:font script="Syrc" typeface="Estrangelo Edessa"/>
+        <a:font script="Orya" typeface="Kalinga"/>
+        <a:font script="Mlym" typeface="Kartika"/>
+        <a:font script="Laoo" typeface="DokChampa"/>
+        <a:font script="Sinh" typeface="Iskoola Pota"/>
+        <a:font script="Mong" typeface="Mongolian Baiti"/>
+        <a:font script="Viet" typeface="Arial"/>
+        <a:font script="Uigh" typeface="Microsoft Uighur"/>
+        <a:font script="Geor" typeface="Sylfaen"/>
+        <a:font script="Armn" typeface="Arial"/>
+        <a:font script="Bugi" typeface="Leelawadee UI"/>
+        <a:font script="Bopo" typeface="Microsoft JhengHei"/>
+        <a:font script="Java" typeface="Javanese Text"/>
+        <a:font script="Lisu" typeface="Segoe UI"/>
+        <a:font script="Mymr" typeface="Myanmar Text"/>
+        <a:font script="Nkoo" typeface="Ebrima"/>
+        <a:font script="Olck" typeface="Nirmala UI"/>
+        <a:font script="Osma" typeface="Ebrima"/>
+        <a:font script="Phag" typeface="Phagspa"/>
+        <a:font script="Syrn" typeface="Estrangelo Edessa"/>
+        <a:font script="Syrj" typeface="Estrangelo Edessa"/>
+        <a:font script="Syre" typeface="Estrangelo Edessa"/>
+        <a:font script="Sora" typeface="Nirmala UI"/>
+        <a:font script="Tale" typeface="Microsoft Tai Le"/>
+        <a:font script="Talu" typeface="Microsoft New Tai Lue"/>
+        <a:font script="Tfng" typeface="Ebrima"/>
+      </a:minorFont>
+    </a:fontScheme>
+    <a:fmtScheme name="Office">
+      <a:fillStyleLst>
+        <a:solidFill>
+          <a:schemeClr val="phClr"/>
+        </a:solidFill>
+        <a:gradFill rotWithShape="1">
+          <a:gsLst>
+            <a:gs pos="0">
+              <a:schemeClr val="phClr">
+                <a:lumMod val="110000"/>
+                <a:satMod val="105000"/>
+                <a:tint val="67000"/>
+              </a:schemeClr>
+            </a:gs>
+            <a:gs pos="50000">
+              <a:schemeClr val="phClr">
+                <a:lumMod val="105000"/>
+                <a:satMod val="103000"/>
+                <a:tint val="73000"/>
+              </a:schemeClr>
+            </a:gs>
+            <a:gs pos="100000">
+              <a:schemeClr val="phClr">
+                <a:lumMod val="105000"/>
+                <a:satMod val="109000"/>
+                <a:tint val="81000"/>
+              </a:schemeClr>
+            </a:gs>
+          </a:gsLst>
+          <a:lin ang="5400000" scaled="0"/>
+        </a:gradFill>
+        <a:gradFill rotWithShape="1">
+          <a:gsLst>
+            <a:gs pos="0">
+              <a:schemeClr val="phClr">
+                <a:satMod val="103000"/>
+                <a:lumMod val="102000"/>
+                <a:tint val="94000"/>
+              </a:schemeClr>
+            </a:gs>
+            <a:gs pos="50000">
+              <a:schemeClr val="phClr">
+                <a:satMod val="110000"/>
+                <a:lumMod val="100000"/>
+                <a:shade val="100000"/>
+              </a:schemeClr>
+            </a:gs>
+            <a:gs pos="100000">
+              <a:schemeClr val="phClr">
+                <a:lumMod val="99000"/>
+                <a:satMod val="120000"/>
+                <a:shade val="78000"/>
+              </a:schemeClr>
+            </a:gs>
+          </a:gsLst>
+          <a:lin ang="5400000" scaled="0"/>
+        </a:gradFill>
+      </a:fillStyleLst>
+      <a:lnStyleLst>
+        <a:ln w="6350" cap="flat" cmpd="sng" algn="ctr">
+          <a:solidFill>
+            <a:schemeClr val="phClr"/>
+          </a:solidFill>
+          <a:prstDash val="solid"/>
+          <a:miter lim="800000"/>
+        </a:ln>
+        <a:ln w="12700" cap="flat" cmpd="sng" algn="ctr">
+          <a:solidFill>
+            <a:schemeClr val="phClr"/>
+          </a:solidFill>
+          <a:prstDash val="solid"/>
+          <a:miter lim="800000"/>
+        </a:ln>
+        <a:ln w="19050" cap="flat" cmpd="sng" algn="ctr">
+          <a:solidFill>
+            <a:schemeClr val="phClr"/>
+          </a:solidFill>
+          <a:prstDash val="solid"/>
+          <a:miter lim="800000"/>
+        </a:ln>
+      </a:lnStyleLst>
+      <a:effectStyleLst>
+        <a:effectStyle>
+          <a:effectLst/>
+        </a:effectStyle>
+        <a:effectStyle>
+          <a:effectLst/>
+        </a:effectStyle>
+        <a:effectStyle>
+          <a:effectLst>
+            <a:outerShdw blurRad="57150" dist="19050" dir="5400000" algn="ctr" rotWithShape="0">
+              <a:srgbClr val="000000">
+                <a:alpha val="63000"/>
+              </a:srgbClr>
+            </a:outerShdw>
+          </a:effectLst>
+        </a:effectStyle>
+      </a:effectStyleLst>
+      <a:bgFillStyleLst>
+        <a:solidFill>
+          <a:schemeClr val="phClr"/>
+        </a:solidFill>
+        <a:solidFill>
+          <a:schemeClr val="phClr">
+            <a:tint val="95000"/>
+            <a:satMod val="170000"/>
+          </a:schemeClr>
+        </a:solidFill>
+        <a:gradFill rotWithShape="1">
+          <a:gsLst>
+            <a:gs pos="0">
+              <a:schemeClr val="phClr">
+                <a:tint val="93000"/>
+                <a:satMod val="150000"/>
+                <a:shade val="98000"/>
+                <a:lumMod val="102000"/>
+              </a:schemeClr>
+            </a:gs>
+            <a:gs pos="50000">
+              <a:schemeClr val="phClr">
+                <a:tint val="98000"/>
+                <a:satMod val="130000"/>
+                <a:shade val="90000"/>
+                <a:lumMod val="103000"/>
+              </a:schemeClr>
+            </a:gs>
+            <a:gs pos="100000">
+              <a:schemeClr val="phClr">
+                <a:shade val="63000"/>
+                <a:satMod val="120000"/>
+              </a:schemeClr>
+            </a:gs>
+          </a:gsLst>
+          <a:lin ang="5400000" scaled="0"/>
+        </a:gradFill>
+      </a:bgFillStyleLst>
+    </a:fmtScheme>
+  </a:themeElements>
+  <a:objectDefaults/>
+  <a:extraClrSchemeLst/>
+  <a:extLst>
+    <a:ext uri="{05A4C25C-085E-4340-85A3-A5531E510DB2}">
+      <thm15:themeFamily xmlns:thm15="http://schemas.microsoft.com/office/thememl/2012/main" name="Office Theme" id="{62F939B6-93AF-4DB8-9C6B-D6C7DFDC589F}" vid="{4A3C46E8-61CC-4603-A589-7422A47A8E4A}"/>
+    </a:ext>
+  </a:extLst>
+</a:theme>
 </file>
</xml_diff>

<commit_message>
working version RL slides
</commit_message>
<xml_diff>
--- a/Rlearning/RL_ICSE.pptx
+++ b/Rlearning/RL_ICSE.pptx
@@ -20,8 +20,8 @@
     <p:sldId id="1822" r:id="rId11"/>
     <p:sldId id="1820" r:id="rId12"/>
     <p:sldId id="1823" r:id="rId13"/>
-    <p:sldId id="1527" r:id="rId14"/>
-    <p:sldId id="261" r:id="rId15"/>
+    <p:sldId id="261" r:id="rId14"/>
+    <p:sldId id="1527" r:id="rId15"/>
     <p:sldId id="259" r:id="rId16"/>
     <p:sldId id="1831" r:id="rId17"/>
     <p:sldId id="1821" r:id="rId18"/>
@@ -1130,7 +1130,7 @@
             <a:fld id="{B4008EB6-D09E-4580-8CD6-DDB14511944F}" type="slidenum">
               <a:rPr lang="en-US" smtClean="0"/>
               <a:pPr/>
-              <a:t>12</a:t>
+              <a:t>13</a:t>
             </a:fld>
             <a:endParaRPr lang="en-US"/>
           </a:p>
@@ -12228,6 +12228,382 @@
       </p:grpSpPr>
       <p:sp>
         <p:nvSpPr>
+          <p:cNvPr id="2" name="Title 1">
+            <a:extLst>
+              <a:ext uri="{FF2B5EF4-FFF2-40B4-BE49-F238E27FC236}">
+                <a16:creationId xmlns:a16="http://schemas.microsoft.com/office/drawing/2014/main" id="{A1AF1A93-E386-4651-A227-5D6CA7810ED3}"/>
+              </a:ext>
+            </a:extLst>
+          </p:cNvPr>
+          <p:cNvSpPr>
+            <a:spLocks noGrp="1"/>
+          </p:cNvSpPr>
+          <p:nvPr>
+            <p:ph type="title"/>
+          </p:nvPr>
+        </p:nvSpPr>
+        <p:spPr/>
+        <p:txBody>
+          <a:bodyPr>
+            <a:normAutofit fontScale="90000"/>
+          </a:bodyPr>
+          <a:lstStyle/>
+          <a:p>
+            <a:r>
+              <a:rPr lang="en-US" sz="2400" dirty="0"/>
+              <a:t>In an </a:t>
+            </a:r>
+            <a:r>
+              <a:rPr lang="en-US" sz="2400" i="1" dirty="0"/>
+              <a:t>Actor-Critic</a:t>
+            </a:r>
+            <a:r>
+              <a:rPr lang="en-US" sz="2400" dirty="0"/>
+              <a:t> algorithm, the </a:t>
+            </a:r>
+            <a:r>
+              <a:rPr lang="en-US" sz="2400" i="1" dirty="0"/>
+              <a:t>Actor </a:t>
+            </a:r>
+            <a:r>
+              <a:rPr lang="en-US" sz="2400" dirty="0"/>
+              <a:t>aims to improve the current policy based on the current value function, and the </a:t>
+            </a:r>
+            <a:r>
+              <a:rPr lang="en-US" sz="2400" i="1" dirty="0"/>
+              <a:t>Critic </a:t>
+            </a:r>
+            <a:r>
+              <a:rPr lang="en-US" sz="2400" dirty="0"/>
+              <a:t>improves the value based on the rewards generated by the current policy. Together they implement </a:t>
+            </a:r>
+            <a:r>
+              <a:rPr lang="en-US" sz="2400" i="1" dirty="0"/>
+              <a:t>Generalized Policy Iteration,</a:t>
+            </a:r>
+            <a:r>
+              <a:rPr lang="en-US" sz="2400" dirty="0"/>
+              <a:t> trying to converge on optimal value and policy functions. </a:t>
+            </a:r>
+          </a:p>
+        </p:txBody>
+      </p:sp>
+      <p:pic>
+        <p:nvPicPr>
+          <p:cNvPr id="3" name="Picture 2">
+            <a:extLst>
+              <a:ext uri="{FF2B5EF4-FFF2-40B4-BE49-F238E27FC236}">
+                <a16:creationId xmlns:a16="http://schemas.microsoft.com/office/drawing/2014/main" id="{FFCB11D1-22BE-492F-86EB-4FA243610A79}"/>
+              </a:ext>
+            </a:extLst>
+          </p:cNvPr>
+          <p:cNvPicPr>
+            <a:picLocks noChangeAspect="1"/>
+          </p:cNvPicPr>
+          <p:nvPr/>
+        </p:nvPicPr>
+        <p:blipFill>
+          <a:blip r:embed="rId2"/>
+          <a:stretch>
+            <a:fillRect/>
+          </a:stretch>
+        </p:blipFill>
+        <p:spPr>
+          <a:xfrm>
+            <a:off x="2679973" y="1690688"/>
+            <a:ext cx="4924425" cy="4981575"/>
+          </a:xfrm>
+          <a:prstGeom prst="rect">
+            <a:avLst/>
+          </a:prstGeom>
+        </p:spPr>
+      </p:pic>
+      <p:sp>
+        <p:nvSpPr>
+          <p:cNvPr id="6" name="Rectangle 5">
+            <a:extLst>
+              <a:ext uri="{FF2B5EF4-FFF2-40B4-BE49-F238E27FC236}">
+                <a16:creationId xmlns:a16="http://schemas.microsoft.com/office/drawing/2014/main" id="{60A686B1-6912-4D06-81D1-A81EEBD10862}"/>
+              </a:ext>
+            </a:extLst>
+          </p:cNvPr>
+          <p:cNvSpPr/>
+          <p:nvPr/>
+        </p:nvSpPr>
+        <p:spPr>
+          <a:xfrm>
+            <a:off x="4360985" y="2573220"/>
+            <a:ext cx="627184" cy="240323"/>
+          </a:xfrm>
+          <a:prstGeom prst="rect">
+            <a:avLst/>
+          </a:prstGeom>
+          <a:solidFill>
+            <a:schemeClr val="bg1"/>
+          </a:solidFill>
+          <a:ln>
+            <a:noFill/>
+          </a:ln>
+        </p:spPr>
+        <p:style>
+          <a:lnRef idx="2">
+            <a:schemeClr val="accent1">
+              <a:shade val="50000"/>
+            </a:schemeClr>
+          </a:lnRef>
+          <a:fillRef idx="1">
+            <a:schemeClr val="accent1"/>
+          </a:fillRef>
+          <a:effectRef idx="0">
+            <a:schemeClr val="accent1"/>
+          </a:effectRef>
+          <a:fontRef idx="minor">
+            <a:schemeClr val="lt1"/>
+          </a:fontRef>
+        </p:style>
+        <p:txBody>
+          <a:bodyPr rtlCol="0" anchor="ctr"/>
+          <a:lstStyle/>
+          <a:p>
+            <a:pPr algn="ctr"/>
+            <a:endParaRPr lang="en-US"/>
+          </a:p>
+        </p:txBody>
+      </p:sp>
+      <p:sp>
+        <p:nvSpPr>
+          <p:cNvPr id="7" name="Rectangle 6">
+            <a:extLst>
+              <a:ext uri="{FF2B5EF4-FFF2-40B4-BE49-F238E27FC236}">
+                <a16:creationId xmlns:a16="http://schemas.microsoft.com/office/drawing/2014/main" id="{B154968F-19A4-4905-8F30-A1921F6751ED}"/>
+              </a:ext>
+            </a:extLst>
+          </p:cNvPr>
+          <p:cNvSpPr/>
+          <p:nvPr/>
+        </p:nvSpPr>
+        <p:spPr>
+          <a:xfrm>
+            <a:off x="3610709" y="3616574"/>
+            <a:ext cx="627184" cy="240323"/>
+          </a:xfrm>
+          <a:prstGeom prst="rect">
+            <a:avLst/>
+          </a:prstGeom>
+          <a:solidFill>
+            <a:schemeClr val="bg1"/>
+          </a:solidFill>
+          <a:ln>
+            <a:noFill/>
+          </a:ln>
+        </p:spPr>
+        <p:style>
+          <a:lnRef idx="2">
+            <a:schemeClr val="accent1">
+              <a:shade val="50000"/>
+            </a:schemeClr>
+          </a:lnRef>
+          <a:fillRef idx="1">
+            <a:schemeClr val="accent1"/>
+          </a:fillRef>
+          <a:effectRef idx="0">
+            <a:schemeClr val="accent1"/>
+          </a:effectRef>
+          <a:fontRef idx="minor">
+            <a:schemeClr val="lt1"/>
+          </a:fontRef>
+        </p:style>
+        <p:txBody>
+          <a:bodyPr rtlCol="0" anchor="ctr"/>
+          <a:lstStyle/>
+          <a:p>
+            <a:pPr algn="ctr"/>
+            <a:endParaRPr lang="en-US"/>
+          </a:p>
+        </p:txBody>
+      </p:sp>
+      <p:sp>
+        <p:nvSpPr>
+          <p:cNvPr id="8" name="TextBox 7">
+            <a:extLst>
+              <a:ext uri="{FF2B5EF4-FFF2-40B4-BE49-F238E27FC236}">
+                <a16:creationId xmlns:a16="http://schemas.microsoft.com/office/drawing/2014/main" id="{88D04E34-72B3-4143-8CF1-872BEE890A16}"/>
+              </a:ext>
+            </a:extLst>
+          </p:cNvPr>
+          <p:cNvSpPr txBox="1"/>
+          <p:nvPr/>
+        </p:nvSpPr>
+        <p:spPr>
+          <a:xfrm>
+            <a:off x="3906874" y="2324801"/>
+            <a:ext cx="861326" cy="461665"/>
+          </a:xfrm>
+          <a:prstGeom prst="rect">
+            <a:avLst/>
+          </a:prstGeom>
+          <a:noFill/>
+        </p:spPr>
+        <p:txBody>
+          <a:bodyPr wrap="none" rtlCol="0">
+            <a:spAutoFit/>
+          </a:bodyPr>
+          <a:lstStyle/>
+          <a:p>
+            <a:r>
+              <a:rPr lang="en-US" sz="2400" dirty="0">
+                <a:highlight>
+                  <a:srgbClr val="00FFFF"/>
+                </a:highlight>
+              </a:rPr>
+              <a:t>Actor</a:t>
+            </a:r>
+          </a:p>
+        </p:txBody>
+      </p:sp>
+      <p:sp>
+        <p:nvSpPr>
+          <p:cNvPr id="5" name="TextBox 4">
+            <a:extLst>
+              <a:ext uri="{FF2B5EF4-FFF2-40B4-BE49-F238E27FC236}">
+                <a16:creationId xmlns:a16="http://schemas.microsoft.com/office/drawing/2014/main" id="{F1413332-9329-48E1-9691-399D0E4F5308}"/>
+              </a:ext>
+            </a:extLst>
+          </p:cNvPr>
+          <p:cNvSpPr txBox="1"/>
+          <p:nvPr/>
+        </p:nvSpPr>
+        <p:spPr>
+          <a:xfrm>
+            <a:off x="3924301" y="3420579"/>
+            <a:ext cx="829073" cy="461665"/>
+          </a:xfrm>
+          <a:prstGeom prst="rect">
+            <a:avLst/>
+          </a:prstGeom>
+          <a:noFill/>
+        </p:spPr>
+        <p:txBody>
+          <a:bodyPr wrap="square" rtlCol="0">
+            <a:spAutoFit/>
+          </a:bodyPr>
+          <a:lstStyle/>
+          <a:p>
+            <a:r>
+              <a:rPr lang="en-US" sz="2400" dirty="0">
+                <a:highlight>
+                  <a:srgbClr val="00FF00"/>
+                </a:highlight>
+              </a:rPr>
+              <a:t>Critic</a:t>
+            </a:r>
+          </a:p>
+        </p:txBody>
+      </p:sp>
+      <p:sp>
+        <p:nvSpPr>
+          <p:cNvPr id="10" name="Callout: Bent Line 9">
+            <a:extLst>
+              <a:ext uri="{FF2B5EF4-FFF2-40B4-BE49-F238E27FC236}">
+                <a16:creationId xmlns:a16="http://schemas.microsoft.com/office/drawing/2014/main" id="{687B0AEB-A475-4C6B-85BD-5300DBFC9476}"/>
+              </a:ext>
+            </a:extLst>
+          </p:cNvPr>
+          <p:cNvSpPr/>
+          <p:nvPr/>
+        </p:nvSpPr>
+        <p:spPr>
+          <a:xfrm>
+            <a:off x="7766538" y="2416936"/>
+            <a:ext cx="3106615" cy="724849"/>
+          </a:xfrm>
+          <a:prstGeom prst="borderCallout2">
+            <a:avLst>
+              <a:gd name="adj1" fmla="val 18750"/>
+              <a:gd name="adj2" fmla="val -8333"/>
+              <a:gd name="adj3" fmla="val 18750"/>
+              <a:gd name="adj4" fmla="val -16667"/>
+              <a:gd name="adj5" fmla="val 141612"/>
+              <a:gd name="adj6" fmla="val -49120"/>
+            </a:avLst>
+          </a:prstGeom>
+          <a:solidFill>
+            <a:schemeClr val="bg1"/>
+          </a:solidFill>
+        </p:spPr>
+        <p:style>
+          <a:lnRef idx="2">
+            <a:schemeClr val="accent1">
+              <a:shade val="50000"/>
+            </a:schemeClr>
+          </a:lnRef>
+          <a:fillRef idx="1">
+            <a:schemeClr val="accent1"/>
+          </a:fillRef>
+          <a:effectRef idx="0">
+            <a:schemeClr val="accent1"/>
+          </a:effectRef>
+          <a:fontRef idx="minor">
+            <a:schemeClr val="lt1"/>
+          </a:fontRef>
+        </p:style>
+        <p:txBody>
+          <a:bodyPr rtlCol="0" anchor="ctr"/>
+          <a:lstStyle/>
+          <a:p>
+            <a:r>
+              <a:rPr lang="en-US" dirty="0">
+                <a:solidFill>
+                  <a:srgbClr val="C00000"/>
+                </a:solidFill>
+              </a:rPr>
+              <a:t>“Temporal Difference (TD) =</a:t>
+            </a:r>
+          </a:p>
+          <a:p>
+            <a:r>
+              <a:rPr lang="en-US" dirty="0">
+                <a:solidFill>
+                  <a:srgbClr val="C00000"/>
+                </a:solidFill>
+              </a:rPr>
+              <a:t>Reward prediction error</a:t>
+            </a:r>
+          </a:p>
+        </p:txBody>
+      </p:sp>
+    </p:spTree>
+    <p:extLst>
+      <p:ext uri="{BB962C8B-B14F-4D97-AF65-F5344CB8AC3E}">
+        <p14:creationId xmlns:p14="http://schemas.microsoft.com/office/powerpoint/2010/main" val="3105768420"/>
+      </p:ext>
+    </p:extLst>
+  </p:cSld>
+  <p:clrMapOvr>
+    <a:masterClrMapping/>
+  </p:clrMapOvr>
+</p:sld>
+</file>
+
+<file path=ppt/slides/slide13.xml><?xml version="1.0" encoding="utf-8"?>
+<p:sld xmlns:a="http://schemas.openxmlformats.org/drawingml/2006/main" xmlns:r="http://schemas.openxmlformats.org/officeDocument/2006/relationships" xmlns:p="http://schemas.openxmlformats.org/presentationml/2006/main">
+  <p:cSld>
+    <p:spTree>
+      <p:nvGrpSpPr>
+        <p:cNvPr id="1" name=""/>
+        <p:cNvGrpSpPr/>
+        <p:nvPr/>
+      </p:nvGrpSpPr>
+      <p:grpSpPr>
+        <a:xfrm>
+          <a:off x="0" y="0"/>
+          <a:ext cx="0" cy="0"/>
+          <a:chOff x="0" y="0"/>
+          <a:chExt cx="0" cy="0"/>
+        </a:xfrm>
+      </p:grpSpPr>
+      <p:sp>
+        <p:nvSpPr>
           <p:cNvPr id="3" name="Title 2"/>
           <p:cNvSpPr>
             <a:spLocks noGrp="1"/>
@@ -12258,14 +12634,19 @@
             <p:ph type="body" sz="quarter" idx="12"/>
           </p:nvPr>
         </p:nvSpPr>
-        <p:spPr/>
+        <p:spPr>
+          <a:xfrm>
+            <a:off x="585216" y="3977319"/>
+            <a:ext cx="9144000" cy="304699"/>
+          </a:xfrm>
+        </p:spPr>
         <p:txBody>
           <a:bodyPr/>
           <a:lstStyle/>
           <a:p>
             <a:r>
-              <a:rPr lang="en-US"/>
-              <a:t>Speaker name</a:t>
+              <a:rPr lang="en-US" dirty="0"/>
+              <a:t>Maze Navigation</a:t>
             </a:r>
           </a:p>
         </p:txBody>
@@ -12295,384 +12676,8 @@
 </p:sld>
 </file>
 
-<file path=ppt/slides/slide13.xml><?xml version="1.0" encoding="utf-8"?>
-<p:sld xmlns:a="http://schemas.openxmlformats.org/drawingml/2006/main" xmlns:r="http://schemas.openxmlformats.org/officeDocument/2006/relationships" xmlns:p="http://schemas.openxmlformats.org/presentationml/2006/main">
-  <p:cSld>
-    <p:spTree>
-      <p:nvGrpSpPr>
-        <p:cNvPr id="1" name=""/>
-        <p:cNvGrpSpPr/>
-        <p:nvPr/>
-      </p:nvGrpSpPr>
-      <p:grpSpPr>
-        <a:xfrm>
-          <a:off x="0" y="0"/>
-          <a:ext cx="0" cy="0"/>
-          <a:chOff x="0" y="0"/>
-          <a:chExt cx="0" cy="0"/>
-        </a:xfrm>
-      </p:grpSpPr>
-      <p:sp>
-        <p:nvSpPr>
-          <p:cNvPr id="2" name="Title 1">
-            <a:extLst>
-              <a:ext uri="{FF2B5EF4-FFF2-40B4-BE49-F238E27FC236}">
-                <a16:creationId xmlns:a16="http://schemas.microsoft.com/office/drawing/2014/main" id="{A1AF1A93-E386-4651-A227-5D6CA7810ED3}"/>
-              </a:ext>
-            </a:extLst>
-          </p:cNvPr>
-          <p:cNvSpPr>
-            <a:spLocks noGrp="1"/>
-          </p:cNvSpPr>
-          <p:nvPr>
-            <p:ph type="title"/>
-          </p:nvPr>
-        </p:nvSpPr>
-        <p:spPr/>
-        <p:txBody>
-          <a:bodyPr>
-            <a:normAutofit fontScale="90000"/>
-          </a:bodyPr>
-          <a:lstStyle/>
-          <a:p>
-            <a:r>
-              <a:rPr lang="en-US" sz="2400" dirty="0"/>
-              <a:t>In an </a:t>
-            </a:r>
-            <a:r>
-              <a:rPr lang="en-US" sz="2400" i="1" dirty="0"/>
-              <a:t>Actor-Critic</a:t>
-            </a:r>
-            <a:r>
-              <a:rPr lang="en-US" sz="2400" dirty="0"/>
-              <a:t> algorithm, the </a:t>
-            </a:r>
-            <a:r>
-              <a:rPr lang="en-US" sz="2400" i="1" dirty="0"/>
-              <a:t>Actor </a:t>
-            </a:r>
-            <a:r>
-              <a:rPr lang="en-US" sz="2400" dirty="0"/>
-              <a:t>aims to improve the current policy based on the current value function, and the </a:t>
-            </a:r>
-            <a:r>
-              <a:rPr lang="en-US" sz="2400" i="1" dirty="0"/>
-              <a:t>Critic </a:t>
-            </a:r>
-            <a:r>
-              <a:rPr lang="en-US" sz="2400" dirty="0"/>
-              <a:t>improves the value based on the rewards generated by the current policy. Together they implement </a:t>
-            </a:r>
-            <a:r>
-              <a:rPr lang="en-US" sz="2400" i="1" dirty="0"/>
-              <a:t>Generalized Policy Iteration,</a:t>
-            </a:r>
-            <a:r>
-              <a:rPr lang="en-US" sz="2400" dirty="0"/>
-              <a:t> trying to converge on optimal value and policy functions. </a:t>
-            </a:r>
-          </a:p>
-        </p:txBody>
-      </p:sp>
-      <p:pic>
-        <p:nvPicPr>
-          <p:cNvPr id="3" name="Picture 2">
-            <a:extLst>
-              <a:ext uri="{FF2B5EF4-FFF2-40B4-BE49-F238E27FC236}">
-                <a16:creationId xmlns:a16="http://schemas.microsoft.com/office/drawing/2014/main" id="{FFCB11D1-22BE-492F-86EB-4FA243610A79}"/>
-              </a:ext>
-            </a:extLst>
-          </p:cNvPr>
-          <p:cNvPicPr>
-            <a:picLocks noChangeAspect="1"/>
-          </p:cNvPicPr>
-          <p:nvPr/>
-        </p:nvPicPr>
-        <p:blipFill>
-          <a:blip r:embed="rId2"/>
-          <a:stretch>
-            <a:fillRect/>
-          </a:stretch>
-        </p:blipFill>
-        <p:spPr>
-          <a:xfrm>
-            <a:off x="2679973" y="1690688"/>
-            <a:ext cx="4924425" cy="4981575"/>
-          </a:xfrm>
-          <a:prstGeom prst="rect">
-            <a:avLst/>
-          </a:prstGeom>
-        </p:spPr>
-      </p:pic>
-      <p:sp>
-        <p:nvSpPr>
-          <p:cNvPr id="6" name="Rectangle 5">
-            <a:extLst>
-              <a:ext uri="{FF2B5EF4-FFF2-40B4-BE49-F238E27FC236}">
-                <a16:creationId xmlns:a16="http://schemas.microsoft.com/office/drawing/2014/main" id="{60A686B1-6912-4D06-81D1-A81EEBD10862}"/>
-              </a:ext>
-            </a:extLst>
-          </p:cNvPr>
-          <p:cNvSpPr/>
-          <p:nvPr/>
-        </p:nvSpPr>
-        <p:spPr>
-          <a:xfrm>
-            <a:off x="4360985" y="2573220"/>
-            <a:ext cx="627184" cy="240323"/>
-          </a:xfrm>
-          <a:prstGeom prst="rect">
-            <a:avLst/>
-          </a:prstGeom>
-          <a:solidFill>
-            <a:schemeClr val="bg1"/>
-          </a:solidFill>
-          <a:ln>
-            <a:noFill/>
-          </a:ln>
-        </p:spPr>
-        <p:style>
-          <a:lnRef idx="2">
-            <a:schemeClr val="accent1">
-              <a:shade val="50000"/>
-            </a:schemeClr>
-          </a:lnRef>
-          <a:fillRef idx="1">
-            <a:schemeClr val="accent1"/>
-          </a:fillRef>
-          <a:effectRef idx="0">
-            <a:schemeClr val="accent1"/>
-          </a:effectRef>
-          <a:fontRef idx="minor">
-            <a:schemeClr val="lt1"/>
-          </a:fontRef>
-        </p:style>
-        <p:txBody>
-          <a:bodyPr rtlCol="0" anchor="ctr"/>
-          <a:lstStyle/>
-          <a:p>
-            <a:pPr algn="ctr"/>
-            <a:endParaRPr lang="en-US"/>
-          </a:p>
-        </p:txBody>
-      </p:sp>
-      <p:sp>
-        <p:nvSpPr>
-          <p:cNvPr id="7" name="Rectangle 6">
-            <a:extLst>
-              <a:ext uri="{FF2B5EF4-FFF2-40B4-BE49-F238E27FC236}">
-                <a16:creationId xmlns:a16="http://schemas.microsoft.com/office/drawing/2014/main" id="{B154968F-19A4-4905-8F30-A1921F6751ED}"/>
-              </a:ext>
-            </a:extLst>
-          </p:cNvPr>
-          <p:cNvSpPr/>
-          <p:nvPr/>
-        </p:nvSpPr>
-        <p:spPr>
-          <a:xfrm>
-            <a:off x="3610709" y="3616574"/>
-            <a:ext cx="627184" cy="240323"/>
-          </a:xfrm>
-          <a:prstGeom prst="rect">
-            <a:avLst/>
-          </a:prstGeom>
-          <a:solidFill>
-            <a:schemeClr val="bg1"/>
-          </a:solidFill>
-          <a:ln>
-            <a:noFill/>
-          </a:ln>
-        </p:spPr>
-        <p:style>
-          <a:lnRef idx="2">
-            <a:schemeClr val="accent1">
-              <a:shade val="50000"/>
-            </a:schemeClr>
-          </a:lnRef>
-          <a:fillRef idx="1">
-            <a:schemeClr val="accent1"/>
-          </a:fillRef>
-          <a:effectRef idx="0">
-            <a:schemeClr val="accent1"/>
-          </a:effectRef>
-          <a:fontRef idx="minor">
-            <a:schemeClr val="lt1"/>
-          </a:fontRef>
-        </p:style>
-        <p:txBody>
-          <a:bodyPr rtlCol="0" anchor="ctr"/>
-          <a:lstStyle/>
-          <a:p>
-            <a:pPr algn="ctr"/>
-            <a:endParaRPr lang="en-US"/>
-          </a:p>
-        </p:txBody>
-      </p:sp>
-      <p:sp>
-        <p:nvSpPr>
-          <p:cNvPr id="8" name="TextBox 7">
-            <a:extLst>
-              <a:ext uri="{FF2B5EF4-FFF2-40B4-BE49-F238E27FC236}">
-                <a16:creationId xmlns:a16="http://schemas.microsoft.com/office/drawing/2014/main" id="{88D04E34-72B3-4143-8CF1-872BEE890A16}"/>
-              </a:ext>
-            </a:extLst>
-          </p:cNvPr>
-          <p:cNvSpPr txBox="1"/>
-          <p:nvPr/>
-        </p:nvSpPr>
-        <p:spPr>
-          <a:xfrm>
-            <a:off x="3906874" y="2324801"/>
-            <a:ext cx="861326" cy="461665"/>
-          </a:xfrm>
-          <a:prstGeom prst="rect">
-            <a:avLst/>
-          </a:prstGeom>
-          <a:noFill/>
-        </p:spPr>
-        <p:txBody>
-          <a:bodyPr wrap="none" rtlCol="0">
-            <a:spAutoFit/>
-          </a:bodyPr>
-          <a:lstStyle/>
-          <a:p>
-            <a:r>
-              <a:rPr lang="en-US" sz="2400" dirty="0">
-                <a:highlight>
-                  <a:srgbClr val="00FFFF"/>
-                </a:highlight>
-              </a:rPr>
-              <a:t>Actor</a:t>
-            </a:r>
-          </a:p>
-        </p:txBody>
-      </p:sp>
-      <p:sp>
-        <p:nvSpPr>
-          <p:cNvPr id="5" name="TextBox 4">
-            <a:extLst>
-              <a:ext uri="{FF2B5EF4-FFF2-40B4-BE49-F238E27FC236}">
-                <a16:creationId xmlns:a16="http://schemas.microsoft.com/office/drawing/2014/main" id="{F1413332-9329-48E1-9691-399D0E4F5308}"/>
-              </a:ext>
-            </a:extLst>
-          </p:cNvPr>
-          <p:cNvSpPr txBox="1"/>
-          <p:nvPr/>
-        </p:nvSpPr>
-        <p:spPr>
-          <a:xfrm>
-            <a:off x="3924301" y="3420579"/>
-            <a:ext cx="829073" cy="461665"/>
-          </a:xfrm>
-          <a:prstGeom prst="rect">
-            <a:avLst/>
-          </a:prstGeom>
-          <a:noFill/>
-        </p:spPr>
-        <p:txBody>
-          <a:bodyPr wrap="square" rtlCol="0">
-            <a:spAutoFit/>
-          </a:bodyPr>
-          <a:lstStyle/>
-          <a:p>
-            <a:r>
-              <a:rPr lang="en-US" sz="2400" dirty="0">
-                <a:highlight>
-                  <a:srgbClr val="00FF00"/>
-                </a:highlight>
-              </a:rPr>
-              <a:t>Critic</a:t>
-            </a:r>
-          </a:p>
-        </p:txBody>
-      </p:sp>
-      <p:sp>
-        <p:nvSpPr>
-          <p:cNvPr id="10" name="Callout: Bent Line 9">
-            <a:extLst>
-              <a:ext uri="{FF2B5EF4-FFF2-40B4-BE49-F238E27FC236}">
-                <a16:creationId xmlns:a16="http://schemas.microsoft.com/office/drawing/2014/main" id="{687B0AEB-A475-4C6B-85BD-5300DBFC9476}"/>
-              </a:ext>
-            </a:extLst>
-          </p:cNvPr>
-          <p:cNvSpPr/>
-          <p:nvPr/>
-        </p:nvSpPr>
-        <p:spPr>
-          <a:xfrm>
-            <a:off x="7766538" y="2416936"/>
-            <a:ext cx="3106615" cy="724849"/>
-          </a:xfrm>
-          <a:prstGeom prst="borderCallout2">
-            <a:avLst>
-              <a:gd name="adj1" fmla="val 18750"/>
-              <a:gd name="adj2" fmla="val -8333"/>
-              <a:gd name="adj3" fmla="val 18750"/>
-              <a:gd name="adj4" fmla="val -16667"/>
-              <a:gd name="adj5" fmla="val 141612"/>
-              <a:gd name="adj6" fmla="val -49120"/>
-            </a:avLst>
-          </a:prstGeom>
-          <a:solidFill>
-            <a:schemeClr val="bg1"/>
-          </a:solidFill>
-        </p:spPr>
-        <p:style>
-          <a:lnRef idx="2">
-            <a:schemeClr val="accent1">
-              <a:shade val="50000"/>
-            </a:schemeClr>
-          </a:lnRef>
-          <a:fillRef idx="1">
-            <a:schemeClr val="accent1"/>
-          </a:fillRef>
-          <a:effectRef idx="0">
-            <a:schemeClr val="accent1"/>
-          </a:effectRef>
-          <a:fontRef idx="minor">
-            <a:schemeClr val="lt1"/>
-          </a:fontRef>
-        </p:style>
-        <p:txBody>
-          <a:bodyPr rtlCol="0" anchor="ctr"/>
-          <a:lstStyle/>
-          <a:p>
-            <a:r>
-              <a:rPr lang="en-US" dirty="0">
-                <a:solidFill>
-                  <a:srgbClr val="C00000"/>
-                </a:solidFill>
-              </a:rPr>
-              <a:t>“Temporal Difference (TD) =</a:t>
-            </a:r>
-          </a:p>
-          <a:p>
-            <a:r>
-              <a:rPr lang="en-US" dirty="0">
-                <a:solidFill>
-                  <a:srgbClr val="C00000"/>
-                </a:solidFill>
-              </a:rPr>
-              <a:t>Reward prediction error</a:t>
-            </a:r>
-          </a:p>
-        </p:txBody>
-      </p:sp>
-    </p:spTree>
-    <p:extLst>
-      <p:ext uri="{BB962C8B-B14F-4D97-AF65-F5344CB8AC3E}">
-        <p14:creationId xmlns:p14="http://schemas.microsoft.com/office/powerpoint/2010/main" val="3105768420"/>
-      </p:ext>
-    </p:extLst>
-  </p:cSld>
-  <p:clrMapOvr>
-    <a:masterClrMapping/>
-  </p:clrMapOvr>
-</p:sld>
-</file>
-
 <file path=ppt/slides/slide14.xml><?xml version="1.0" encoding="utf-8"?>
-<p:sld xmlns:a="http://schemas.openxmlformats.org/drawingml/2006/main" xmlns:r="http://schemas.openxmlformats.org/officeDocument/2006/relationships" xmlns:p="http://schemas.openxmlformats.org/presentationml/2006/main">
+<p:sld xmlns:a="http://schemas.openxmlformats.org/drawingml/2006/main" xmlns:r="http://schemas.openxmlformats.org/officeDocument/2006/relationships" xmlns:p="http://schemas.openxmlformats.org/presentationml/2006/main" show="0">
   <p:cSld>
     <p:bg>
       <p:bgPr>
@@ -13156,13 +13161,13 @@
           <a:p>
             <a:r>
               <a:rPr lang="en-US" dirty="0"/>
-              <a:t>(Neuroscience)</a:t>
+              <a:t>Early work in neuroscience’s “law of effect”</a:t>
             </a:r>
           </a:p>
           <a:p>
             <a:r>
               <a:rPr lang="en-US" dirty="0"/>
-              <a:t>Samuels Checkers</a:t>
+              <a:t>Samuels Checkers player (1959)</a:t>
             </a:r>
           </a:p>
           <a:p>
@@ -13172,7 +13177,7 @@
             </a:r>
             <a:r>
               <a:rPr lang="en-US" dirty="0"/>
-              <a:t> </a:t>
+              <a:t> “TD-</a:t>
             </a:r>
             <a:r>
               <a:rPr lang="en-US" dirty="0" err="1"/>
@@ -13180,19 +13185,27 @@
             </a:r>
             <a:r>
               <a:rPr lang="en-US" dirty="0"/>
-              <a:t>? </a:t>
+              <a:t>” (1992)</a:t>
             </a:r>
           </a:p>
           <a:p>
             <a:r>
               <a:rPr lang="en-US" dirty="0"/>
-              <a:t>Google data center management</a:t>
-            </a:r>
-          </a:p>
-          <a:p>
+              <a:t>Sutton and </a:t>
+            </a:r>
+            <a:r>
+              <a:rPr lang="en-US" dirty="0" err="1"/>
+              <a:t>Barto</a:t>
+            </a:r>
             <a:r>
               <a:rPr lang="en-US" dirty="0"/>
-              <a:t>Commercial applications. Startups. </a:t>
+              <a:t> (1998).</a:t>
+            </a:r>
+          </a:p>
+          <a:p>
+            <a:r>
+              <a:rPr lang="en-US" dirty="0"/>
+              <a:t>“Deep RL” (2014)</a:t>
             </a:r>
           </a:p>
           <a:p>
@@ -13271,6 +13284,54 @@
               <a:rPr lang="en-US" sz="2800" dirty="0"/>
             </a:br>
             <a:endParaRPr lang="en-US" sz="2800" dirty="0"/>
+          </a:p>
+        </p:txBody>
+      </p:sp>
+      <p:sp>
+        <p:nvSpPr>
+          <p:cNvPr id="5" name="TextBox 4">
+            <a:extLst>
+              <a:ext uri="{FF2B5EF4-FFF2-40B4-BE49-F238E27FC236}">
+                <a16:creationId xmlns:a16="http://schemas.microsoft.com/office/drawing/2014/main" id="{D551C0EC-DFD5-42B8-A3B3-33332DC1C9E3}"/>
+              </a:ext>
+            </a:extLst>
+          </p:cNvPr>
+          <p:cNvSpPr txBox="1"/>
+          <p:nvPr/>
+        </p:nvSpPr>
+        <p:spPr>
+          <a:xfrm>
+            <a:off x="1113692" y="5380892"/>
+            <a:ext cx="7244862" cy="646331"/>
+          </a:xfrm>
+          <a:prstGeom prst="rect">
+            <a:avLst/>
+          </a:prstGeom>
+          <a:noFill/>
+        </p:spPr>
+        <p:txBody>
+          <a:bodyPr wrap="square" rtlCol="0">
+            <a:spAutoFit/>
+          </a:bodyPr>
+          <a:lstStyle/>
+          <a:p>
+            <a:r>
+              <a:rPr lang="en-US" dirty="0"/>
+              <a:t>See Andrew G. </a:t>
+            </a:r>
+            <a:r>
+              <a:rPr lang="en-US" dirty="0" err="1"/>
+              <a:t>Barto</a:t>
+            </a:r>
+            <a:r>
+              <a:rPr lang="en-US" dirty="0"/>
+              <a:t> (2019) “Reinforcement Learning: Connections, Surprises, Challenges”, </a:t>
+            </a:r>
+            <a:r>
+              <a:rPr lang="en-US" i="1" dirty="0"/>
+              <a:t>AI Magazine, vol 40:1, pp 3-16.</a:t>
+            </a:r>
+            <a:endParaRPr lang="en-US" dirty="0"/>
           </a:p>
         </p:txBody>
       </p:sp>
@@ -13348,27 +13409,176 @@
             <p:ph idx="1"/>
           </p:nvPr>
         </p:nvSpPr>
-        <p:spPr/>
-        <p:txBody>
-          <a:bodyPr/>
+        <p:spPr>
+          <a:xfrm>
+            <a:off x="838200" y="1383323"/>
+            <a:ext cx="10515600" cy="3645877"/>
+          </a:xfrm>
+        </p:spPr>
+        <p:txBody>
+          <a:bodyPr>
+            <a:normAutofit fontScale="92500"/>
+          </a:bodyPr>
           <a:lstStyle/>
           <a:p>
             <a:r>
               <a:rPr lang="en-US" dirty="0"/>
-              <a:t>Deep Mind Alpha Go – “Deep” reinforcement learning</a:t>
-            </a:r>
-          </a:p>
-          <a:p>
+              <a:t>RL’s sampling-based (“Monty-Carlo”), model-free approaches scale to environments with huge state spaces, not practical with MDP approaches. </a:t>
+            </a:r>
+          </a:p>
+          <a:p>
+            <a:r>
+              <a:rPr lang="da-DK" dirty="0"/>
+              <a:t> Notable Advances in Deep RL:</a:t>
+            </a:r>
+            <a:r>
+              <a:rPr lang="da-DK" baseline="30000" dirty="0"/>
+              <a:t>1</a:t>
+            </a:r>
+          </a:p>
+          <a:p>
+            <a:pPr lvl="1"/>
+            <a:r>
+              <a:rPr lang="da-DK" dirty="0"/>
+              <a:t>”Deep-Q Network” (DQN) (Mnih et al., 2015),  </a:t>
+            </a:r>
+            <a:r>
+              <a:rPr lang="da-DK"/>
+              <a:t>applied to video games.</a:t>
+            </a:r>
+            <a:endParaRPr lang="da-DK" dirty="0"/>
+          </a:p>
+          <a:p>
+            <a:pPr lvl="1"/>
+            <a:r>
+              <a:rPr lang="da-DK" dirty="0"/>
+              <a:t>AlphaGo (Silver et al., 2016a; 2017), used for Deep-Mind’s Go-Playing programs.</a:t>
+            </a:r>
+          </a:p>
+          <a:p>
+            <a:pPr lvl="1"/>
+            <a:r>
+              <a:rPr lang="da-DK" dirty="0"/>
+              <a:t>DeepStack (Moravˇcik et al., 2017) for imperfect information games. </a:t>
+            </a:r>
+          </a:p>
+          <a:p>
+            <a:r>
+              <a:rPr lang="da-DK" dirty="0"/>
+              <a:t> </a:t>
+            </a:r>
+            <a:r>
+              <a:rPr lang="da-DK" i="1" dirty="0"/>
+              <a:t>Deep Mind reduces Data Centre Cooling B</a:t>
+            </a:r>
+            <a:r>
+              <a:rPr lang="da-DK" i="1" dirty="0">
+                <a:hlinkClick r:id="rId2"/>
+              </a:rPr>
+              <a:t>i</a:t>
+            </a:r>
+            <a:r>
+              <a:rPr lang="da-DK" i="1" dirty="0"/>
+              <a:t>ll by 40%.</a:t>
+            </a:r>
+            <a:r>
+              <a:rPr lang="da-DK" baseline="30000" dirty="0"/>
+              <a:t>2</a:t>
+            </a:r>
+          </a:p>
+          <a:p>
+            <a:r>
+              <a:rPr lang="da-DK" dirty="0"/>
+              <a:t> </a:t>
+            </a:r>
             <a:r>
               <a:rPr lang="en-US" dirty="0"/>
-              <a:t>RL’s sampling-based (“Monty-Carlo”), model-free approaches scale to environments with huge state spaces, not practical with MDP approaches.  </a:t>
-            </a:r>
-          </a:p>
+              <a:t>Commercial applications, Startups:  </a:t>
+            </a:r>
+            <a:r>
+              <a:rPr lang="en-US" dirty="0">
+                <a:solidFill>
+                  <a:srgbClr val="0070C0"/>
+                </a:solidFill>
+              </a:rPr>
+              <a:t>http://Bons.ai</a:t>
+            </a:r>
+            <a:endParaRPr lang="en-US" dirty="0"/>
+          </a:p>
+          <a:p>
+            <a:pPr marL="0" indent="0">
+              <a:buNone/>
+            </a:pPr>
+            <a:endParaRPr lang="en-US" dirty="0"/>
+          </a:p>
+          <a:p>
+            <a:endParaRPr lang="en-US" dirty="0"/>
+          </a:p>
+        </p:txBody>
+      </p:sp>
+      <p:sp>
+        <p:nvSpPr>
+          <p:cNvPr id="5" name="TextBox 4">
+            <a:extLst>
+              <a:ext uri="{FF2B5EF4-FFF2-40B4-BE49-F238E27FC236}">
+                <a16:creationId xmlns:a16="http://schemas.microsoft.com/office/drawing/2014/main" id="{3D9AE1C7-9D09-4649-82B7-D9F7A2449C40}"/>
+              </a:ext>
+            </a:extLst>
+          </p:cNvPr>
+          <p:cNvSpPr txBox="1"/>
+          <p:nvPr/>
+        </p:nvSpPr>
+        <p:spPr>
+          <a:xfrm>
+            <a:off x="1113692" y="5380892"/>
+            <a:ext cx="7244862" cy="1754326"/>
+          </a:xfrm>
+          <a:prstGeom prst="rect">
+            <a:avLst/>
+          </a:prstGeom>
+          <a:noFill/>
+        </p:spPr>
+        <p:txBody>
+          <a:bodyPr wrap="square" rtlCol="0">
+            <a:spAutoFit/>
+          </a:bodyPr>
+          <a:lstStyle/>
           <a:p>
             <a:r>
               <a:rPr lang="en-US" dirty="0"/>
-              <a:t>(some measures of current performance)</a:t>
-            </a:r>
+              <a:t>1. </a:t>
+            </a:r>
+            <a:r>
+              <a:rPr lang="en-US" dirty="0" err="1"/>
+              <a:t>YuxiLi</a:t>
+            </a:r>
+            <a:r>
+              <a:rPr lang="en-US" dirty="0"/>
+              <a:t>(</a:t>
+            </a:r>
+            <a:r>
+              <a:rPr lang="en-US" dirty="0">
+                <a:hlinkClick r:id="rId3"/>
+              </a:rPr>
+              <a:t>yuxili@gmail.com</a:t>
+            </a:r>
+            <a:r>
+              <a:rPr lang="en-US" dirty="0"/>
+              <a:t>), “DEEP REINFORCEMENT LEARNING”, arXiv:1810.06339v1 (15 Oct 2018).</a:t>
+            </a:r>
+          </a:p>
+          <a:p>
+            <a:r>
+              <a:rPr lang="en-US" dirty="0"/>
+              <a:t>2.</a:t>
+            </a:r>
+            <a:r>
+              <a:rPr lang="en-US" dirty="0">
+                <a:hlinkClick r:id="rId2"/>
+              </a:rPr>
+              <a:t> https://deepmind.com/blog/deepmind-ai-reduces-google-data-centre-cooling-bill-40/</a:t>
+            </a:r>
+            <a:endParaRPr lang="da-DK" dirty="0"/>
           </a:p>
           <a:p>
             <a:endParaRPr lang="en-US" dirty="0"/>
@@ -13463,7 +13673,15 @@
             </a:r>
             <a:r>
               <a:rPr lang="en-US" dirty="0"/>
-              <a:t> gym</a:t>
+              <a:t>: </a:t>
+            </a:r>
+            <a:r>
+              <a:rPr lang="en-US" u="sng" dirty="0">
+                <a:solidFill>
+                  <a:srgbClr val="0070C0"/>
+                </a:solidFill>
+              </a:rPr>
+              <a:t>https://openai.com/</a:t>
             </a:r>
           </a:p>
           <a:p>
@@ -13471,12 +13689,31 @@
               <a:rPr lang="en-US" dirty="0" err="1"/>
               <a:t>Pybrain</a:t>
             </a:r>
-            <a:endParaRPr lang="en-US" dirty="0"/>
-          </a:p>
-          <a:p>
             <a:r>
               <a:rPr lang="en-US" dirty="0"/>
-              <a:t>RL-glue: https://sites.google.com/a/rl-community.org/rl-glue/Home/rl-glue </a:t>
+              <a:t>: </a:t>
+            </a:r>
+            <a:r>
+              <a:rPr lang="en-US" u="sng" dirty="0">
+                <a:solidFill>
+                  <a:srgbClr val="0070C0"/>
+                </a:solidFill>
+              </a:rPr>
+              <a:t>http://pybrain.org/</a:t>
+            </a:r>
+          </a:p>
+          <a:p>
+            <a:r>
+              <a:rPr lang="en-US" dirty="0"/>
+              <a:t>RL-glue: </a:t>
+            </a:r>
+            <a:r>
+              <a:rPr lang="en-US" u="sng" dirty="0">
+                <a:solidFill>
+                  <a:srgbClr val="0070C0"/>
+                </a:solidFill>
+              </a:rPr>
+              <a:t>https://sites.google.com/a/rl-community.org/rl-glue/Home/rl-glue </a:t>
             </a:r>
           </a:p>
           <a:p>
@@ -13486,17 +13723,35 @@
             </a:r>
             <a:r>
               <a:rPr lang="en-US" dirty="0"/>
-              <a:t>: http://code.google.com/p/libpgrl</a:t>
+              <a:t>: </a:t>
+            </a:r>
+            <a:r>
+              <a:rPr lang="en-US" u="sng" dirty="0">
+                <a:solidFill>
+                  <a:srgbClr val="0070C0"/>
+                </a:solidFill>
+              </a:rPr>
+              <a:t>http://code.google.com/p/libpgrl</a:t>
             </a:r>
           </a:p>
           <a:p>
             <a:r>
               <a:rPr lang="en-US" dirty="0"/>
-              <a:t>RISE lab </a:t>
+              <a:t>RISE lab’s </a:t>
             </a:r>
             <a:r>
               <a:rPr lang="en-US" dirty="0" err="1"/>
               <a:t>rlLib</a:t>
+            </a:r>
+            <a:r>
+              <a:rPr lang="en-US" dirty="0"/>
+              <a:t>: </a:t>
+            </a:r>
+            <a:r>
+              <a:rPr lang="en-US" dirty="0">
+                <a:hlinkClick r:id="rId2"/>
+              </a:rPr>
+              <a:t>https://rise.cs.berkeley.edu/projects/rllib/</a:t>
             </a:r>
             <a:endParaRPr lang="en-US" dirty="0"/>
           </a:p>
@@ -13560,7 +13815,7 @@
         </p:blipFill>
         <p:spPr>
           <a:xfrm>
-            <a:off x="2738442" y="0"/>
+            <a:off x="1319950" y="0"/>
             <a:ext cx="4417391" cy="6858000"/>
           </a:xfrm>
           <a:prstGeom prst="rect">
@@ -13604,7 +13859,7 @@
         </p:blipFill>
         <p:spPr>
           <a:xfrm>
-            <a:off x="7179279" y="0"/>
+            <a:off x="5737341" y="0"/>
             <a:ext cx="5018231" cy="6858000"/>
           </a:xfrm>
           <a:prstGeom prst="rect">
@@ -13629,18 +13884,20 @@
           </p:nvPr>
         </p:nvSpPr>
         <p:spPr>
-          <a:xfrm>
-            <a:off x="838199" y="365125"/>
-            <a:ext cx="1623647" cy="6223244"/>
-          </a:xfrm>
-        </p:spPr>
-        <p:txBody>
-          <a:bodyPr/>
-          <a:lstStyle/>
-          <a:p>
-            <a:r>
-              <a:rPr lang="en-US" dirty="0"/>
-              <a:t>Books</a:t>
+          <a:xfrm rot="16200000">
+            <a:off x="-5011615" y="664064"/>
+            <a:ext cx="11189677" cy="1006475"/>
+          </a:xfrm>
+        </p:spPr>
+        <p:txBody>
+          <a:bodyPr>
+            <a:normAutofit/>
+          </a:bodyPr>
+          <a:lstStyle/>
+          <a:p>
+            <a:r>
+              <a:rPr lang="en-US" sz="5400" dirty="0"/>
+              <a:t>Recommended Books</a:t>
             </a:r>
           </a:p>
         </p:txBody>
@@ -13914,6 +14171,16 @@
 <file path=ppt/slides/slide20.xml><?xml version="1.0" encoding="utf-8"?>
 <p:sld xmlns:a="http://schemas.openxmlformats.org/drawingml/2006/main" xmlns:r="http://schemas.openxmlformats.org/officeDocument/2006/relationships" xmlns:p="http://schemas.openxmlformats.org/presentationml/2006/main">
   <p:cSld>
+    <p:bg>
+      <p:bgPr>
+        <a:solidFill>
+          <a:schemeClr val="bg1">
+            <a:lumMod val="50000"/>
+          </a:schemeClr>
+        </a:solidFill>
+        <a:effectLst/>
+      </p:bgPr>
+    </p:bg>
     <p:spTree>
       <p:nvGrpSpPr>
         <p:cNvPr id="1" name=""/>
@@ -13955,7 +14222,7 @@
         </p:blipFill>
         <p:spPr>
           <a:xfrm>
-            <a:off x="6423137" y="0"/>
+            <a:off x="5778368" y="-46892"/>
             <a:ext cx="5768863" cy="6858000"/>
           </a:xfrm>
           <a:prstGeom prst="rect">
@@ -13990,7 +14257,7 @@
         </p:blipFill>
         <p:spPr>
           <a:xfrm>
-            <a:off x="1242643" y="22003"/>
+            <a:off x="597874" y="-24889"/>
             <a:ext cx="5169877" cy="6835997"/>
           </a:xfrm>
           <a:prstGeom prst="rect">
@@ -15174,15 +15441,7 @@
           <a:p>
             <a:r>
               <a:rPr lang="en-US" sz="2800" dirty="0"/>
-              <a:t>Supervised Machine Learning uses labels to learn to </a:t>
-            </a:r>
-            <a:r>
-              <a:rPr lang="en-US" sz="2800" dirty="0" err="1"/>
-              <a:t>to</a:t>
-            </a:r>
-            <a:r>
-              <a:rPr lang="en-US" sz="2800" dirty="0"/>
-              <a:t> predict from features</a:t>
+              <a:t>Supervised Machine Learning uses labels to learn to predict from features</a:t>
             </a:r>
           </a:p>
         </p:txBody>
@@ -15788,13 +16047,15 @@
           <a:p>
             <a:r>
               <a:rPr lang="en-US" sz="2800" dirty="0"/>
-              <a:t>Reinforcement Learning </a:t>
-            </a:r>
-            <a:r>
-              <a:rPr lang="en-US" sz="2800"/>
-              <a:t>computational components </a:t>
-            </a:r>
-            <a:endParaRPr lang="en-US" sz="2800" dirty="0"/>
+              <a:t>Reinforcement Learning computational components,</a:t>
+            </a:r>
+            <a:br>
+              <a:rPr lang="en-US" sz="2800" dirty="0"/>
+            </a:br>
+            <a:r>
+              <a:rPr lang="en-US" sz="2800" dirty="0"/>
+              <a:t>in comparison, includes explicit rewards &amp; actions. </a:t>
+            </a:r>
           </a:p>
         </p:txBody>
       </p:sp>
@@ -20150,14 +20411,16 @@
             <a:r>
               <a:rPr lang="en-US" dirty="0">
                 <a:solidFill>
-                  <a:srgbClr val="00B0F0"/>
+                  <a:schemeClr val="accent4">
+                    <a:lumMod val="75000"/>
+                  </a:schemeClr>
                 </a:solidFill>
               </a:rPr>
-              <a:t>Function Approximation </a:t>
+              <a:t>“Credit Assignment” </a:t>
             </a:r>
             <a:r>
               <a:rPr lang="en-US" dirty="0"/>
-              <a:t>for continuous state spaces &amp; generalization</a:t>
+              <a:t>Rewards don’t necessarily occur when actions are taken</a:t>
             </a:r>
           </a:p>
           <a:p>
@@ -20178,16 +20441,14 @@
             <a:r>
               <a:rPr lang="en-US" dirty="0">
                 <a:solidFill>
-                  <a:schemeClr val="accent4">
-                    <a:lumMod val="75000"/>
-                  </a:schemeClr>
+                  <a:srgbClr val="00B0F0"/>
                 </a:solidFill>
               </a:rPr>
-              <a:t>“Credit Assignment” </a:t>
+              <a:t>Function Approximation </a:t>
             </a:r>
             <a:r>
               <a:rPr lang="en-US" dirty="0"/>
-              <a:t>Rewards don’t necessarily occur when actions are taken</a:t>
+              <a:t>for continuous state spaces &amp; generalization</a:t>
             </a:r>
           </a:p>
           <a:p>

</xml_diff>

<commit_message>
Final: talk session changes
</commit_message>
<xml_diff>
--- a/Rlearning/RL_ICSE.pptx
+++ b/Rlearning/RL_ICSE.pptx
@@ -6,7 +6,7 @@
     <p:sldMasterId id="2147483663" r:id="rId2"/>
   </p:sldMasterIdLst>
   <p:notesMasterIdLst>
-    <p:notesMasterId r:id="rId26"/>
+    <p:notesMasterId r:id="rId25"/>
   </p:notesMasterIdLst>
   <p:sldIdLst>
     <p:sldId id="256" r:id="rId3"/>
@@ -30,8 +30,7 @@
     <p:sldId id="1825" r:id="rId21"/>
     <p:sldId id="1826" r:id="rId22"/>
     <p:sldId id="1532" r:id="rId23"/>
-    <p:sldId id="1818" r:id="rId24"/>
-    <p:sldId id="294" r:id="rId25"/>
+    <p:sldId id="294" r:id="rId24"/>
   </p:sldIdLst>
   <p:sldSz cx="12192000" cy="6858000"/>
   <p:notesSz cx="6858000" cy="9144000"/>
@@ -1395,180 +1394,6 @@
           <a:p>
             <a:r>
               <a:rPr lang="en-US" dirty="0"/>
-              <a:t>The “turtle’s eye view” of ROC curves is described here:</a:t>
-            </a:r>
-          </a:p>
-          <a:p>
-            <a:r>
-              <a:rPr lang="en-US" dirty="0"/>
-              <a:t>https://blog.revolutionanalytics.com/2016/08/roc-curves-in-two-lines-of-code.html</a:t>
-            </a:r>
-          </a:p>
-        </p:txBody>
-      </p:sp>
-      <p:sp>
-        <p:nvSpPr>
-          <p:cNvPr id="4" name="Header Placeholder 3"/>
-          <p:cNvSpPr>
-            <a:spLocks noGrp="1"/>
-          </p:cNvSpPr>
-          <p:nvPr>
-            <p:ph type="hdr" sz="quarter" idx="10"/>
-          </p:nvPr>
-        </p:nvSpPr>
-        <p:spPr/>
-        <p:txBody>
-          <a:bodyPr/>
-          <a:lstStyle/>
-          <a:p>
-            <a:endParaRPr lang="en-US" dirty="0"/>
-          </a:p>
-        </p:txBody>
-      </p:sp>
-      <p:sp>
-        <p:nvSpPr>
-          <p:cNvPr id="5" name="Footer Placeholder 4"/>
-          <p:cNvSpPr>
-            <a:spLocks noGrp="1"/>
-          </p:cNvSpPr>
-          <p:nvPr>
-            <p:ph type="ftr" sz="quarter" idx="11"/>
-          </p:nvPr>
-        </p:nvSpPr>
-        <p:spPr/>
-        <p:txBody>
-          <a:bodyPr/>
-          <a:lstStyle/>
-          <a:p>
-            <a:pPr defTabSz="914099" eaLnBrk="0" hangingPunct="0"/>
-            <a:r>
-              <a:rPr lang="en-US" sz="400" dirty="0">
-                <a:gradFill>
-                  <a:gsLst>
-                    <a:gs pos="0">
-                      <a:prstClr val="black"/>
-                    </a:gs>
-                    <a:gs pos="100000">
-                      <a:prstClr val="black"/>
-                    </a:gs>
-                  </a:gsLst>
-                  <a:lin ang="5400000" scaled="0"/>
-                </a:gradFill>
-                <a:latin typeface="Segoe UI" pitchFamily="34" charset="0"/>
-                <a:ea typeface="Segoe UI" pitchFamily="34" charset="0"/>
-                <a:cs typeface="Segoe UI" pitchFamily="34" charset="0"/>
-              </a:rPr>
-              <a:t>© Microsoft Corporation. All rights reserved. MICROSOFT MAKES NO WARRANTIES, EXPRESS, IMPLIED OR STATUTORY, AS TO THE INFORMATION IN THIS PRESENTATION.</a:t>
-            </a:r>
-          </a:p>
-        </p:txBody>
-      </p:sp>
-      <p:sp>
-        <p:nvSpPr>
-          <p:cNvPr id="6" name="Date Placeholder 5"/>
-          <p:cNvSpPr>
-            <a:spLocks noGrp="1"/>
-          </p:cNvSpPr>
-          <p:nvPr>
-            <p:ph type="dt" idx="12"/>
-          </p:nvPr>
-        </p:nvSpPr>
-        <p:spPr/>
-        <p:txBody>
-          <a:bodyPr/>
-          <a:lstStyle/>
-          <a:p>
-            <a:fld id="{9427A7F7-BB1E-479D-AFAA-B52F4D0C99F2}" type="datetime8">
-              <a:rPr lang="en-US" smtClean="0"/>
-              <a:t>5/27/2019 10:59 AM</a:t>
-            </a:fld>
-            <a:endParaRPr lang="en-US" dirty="0"/>
-          </a:p>
-        </p:txBody>
-      </p:sp>
-      <p:sp>
-        <p:nvSpPr>
-          <p:cNvPr id="7" name="Slide Number Placeholder 6"/>
-          <p:cNvSpPr>
-            <a:spLocks noGrp="1"/>
-          </p:cNvSpPr>
-          <p:nvPr>
-            <p:ph type="sldNum" sz="quarter" idx="13"/>
-          </p:nvPr>
-        </p:nvSpPr>
-        <p:spPr/>
-        <p:txBody>
-          <a:bodyPr/>
-          <a:lstStyle/>
-          <a:p>
-            <a:fld id="{B4008EB6-D09E-4580-8CD6-DDB14511944F}" type="slidenum">
-              <a:rPr lang="en-US" smtClean="0"/>
-              <a:pPr/>
-              <a:t>22</a:t>
-            </a:fld>
-            <a:endParaRPr lang="en-US" dirty="0"/>
-          </a:p>
-        </p:txBody>
-      </p:sp>
-    </p:spTree>
-    <p:extLst>
-      <p:ext uri="{BB962C8B-B14F-4D97-AF65-F5344CB8AC3E}">
-        <p14:creationId xmlns:p14="http://schemas.microsoft.com/office/powerpoint/2010/main" val="1116266893"/>
-      </p:ext>
-    </p:extLst>
-  </p:cSld>
-  <p:clrMapOvr>
-    <a:masterClrMapping/>
-  </p:clrMapOvr>
-</p:notes>
-</file>
-
-<file path=ppt/notesSlides/notesSlide4.xml><?xml version="1.0" encoding="utf-8"?>
-<p:notes xmlns:a="http://schemas.openxmlformats.org/drawingml/2006/main" xmlns:r="http://schemas.openxmlformats.org/officeDocument/2006/relationships" xmlns:p="http://schemas.openxmlformats.org/presentationml/2006/main">
-  <p:cSld>
-    <p:spTree>
-      <p:nvGrpSpPr>
-        <p:cNvPr id="1" name=""/>
-        <p:cNvGrpSpPr/>
-        <p:nvPr/>
-      </p:nvGrpSpPr>
-      <p:grpSpPr>
-        <a:xfrm>
-          <a:off x="0" y="0"/>
-          <a:ext cx="0" cy="0"/>
-          <a:chOff x="0" y="0"/>
-          <a:chExt cx="0" cy="0"/>
-        </a:xfrm>
-      </p:grpSpPr>
-      <p:sp>
-        <p:nvSpPr>
-          <p:cNvPr id="2" name="Slide Image Placeholder 1"/>
-          <p:cNvSpPr>
-            <a:spLocks noGrp="1" noRot="1" noChangeAspect="1"/>
-          </p:cNvSpPr>
-          <p:nvPr>
-            <p:ph type="sldImg"/>
-          </p:nvPr>
-        </p:nvSpPr>
-        <p:spPr/>
-      </p:sp>
-      <p:sp>
-        <p:nvSpPr>
-          <p:cNvPr id="3" name="Notes Placeholder 2"/>
-          <p:cNvSpPr>
-            <a:spLocks noGrp="1"/>
-          </p:cNvSpPr>
-          <p:nvPr>
-            <p:ph type="body" idx="1"/>
-          </p:nvPr>
-        </p:nvSpPr>
-        <p:spPr/>
-        <p:txBody>
-          <a:bodyPr/>
-          <a:lstStyle/>
-          <a:p>
-            <a:r>
-              <a:rPr lang="en-US" dirty="0"/>
               <a:t>ML code is just the little black box in the middle.</a:t>
             </a:r>
           </a:p>
@@ -1591,7 +1416,7 @@
           <a:p>
             <a:fld id="{77CBE162-B8EB-4035-9401-9F47107154AE}" type="slidenum">
               <a:rPr lang="en-US" smtClean="0"/>
-              <a:t>23</a:t>
+              <a:t>22</a:t>
             </a:fld>
             <a:endParaRPr lang="en-US"/>
           </a:p>
@@ -2583,146 +2408,6 @@
 </file>
 
 <file path=ppt/slideLayouts/slideLayout14.xml><?xml version="1.0" encoding="utf-8"?>
-<p:sldLayout xmlns:a="http://schemas.openxmlformats.org/drawingml/2006/main" xmlns:r="http://schemas.openxmlformats.org/officeDocument/2006/relationships" xmlns:p="http://schemas.openxmlformats.org/presentationml/2006/main" userDrawn="1">
-  <p:cSld name="1_Title and Content">
-    <p:spTree>
-      <p:nvGrpSpPr>
-        <p:cNvPr id="1" name=""/>
-        <p:cNvGrpSpPr/>
-        <p:nvPr/>
-      </p:nvGrpSpPr>
-      <p:grpSpPr>
-        <a:xfrm>
-          <a:off x="0" y="0"/>
-          <a:ext cx="0" cy="0"/>
-          <a:chOff x="0" y="0"/>
-          <a:chExt cx="0" cy="0"/>
-        </a:xfrm>
-      </p:grpSpPr>
-      <p:sp>
-        <p:nvSpPr>
-          <p:cNvPr id="2" name="Title 1">
-            <a:extLst>
-              <a:ext uri="{FF2B5EF4-FFF2-40B4-BE49-F238E27FC236}">
-                <a16:creationId xmlns:a16="http://schemas.microsoft.com/office/drawing/2014/main" id="{22FCFEFD-88E5-4869-B5C3-1611B0B50E15}"/>
-              </a:ext>
-            </a:extLst>
-          </p:cNvPr>
-          <p:cNvSpPr>
-            <a:spLocks noGrp="1"/>
-          </p:cNvSpPr>
-          <p:nvPr>
-            <p:ph type="title"/>
-          </p:nvPr>
-        </p:nvSpPr>
-        <p:spPr/>
-        <p:txBody>
-          <a:bodyPr/>
-          <a:lstStyle/>
-          <a:p>
-            <a:r>
-              <a:rPr lang="en-US"/>
-              <a:t>Click to edit Master title style</a:t>
-            </a:r>
-            <a:endParaRPr lang="en-US" dirty="0"/>
-          </a:p>
-        </p:txBody>
-      </p:sp>
-      <p:sp>
-        <p:nvSpPr>
-          <p:cNvPr id="3" name="Text Placeholder 2"/>
-          <p:cNvSpPr>
-            <a:spLocks noGrp="1"/>
-          </p:cNvSpPr>
-          <p:nvPr>
-            <p:ph type="body" sz="quarter" idx="10"/>
-          </p:nvPr>
-        </p:nvSpPr>
-        <p:spPr>
-          <a:xfrm>
-            <a:off x="584200" y="1435497"/>
-            <a:ext cx="11018520" cy="2308324"/>
-          </a:xfrm>
-        </p:spPr>
-        <p:txBody>
-          <a:bodyPr/>
-          <a:lstStyle/>
-          <a:p>
-            <a:pPr lvl="0"/>
-            <a:r>
-              <a:rPr lang="en-US"/>
-              <a:t>Edit Master text styles</a:t>
-            </a:r>
-          </a:p>
-          <a:p>
-            <a:pPr lvl="1"/>
-            <a:r>
-              <a:rPr lang="en-US"/>
-              <a:t>Second level</a:t>
-            </a:r>
-          </a:p>
-          <a:p>
-            <a:pPr lvl="2"/>
-            <a:r>
-              <a:rPr lang="en-US"/>
-              <a:t>Third level</a:t>
-            </a:r>
-          </a:p>
-          <a:p>
-            <a:pPr lvl="3"/>
-            <a:r>
-              <a:rPr lang="en-US"/>
-              <a:t>Fourth level</a:t>
-            </a:r>
-          </a:p>
-          <a:p>
-            <a:pPr lvl="4"/>
-            <a:r>
-              <a:rPr lang="en-US"/>
-              <a:t>Fifth level</a:t>
-            </a:r>
-            <a:endParaRPr lang="en-US" dirty="0"/>
-          </a:p>
-        </p:txBody>
-      </p:sp>
-    </p:spTree>
-    <p:extLst>
-      <p:ext uri="{BB962C8B-B14F-4D97-AF65-F5344CB8AC3E}">
-        <p14:creationId xmlns:p14="http://schemas.microsoft.com/office/powerpoint/2010/main" val="1113482933"/>
-      </p:ext>
-    </p:extLst>
-  </p:cSld>
-  <p:clrMapOvr>
-    <a:masterClrMapping/>
-  </p:clrMapOvr>
-  <p:transition>
-    <p:fade/>
-  </p:transition>
-  <p:extLst>
-    <p:ext uri="{DCECCB84-F9BA-43D5-87BE-67443E8EF086}">
-      <p15:sldGuideLst xmlns:p15="http://schemas.microsoft.com/office/powerpoint/2012/main">
-        <p15:guide id="2" orient="horz" pos="1272">
-          <p15:clr>
-            <a:srgbClr val="5ACBF0"/>
-          </p15:clr>
-        </p15:guide>
-        <p15:guide id="3" orient="horz" pos="288">
-          <p15:clr>
-            <a:srgbClr val="5ACBF0"/>
-          </p15:clr>
-        </p15:guide>
-        <p15:guide id="5" orient="horz" pos="904">
-          <p15:clr>
-            <a:srgbClr val="5ACBF0"/>
-          </p15:clr>
-        </p15:guide>
-      </p15:sldGuideLst>
-    </p:ext>
-  </p:extLst>
-</p:sldLayout>
-</file>
-
-<file path=ppt/slideLayouts/slideLayout15.xml><?xml version="1.0" encoding="utf-8"?>
 <p:sldLayout xmlns:a="http://schemas.openxmlformats.org/drawingml/2006/main" xmlns:r="http://schemas.openxmlformats.org/officeDocument/2006/relationships" xmlns:p="http://schemas.openxmlformats.org/presentationml/2006/main" type="title" preserve="1">
   <p:cSld name="Title Slide">
     <p:spTree>
@@ -2963,7 +2648,7 @@
 </p:sldLayout>
 </file>
 
-<file path=ppt/slideLayouts/slideLayout16.xml><?xml version="1.0" encoding="utf-8"?>
+<file path=ppt/slideLayouts/slideLayout15.xml><?xml version="1.0" encoding="utf-8"?>
 <p:sldLayout xmlns:a="http://schemas.openxmlformats.org/drawingml/2006/main" xmlns:r="http://schemas.openxmlformats.org/officeDocument/2006/relationships" xmlns:p="http://schemas.openxmlformats.org/presentationml/2006/main" type="obj" preserve="1">
   <p:cSld name="Title and Content">
     <p:spTree>
@@ -3164,7 +2849,7 @@
 </p:sldLayout>
 </file>
 
-<file path=ppt/slideLayouts/slideLayout17.xml><?xml version="1.0" encoding="utf-8"?>
+<file path=ppt/slideLayouts/slideLayout16.xml><?xml version="1.0" encoding="utf-8"?>
 <p:sldLayout xmlns:a="http://schemas.openxmlformats.org/drawingml/2006/main" xmlns:r="http://schemas.openxmlformats.org/officeDocument/2006/relationships" xmlns:p="http://schemas.openxmlformats.org/presentationml/2006/main" type="secHead" preserve="1">
   <p:cSld name="Section Header">
     <p:spTree>
@@ -3443,7 +3128,7 @@
 </p:sldLayout>
 </file>
 
-<file path=ppt/slideLayouts/slideLayout18.xml><?xml version="1.0" encoding="utf-8"?>
+<file path=ppt/slideLayouts/slideLayout17.xml><?xml version="1.0" encoding="utf-8"?>
 <p:sldLayout xmlns:a="http://schemas.openxmlformats.org/drawingml/2006/main" xmlns:r="http://schemas.openxmlformats.org/officeDocument/2006/relationships" xmlns:p="http://schemas.openxmlformats.org/presentationml/2006/main" type="twoObj" preserve="1">
   <p:cSld name="Two Content">
     <p:spTree>
@@ -3711,7 +3396,7 @@
 </p:sldLayout>
 </file>
 
-<file path=ppt/slideLayouts/slideLayout19.xml><?xml version="1.0" encoding="utf-8"?>
+<file path=ppt/slideLayouts/slideLayout18.xml><?xml version="1.0" encoding="utf-8"?>
 <p:sldLayout xmlns:a="http://schemas.openxmlformats.org/drawingml/2006/main" xmlns:r="http://schemas.openxmlformats.org/officeDocument/2006/relationships" xmlns:p="http://schemas.openxmlformats.org/presentationml/2006/main" type="twoTxTwoObj" preserve="1">
   <p:cSld name="Comparison">
     <p:spTree>
@@ -4127,205 +3812,7 @@
 </p:sldLayout>
 </file>
 
-<file path=ppt/slideLayouts/slideLayout2.xml><?xml version="1.0" encoding="utf-8"?>
-<p:sldLayout xmlns:a="http://schemas.openxmlformats.org/drawingml/2006/main" xmlns:r="http://schemas.openxmlformats.org/officeDocument/2006/relationships" xmlns:p="http://schemas.openxmlformats.org/presentationml/2006/main" type="obj" preserve="1">
-  <p:cSld name="Title and Content">
-    <p:spTree>
-      <p:nvGrpSpPr>
-        <p:cNvPr id="1" name=""/>
-        <p:cNvGrpSpPr/>
-        <p:nvPr/>
-      </p:nvGrpSpPr>
-      <p:grpSpPr>
-        <a:xfrm>
-          <a:off x="0" y="0"/>
-          <a:ext cx="0" cy="0"/>
-          <a:chOff x="0" y="0"/>
-          <a:chExt cx="0" cy="0"/>
-        </a:xfrm>
-      </p:grpSpPr>
-      <p:sp>
-        <p:nvSpPr>
-          <p:cNvPr id="2" name="Title 1">
-            <a:extLst>
-              <a:ext uri="{FF2B5EF4-FFF2-40B4-BE49-F238E27FC236}">
-                <a16:creationId xmlns:a16="http://schemas.microsoft.com/office/drawing/2014/main" id="{C51BA702-ECCD-485C-AD90-C335C18DC462}"/>
-              </a:ext>
-            </a:extLst>
-          </p:cNvPr>
-          <p:cNvSpPr>
-            <a:spLocks noGrp="1"/>
-          </p:cNvSpPr>
-          <p:nvPr>
-            <p:ph type="title"/>
-          </p:nvPr>
-        </p:nvSpPr>
-        <p:spPr/>
-        <p:txBody>
-          <a:bodyPr/>
-          <a:lstStyle/>
-          <a:p>
-            <a:r>
-              <a:rPr lang="en-US"/>
-              <a:t>Click to edit Master title style</a:t>
-            </a:r>
-          </a:p>
-        </p:txBody>
-      </p:sp>
-      <p:sp>
-        <p:nvSpPr>
-          <p:cNvPr id="3" name="Content Placeholder 2">
-            <a:extLst>
-              <a:ext uri="{FF2B5EF4-FFF2-40B4-BE49-F238E27FC236}">
-                <a16:creationId xmlns:a16="http://schemas.microsoft.com/office/drawing/2014/main" id="{04BA295F-F146-4722-B7DC-454D31DB20CE}"/>
-              </a:ext>
-            </a:extLst>
-          </p:cNvPr>
-          <p:cNvSpPr>
-            <a:spLocks noGrp="1"/>
-          </p:cNvSpPr>
-          <p:nvPr>
-            <p:ph idx="1"/>
-          </p:nvPr>
-        </p:nvSpPr>
-        <p:spPr/>
-        <p:txBody>
-          <a:bodyPr/>
-          <a:lstStyle/>
-          <a:p>
-            <a:pPr lvl="0"/>
-            <a:r>
-              <a:rPr lang="en-US"/>
-              <a:t>Click to edit Master text styles</a:t>
-            </a:r>
-          </a:p>
-          <a:p>
-            <a:pPr lvl="1"/>
-            <a:r>
-              <a:rPr lang="en-US"/>
-              <a:t>Second level</a:t>
-            </a:r>
-          </a:p>
-          <a:p>
-            <a:pPr lvl="2"/>
-            <a:r>
-              <a:rPr lang="en-US"/>
-              <a:t>Third level</a:t>
-            </a:r>
-          </a:p>
-          <a:p>
-            <a:pPr lvl="3"/>
-            <a:r>
-              <a:rPr lang="en-US"/>
-              <a:t>Fourth level</a:t>
-            </a:r>
-          </a:p>
-          <a:p>
-            <a:pPr lvl="4"/>
-            <a:r>
-              <a:rPr lang="en-US"/>
-              <a:t>Fifth level</a:t>
-            </a:r>
-          </a:p>
-        </p:txBody>
-      </p:sp>
-      <p:sp>
-        <p:nvSpPr>
-          <p:cNvPr id="4" name="Date Placeholder 3">
-            <a:extLst>
-              <a:ext uri="{FF2B5EF4-FFF2-40B4-BE49-F238E27FC236}">
-                <a16:creationId xmlns:a16="http://schemas.microsoft.com/office/drawing/2014/main" id="{0B81160B-3B25-4237-A790-C1BE71D2F51D}"/>
-              </a:ext>
-            </a:extLst>
-          </p:cNvPr>
-          <p:cNvSpPr>
-            <a:spLocks noGrp="1"/>
-          </p:cNvSpPr>
-          <p:nvPr>
-            <p:ph type="dt" sz="half" idx="10"/>
-          </p:nvPr>
-        </p:nvSpPr>
-        <p:spPr/>
-        <p:txBody>
-          <a:bodyPr/>
-          <a:lstStyle/>
-          <a:p>
-            <a:fld id="{2FC94C11-1D8C-4CD4-9951-2FEE5D70BA6C}" type="datetimeFigureOut">
-              <a:rPr lang="en-US" smtClean="0"/>
-              <a:t>5/27/2019</a:t>
-            </a:fld>
-            <a:endParaRPr lang="en-US"/>
-          </a:p>
-        </p:txBody>
-      </p:sp>
-      <p:sp>
-        <p:nvSpPr>
-          <p:cNvPr id="5" name="Footer Placeholder 4">
-            <a:extLst>
-              <a:ext uri="{FF2B5EF4-FFF2-40B4-BE49-F238E27FC236}">
-                <a16:creationId xmlns:a16="http://schemas.microsoft.com/office/drawing/2014/main" id="{5433E5E7-26D2-404C-9B02-A4D066B9886E}"/>
-              </a:ext>
-            </a:extLst>
-          </p:cNvPr>
-          <p:cNvSpPr>
-            <a:spLocks noGrp="1"/>
-          </p:cNvSpPr>
-          <p:nvPr>
-            <p:ph type="ftr" sz="quarter" idx="11"/>
-          </p:nvPr>
-        </p:nvSpPr>
-        <p:spPr/>
-        <p:txBody>
-          <a:bodyPr/>
-          <a:lstStyle/>
-          <a:p>
-            <a:endParaRPr lang="en-US"/>
-          </a:p>
-        </p:txBody>
-      </p:sp>
-      <p:sp>
-        <p:nvSpPr>
-          <p:cNvPr id="6" name="Slide Number Placeholder 5">
-            <a:extLst>
-              <a:ext uri="{FF2B5EF4-FFF2-40B4-BE49-F238E27FC236}">
-                <a16:creationId xmlns:a16="http://schemas.microsoft.com/office/drawing/2014/main" id="{FDAFCDB7-7E1D-4798-8A32-4F9E1DA007A2}"/>
-              </a:ext>
-            </a:extLst>
-          </p:cNvPr>
-          <p:cNvSpPr>
-            <a:spLocks noGrp="1"/>
-          </p:cNvSpPr>
-          <p:nvPr>
-            <p:ph type="sldNum" sz="quarter" idx="12"/>
-          </p:nvPr>
-        </p:nvSpPr>
-        <p:spPr/>
-        <p:txBody>
-          <a:bodyPr/>
-          <a:lstStyle/>
-          <a:p>
-            <a:fld id="{5B641AE3-4CA6-475B-88F6-2D02D8DC710E}" type="slidenum">
-              <a:rPr lang="en-US" smtClean="0"/>
-              <a:t>‹#›</a:t>
-            </a:fld>
-            <a:endParaRPr lang="en-US"/>
-          </a:p>
-        </p:txBody>
-      </p:sp>
-    </p:spTree>
-    <p:extLst>
-      <p:ext uri="{BB962C8B-B14F-4D97-AF65-F5344CB8AC3E}">
-        <p14:creationId xmlns:p14="http://schemas.microsoft.com/office/powerpoint/2010/main" val="1085607001"/>
-      </p:ext>
-    </p:extLst>
-  </p:cSld>
-  <p:clrMapOvr>
-    <a:masterClrMapping/>
-  </p:clrMapOvr>
-</p:sldLayout>
-</file>
-
-<file path=ppt/slideLayouts/slideLayout20.xml><?xml version="1.0" encoding="utf-8"?>
+<file path=ppt/slideLayouts/slideLayout19.xml><?xml version="1.0" encoding="utf-8"?>
 <p:sldLayout xmlns:a="http://schemas.openxmlformats.org/drawingml/2006/main" xmlns:r="http://schemas.openxmlformats.org/officeDocument/2006/relationships" xmlns:p="http://schemas.openxmlformats.org/presentationml/2006/main" type="titleOnly" preserve="1">
   <p:cSld name="Title Only">
     <p:spTree>
@@ -4474,7 +3961,205 @@
 </p:sldLayout>
 </file>
 
-<file path=ppt/slideLayouts/slideLayout21.xml><?xml version="1.0" encoding="utf-8"?>
+<file path=ppt/slideLayouts/slideLayout2.xml><?xml version="1.0" encoding="utf-8"?>
+<p:sldLayout xmlns:a="http://schemas.openxmlformats.org/drawingml/2006/main" xmlns:r="http://schemas.openxmlformats.org/officeDocument/2006/relationships" xmlns:p="http://schemas.openxmlformats.org/presentationml/2006/main" type="obj" preserve="1">
+  <p:cSld name="Title and Content">
+    <p:spTree>
+      <p:nvGrpSpPr>
+        <p:cNvPr id="1" name=""/>
+        <p:cNvGrpSpPr/>
+        <p:nvPr/>
+      </p:nvGrpSpPr>
+      <p:grpSpPr>
+        <a:xfrm>
+          <a:off x="0" y="0"/>
+          <a:ext cx="0" cy="0"/>
+          <a:chOff x="0" y="0"/>
+          <a:chExt cx="0" cy="0"/>
+        </a:xfrm>
+      </p:grpSpPr>
+      <p:sp>
+        <p:nvSpPr>
+          <p:cNvPr id="2" name="Title 1">
+            <a:extLst>
+              <a:ext uri="{FF2B5EF4-FFF2-40B4-BE49-F238E27FC236}">
+                <a16:creationId xmlns:a16="http://schemas.microsoft.com/office/drawing/2014/main" id="{C51BA702-ECCD-485C-AD90-C335C18DC462}"/>
+              </a:ext>
+            </a:extLst>
+          </p:cNvPr>
+          <p:cNvSpPr>
+            <a:spLocks noGrp="1"/>
+          </p:cNvSpPr>
+          <p:nvPr>
+            <p:ph type="title"/>
+          </p:nvPr>
+        </p:nvSpPr>
+        <p:spPr/>
+        <p:txBody>
+          <a:bodyPr/>
+          <a:lstStyle/>
+          <a:p>
+            <a:r>
+              <a:rPr lang="en-US"/>
+              <a:t>Click to edit Master title style</a:t>
+            </a:r>
+          </a:p>
+        </p:txBody>
+      </p:sp>
+      <p:sp>
+        <p:nvSpPr>
+          <p:cNvPr id="3" name="Content Placeholder 2">
+            <a:extLst>
+              <a:ext uri="{FF2B5EF4-FFF2-40B4-BE49-F238E27FC236}">
+                <a16:creationId xmlns:a16="http://schemas.microsoft.com/office/drawing/2014/main" id="{04BA295F-F146-4722-B7DC-454D31DB20CE}"/>
+              </a:ext>
+            </a:extLst>
+          </p:cNvPr>
+          <p:cNvSpPr>
+            <a:spLocks noGrp="1"/>
+          </p:cNvSpPr>
+          <p:nvPr>
+            <p:ph idx="1"/>
+          </p:nvPr>
+        </p:nvSpPr>
+        <p:spPr/>
+        <p:txBody>
+          <a:bodyPr/>
+          <a:lstStyle/>
+          <a:p>
+            <a:pPr lvl="0"/>
+            <a:r>
+              <a:rPr lang="en-US"/>
+              <a:t>Click to edit Master text styles</a:t>
+            </a:r>
+          </a:p>
+          <a:p>
+            <a:pPr lvl="1"/>
+            <a:r>
+              <a:rPr lang="en-US"/>
+              <a:t>Second level</a:t>
+            </a:r>
+          </a:p>
+          <a:p>
+            <a:pPr lvl="2"/>
+            <a:r>
+              <a:rPr lang="en-US"/>
+              <a:t>Third level</a:t>
+            </a:r>
+          </a:p>
+          <a:p>
+            <a:pPr lvl="3"/>
+            <a:r>
+              <a:rPr lang="en-US"/>
+              <a:t>Fourth level</a:t>
+            </a:r>
+          </a:p>
+          <a:p>
+            <a:pPr lvl="4"/>
+            <a:r>
+              <a:rPr lang="en-US"/>
+              <a:t>Fifth level</a:t>
+            </a:r>
+          </a:p>
+        </p:txBody>
+      </p:sp>
+      <p:sp>
+        <p:nvSpPr>
+          <p:cNvPr id="4" name="Date Placeholder 3">
+            <a:extLst>
+              <a:ext uri="{FF2B5EF4-FFF2-40B4-BE49-F238E27FC236}">
+                <a16:creationId xmlns:a16="http://schemas.microsoft.com/office/drawing/2014/main" id="{0B81160B-3B25-4237-A790-C1BE71D2F51D}"/>
+              </a:ext>
+            </a:extLst>
+          </p:cNvPr>
+          <p:cNvSpPr>
+            <a:spLocks noGrp="1"/>
+          </p:cNvSpPr>
+          <p:nvPr>
+            <p:ph type="dt" sz="half" idx="10"/>
+          </p:nvPr>
+        </p:nvSpPr>
+        <p:spPr/>
+        <p:txBody>
+          <a:bodyPr/>
+          <a:lstStyle/>
+          <a:p>
+            <a:fld id="{2FC94C11-1D8C-4CD4-9951-2FEE5D70BA6C}" type="datetimeFigureOut">
+              <a:rPr lang="en-US" smtClean="0"/>
+              <a:t>5/27/2019</a:t>
+            </a:fld>
+            <a:endParaRPr lang="en-US"/>
+          </a:p>
+        </p:txBody>
+      </p:sp>
+      <p:sp>
+        <p:nvSpPr>
+          <p:cNvPr id="5" name="Footer Placeholder 4">
+            <a:extLst>
+              <a:ext uri="{FF2B5EF4-FFF2-40B4-BE49-F238E27FC236}">
+                <a16:creationId xmlns:a16="http://schemas.microsoft.com/office/drawing/2014/main" id="{5433E5E7-26D2-404C-9B02-A4D066B9886E}"/>
+              </a:ext>
+            </a:extLst>
+          </p:cNvPr>
+          <p:cNvSpPr>
+            <a:spLocks noGrp="1"/>
+          </p:cNvSpPr>
+          <p:nvPr>
+            <p:ph type="ftr" sz="quarter" idx="11"/>
+          </p:nvPr>
+        </p:nvSpPr>
+        <p:spPr/>
+        <p:txBody>
+          <a:bodyPr/>
+          <a:lstStyle/>
+          <a:p>
+            <a:endParaRPr lang="en-US"/>
+          </a:p>
+        </p:txBody>
+      </p:sp>
+      <p:sp>
+        <p:nvSpPr>
+          <p:cNvPr id="6" name="Slide Number Placeholder 5">
+            <a:extLst>
+              <a:ext uri="{FF2B5EF4-FFF2-40B4-BE49-F238E27FC236}">
+                <a16:creationId xmlns:a16="http://schemas.microsoft.com/office/drawing/2014/main" id="{FDAFCDB7-7E1D-4798-8A32-4F9E1DA007A2}"/>
+              </a:ext>
+            </a:extLst>
+          </p:cNvPr>
+          <p:cNvSpPr>
+            <a:spLocks noGrp="1"/>
+          </p:cNvSpPr>
+          <p:nvPr>
+            <p:ph type="sldNum" sz="quarter" idx="12"/>
+          </p:nvPr>
+        </p:nvSpPr>
+        <p:spPr/>
+        <p:txBody>
+          <a:bodyPr/>
+          <a:lstStyle/>
+          <a:p>
+            <a:fld id="{5B641AE3-4CA6-475B-88F6-2D02D8DC710E}" type="slidenum">
+              <a:rPr lang="en-US" smtClean="0"/>
+              <a:t>‹#›</a:t>
+            </a:fld>
+            <a:endParaRPr lang="en-US"/>
+          </a:p>
+        </p:txBody>
+      </p:sp>
+    </p:spTree>
+    <p:extLst>
+      <p:ext uri="{BB962C8B-B14F-4D97-AF65-F5344CB8AC3E}">
+        <p14:creationId xmlns:p14="http://schemas.microsoft.com/office/powerpoint/2010/main" val="1085607001"/>
+      </p:ext>
+    </p:extLst>
+  </p:cSld>
+  <p:clrMapOvr>
+    <a:masterClrMapping/>
+  </p:clrMapOvr>
+</p:sldLayout>
+</file>
+
+<file path=ppt/slideLayouts/slideLayout20.xml><?xml version="1.0" encoding="utf-8"?>
 <p:sldLayout xmlns:a="http://schemas.openxmlformats.org/drawingml/2006/main" xmlns:r="http://schemas.openxmlformats.org/officeDocument/2006/relationships" xmlns:p="http://schemas.openxmlformats.org/presentationml/2006/main" type="blank" preserve="1">
   <p:cSld name="Blank">
     <p:spTree>
@@ -4569,7 +4254,7 @@
 </p:sldLayout>
 </file>
 
-<file path=ppt/slideLayouts/slideLayout22.xml><?xml version="1.0" encoding="utf-8"?>
+<file path=ppt/slideLayouts/slideLayout21.xml><?xml version="1.0" encoding="utf-8"?>
 <p:sldLayout xmlns:a="http://schemas.openxmlformats.org/drawingml/2006/main" xmlns:r="http://schemas.openxmlformats.org/officeDocument/2006/relationships" xmlns:p="http://schemas.openxmlformats.org/presentationml/2006/main" type="objTx" preserve="1">
   <p:cSld name="Content with Caption">
     <p:spTree>
@@ -4851,7 +4536,7 @@
 </p:sldLayout>
 </file>
 
-<file path=ppt/slideLayouts/slideLayout23.xml><?xml version="1.0" encoding="utf-8"?>
+<file path=ppt/slideLayouts/slideLayout22.xml><?xml version="1.0" encoding="utf-8"?>
 <p:sldLayout xmlns:a="http://schemas.openxmlformats.org/drawingml/2006/main" xmlns:r="http://schemas.openxmlformats.org/officeDocument/2006/relationships" xmlns:p="http://schemas.openxmlformats.org/presentationml/2006/main" type="picTx" preserve="1">
   <p:cSld name="Picture with Caption">
     <p:spTree>
@@ -5301,7 +4986,7 @@
 </p:sldLayout>
 </file>
 
-<file path=ppt/slideLayouts/slideLayout24.xml><?xml version="1.0" encoding="utf-8"?>
+<file path=ppt/slideLayouts/slideLayout23.xml><?xml version="1.0" encoding="utf-8"?>
 <p:sldLayout xmlns:a="http://schemas.openxmlformats.org/drawingml/2006/main" xmlns:r="http://schemas.openxmlformats.org/officeDocument/2006/relationships" xmlns:p="http://schemas.openxmlformats.org/presentationml/2006/main" type="vertTx" preserve="1">
   <p:cSld name="Title and Vertical Text">
     <p:spTree>
@@ -5502,7 +5187,7 @@
 </p:sldLayout>
 </file>
 
-<file path=ppt/slideLayouts/slideLayout25.xml><?xml version="1.0" encoding="utf-8"?>
+<file path=ppt/slideLayouts/slideLayout24.xml><?xml version="1.0" encoding="utf-8"?>
 <p:sldLayout xmlns:a="http://schemas.openxmlformats.org/drawingml/2006/main" xmlns:r="http://schemas.openxmlformats.org/officeDocument/2006/relationships" xmlns:p="http://schemas.openxmlformats.org/presentationml/2006/main" type="vertTitleAndTx" preserve="1">
   <p:cSld name="Vertical Title and Text">
     <p:spTree>
@@ -7808,7 +7493,6 @@
     <p:sldLayoutId id="2147483659" r:id="rId11"/>
     <p:sldLayoutId id="2147483660" r:id="rId12"/>
     <p:sldLayoutId id="2147483661" r:id="rId13"/>
-    <p:sldLayoutId id="2147483662" r:id="rId14"/>
   </p:sldLayoutIdLst>
   <p:txStyles>
     <p:titleStyle>
@@ -13417,7 +13101,7 @@
         </p:spPr>
         <p:txBody>
           <a:bodyPr>
-            <a:normAutofit fontScale="92500"/>
+            <a:normAutofit fontScale="92500" lnSpcReduction="10000"/>
           </a:bodyPr>
           <a:lstStyle/>
           <a:p>
@@ -13440,13 +13124,8 @@
             <a:pPr lvl="1"/>
             <a:r>
               <a:rPr lang="da-DK" dirty="0"/>
-              <a:t>”Deep-Q Network” (DQN) (Mnih et al., 2015),  </a:t>
-            </a:r>
-            <a:r>
-              <a:rPr lang="da-DK"/>
-              <a:t>applied to video games.</a:t>
-            </a:r>
-            <a:endParaRPr lang="da-DK" dirty="0"/>
+              <a:t>”Deep-Q Network” (DQN) (Mnih et al., 2015),  applied to video games.</a:t>
+            </a:r>
           </a:p>
           <a:p>
             <a:pPr lvl="1"/>
@@ -13489,21 +13168,31 @@
           <a:p>
             <a:r>
               <a:rPr lang="da-DK" dirty="0"/>
-              <a:t> </a:t>
-            </a:r>
+              <a:t> Simulated robot motion, see </a:t>
+            </a:r>
+            <a:r>
+              <a:rPr lang="da-DK" u="sng" dirty="0">
+                <a:solidFill>
+                  <a:srgbClr val="0070C0"/>
+                </a:solidFill>
+              </a:rPr>
+              <a:t>https://youtu.be/gn4nRCC9TwQ</a:t>
+            </a:r>
+          </a:p>
+          <a:p>
             <a:r>
               <a:rPr lang="en-US" dirty="0"/>
               <a:t>Commercial applications, Startups:  </a:t>
             </a:r>
             <a:r>
-              <a:rPr lang="en-US" dirty="0">
+              <a:rPr lang="en-US" u="sng" dirty="0">
                 <a:solidFill>
                   <a:srgbClr val="0070C0"/>
                 </a:solidFill>
               </a:rPr>
               <a:t>http://Bons.ai</a:t>
             </a:r>
-            <a:endParaRPr lang="en-US" dirty="0"/>
+            <a:endParaRPr lang="en-US" u="sng" dirty="0"/>
           </a:p>
           <a:p>
             <a:pPr marL="0" indent="0">
@@ -13961,7 +13650,11 @@
           <a:lstStyle/>
           <a:p>
             <a:r>
-              <a:rPr lang="en-US" sz="2800" dirty="0"/>
+              <a:rPr lang="en-US" sz="2800" i="1" dirty="0">
+                <a:solidFill>
+                  <a:srgbClr val="C00000"/>
+                </a:solidFill>
+              </a:rPr>
               <a:t>Goal: Introduce you to the flourishing field of Reinforcement Learning</a:t>
             </a:r>
           </a:p>
@@ -13991,22 +13684,38 @@
           <a:lstStyle/>
           <a:p>
             <a:r>
-              <a:rPr lang="en-US" sz="2400" dirty="0"/>
+              <a:rPr lang="en-US" sz="2400" dirty="0">
+                <a:solidFill>
+                  <a:srgbClr val="7030A0"/>
+                </a:solidFill>
+              </a:rPr>
               <a:t>Current excitement: </a:t>
             </a:r>
           </a:p>
           <a:p>
             <a:pPr lvl="1"/>
             <a:r>
-              <a:rPr lang="en-US" sz="2000" dirty="0"/>
+              <a:rPr lang="en-US" sz="2000" dirty="0">
+                <a:solidFill>
+                  <a:srgbClr val="7030A0"/>
+                </a:solidFill>
+              </a:rPr>
               <a:t>Deep Mind’s </a:t>
             </a:r>
             <a:r>
-              <a:rPr lang="en-US" sz="2000" i="1" dirty="0"/>
+              <a:rPr lang="en-US" sz="2000" i="1" dirty="0">
+                <a:solidFill>
+                  <a:srgbClr val="7030A0"/>
+                </a:solidFill>
+              </a:rPr>
               <a:t>Alpha-Go</a:t>
             </a:r>
             <a:r>
-              <a:rPr lang="en-US" sz="2000" dirty="0"/>
+              <a:rPr lang="en-US" sz="2000" dirty="0">
+                <a:solidFill>
+                  <a:srgbClr val="7030A0"/>
+                </a:solidFill>
+              </a:rPr>
               <a:t> success</a:t>
             </a:r>
           </a:p>
@@ -14020,7 +13729,7 @@
             <a:pPr lvl="1"/>
             <a:r>
               <a:rPr lang="en-US" sz="2000" dirty="0"/>
-              <a:t>RL compared to Supervised Learning</a:t>
+              <a:t>RL compared to Supervised Machine Learning</a:t>
             </a:r>
           </a:p>
           <a:p>
@@ -14152,6 +13861,41 @@
           </a:p>
           <a:p>
             <a:endParaRPr lang="en-US" dirty="0"/>
+          </a:p>
+        </p:txBody>
+      </p:sp>
+      <p:sp>
+        <p:nvSpPr>
+          <p:cNvPr id="5" name="TextBox 4">
+            <a:extLst>
+              <a:ext uri="{FF2B5EF4-FFF2-40B4-BE49-F238E27FC236}">
+                <a16:creationId xmlns:a16="http://schemas.microsoft.com/office/drawing/2014/main" id="{BB5FE861-6FB8-4ACF-B5B0-63E9E3C1C9E0}"/>
+              </a:ext>
+            </a:extLst>
+          </p:cNvPr>
+          <p:cNvSpPr txBox="1"/>
+          <p:nvPr/>
+        </p:nvSpPr>
+        <p:spPr>
+          <a:xfrm flipH="1">
+            <a:off x="1309467" y="5992297"/>
+            <a:ext cx="9573066" cy="369332"/>
+          </a:xfrm>
+          <a:prstGeom prst="rect">
+            <a:avLst/>
+          </a:prstGeom>
+          <a:noFill/>
+        </p:spPr>
+        <p:txBody>
+          <a:bodyPr wrap="square" rtlCol="0">
+            <a:spAutoFit/>
+          </a:bodyPr>
+          <a:lstStyle/>
+          <a:p>
+            <a:r>
+              <a:rPr lang="en-US" i="1" dirty="0"/>
+              <a:t>…how to run the repository notebooks </a:t>
+            </a:r>
           </a:p>
         </p:txBody>
       </p:sp>
@@ -14321,537 +14065,6 @@
 </file>
 
 <file path=ppt/slides/slide22.xml><?xml version="1.0" encoding="utf-8"?>
-<p:sld xmlns:a="http://schemas.openxmlformats.org/drawingml/2006/main" xmlns:r="http://schemas.openxmlformats.org/officeDocument/2006/relationships" xmlns:p="http://schemas.openxmlformats.org/presentationml/2006/main" show="0">
-  <p:cSld>
-    <p:spTree>
-      <p:nvGrpSpPr>
-        <p:cNvPr id="1" name=""/>
-        <p:cNvGrpSpPr/>
-        <p:nvPr/>
-      </p:nvGrpSpPr>
-      <p:grpSpPr>
-        <a:xfrm>
-          <a:off x="0" y="0"/>
-          <a:ext cx="0" cy="0"/>
-          <a:chOff x="0" y="0"/>
-          <a:chExt cx="0" cy="0"/>
-        </a:xfrm>
-      </p:grpSpPr>
-      <p:sp>
-        <p:nvSpPr>
-          <p:cNvPr id="17" name="Title 16"/>
-          <p:cNvSpPr>
-            <a:spLocks noGrp="1"/>
-          </p:cNvSpPr>
-          <p:nvPr>
-            <p:ph type="title"/>
-          </p:nvPr>
-        </p:nvSpPr>
-        <p:spPr>
-          <a:xfrm>
-            <a:off x="540557" y="337935"/>
-            <a:ext cx="3395910" cy="677108"/>
-          </a:xfrm>
-        </p:spPr>
-        <p:txBody>
-          <a:bodyPr>
-            <a:normAutofit fontScale="90000"/>
-          </a:bodyPr>
-          <a:lstStyle/>
-          <a:p>
-            <a:r>
-              <a:rPr lang="en-US" sz="4400" dirty="0"/>
-              <a:t>ROC Curve:</a:t>
-            </a:r>
-            <a:endParaRPr lang="en-US" i="1" dirty="0"/>
-          </a:p>
-        </p:txBody>
-      </p:sp>
-      <p:pic>
-        <p:nvPicPr>
-          <p:cNvPr id="2" name="Picture 1">
-            <a:extLst>
-              <a:ext uri="{FF2B5EF4-FFF2-40B4-BE49-F238E27FC236}">
-                <a16:creationId xmlns:a16="http://schemas.microsoft.com/office/drawing/2014/main" id="{2FAE9FDC-1A86-406B-B3FD-C028F2102168}"/>
-              </a:ext>
-            </a:extLst>
-          </p:cNvPr>
-          <p:cNvPicPr>
-            <a:picLocks noChangeAspect="1"/>
-          </p:cNvPicPr>
-          <p:nvPr/>
-        </p:nvPicPr>
-        <p:blipFill>
-          <a:blip r:embed="rId3"/>
-          <a:stretch>
-            <a:fillRect/>
-          </a:stretch>
-        </p:blipFill>
-        <p:spPr>
-          <a:xfrm>
-            <a:off x="5001937" y="0"/>
-            <a:ext cx="6858000" cy="6858000"/>
-          </a:xfrm>
-          <a:prstGeom prst="rect">
-            <a:avLst/>
-          </a:prstGeom>
-        </p:spPr>
-      </p:pic>
-      <p:pic>
-        <p:nvPicPr>
-          <p:cNvPr id="4" name="Picture 3">
-            <a:extLst>
-              <a:ext uri="{FF2B5EF4-FFF2-40B4-BE49-F238E27FC236}">
-                <a16:creationId xmlns:a16="http://schemas.microsoft.com/office/drawing/2014/main" id="{9A22576E-6C0B-4CEA-A590-0A1B20BA1EE7}"/>
-              </a:ext>
-            </a:extLst>
-          </p:cNvPr>
-          <p:cNvPicPr>
-            <a:picLocks noChangeAspect="1"/>
-          </p:cNvPicPr>
-          <p:nvPr/>
-        </p:nvPicPr>
-        <p:blipFill>
-          <a:blip r:embed="rId4"/>
-          <a:stretch>
-            <a:fillRect/>
-          </a:stretch>
-        </p:blipFill>
-        <p:spPr>
-          <a:xfrm>
-            <a:off x="8169678" y="3658953"/>
-            <a:ext cx="3200400" cy="2143125"/>
-          </a:xfrm>
-          <a:prstGeom prst="rect">
-            <a:avLst/>
-          </a:prstGeom>
-        </p:spPr>
-      </p:pic>
-      <p:sp>
-        <p:nvSpPr>
-          <p:cNvPr id="3" name="TextBox 2">
-            <a:extLst>
-              <a:ext uri="{FF2B5EF4-FFF2-40B4-BE49-F238E27FC236}">
-                <a16:creationId xmlns:a16="http://schemas.microsoft.com/office/drawing/2014/main" id="{EAAF5BA1-6045-4A5B-B1FF-C0A6B9AF8469}"/>
-              </a:ext>
-            </a:extLst>
-          </p:cNvPr>
-          <p:cNvSpPr txBox="1"/>
-          <p:nvPr/>
-        </p:nvSpPr>
-        <p:spPr>
-          <a:xfrm rot="16200000">
-            <a:off x="4618713" y="3052859"/>
-            <a:ext cx="1256306" cy="369332"/>
-          </a:xfrm>
-          <a:prstGeom prst="rect">
-            <a:avLst/>
-          </a:prstGeom>
-          <a:solidFill>
-            <a:schemeClr val="bg1"/>
-          </a:solidFill>
-        </p:spPr>
-        <p:txBody>
-          <a:bodyPr wrap="square" lIns="0" tIns="0" rIns="0" bIns="0" rtlCol="0">
-            <a:spAutoFit/>
-          </a:bodyPr>
-          <a:lstStyle/>
-          <a:p>
-            <a:pPr algn="ctr"/>
-            <a:r>
-              <a:rPr lang="en-US" sz="2400" b="1" dirty="0">
-                <a:gradFill>
-                  <a:gsLst>
-                    <a:gs pos="2917">
-                      <a:schemeClr val="tx1"/>
-                    </a:gs>
-                    <a:gs pos="30000">
-                      <a:schemeClr val="tx1"/>
-                    </a:gs>
-                  </a:gsLst>
-                  <a:lin ang="5400000" scaled="0"/>
-                </a:gradFill>
-              </a:rPr>
-              <a:t>TPR</a:t>
-            </a:r>
-          </a:p>
-        </p:txBody>
-      </p:sp>
-      <p:sp>
-        <p:nvSpPr>
-          <p:cNvPr id="6" name="TextBox 5">
-            <a:extLst>
-              <a:ext uri="{FF2B5EF4-FFF2-40B4-BE49-F238E27FC236}">
-                <a16:creationId xmlns:a16="http://schemas.microsoft.com/office/drawing/2014/main" id="{BE60F883-87DA-448C-B213-93926057AF8C}"/>
-              </a:ext>
-            </a:extLst>
-          </p:cNvPr>
-          <p:cNvSpPr txBox="1"/>
-          <p:nvPr/>
-        </p:nvSpPr>
-        <p:spPr>
-          <a:xfrm>
-            <a:off x="5803124" y="6211669"/>
-            <a:ext cx="5658394" cy="646331"/>
-          </a:xfrm>
-          <a:prstGeom prst="rect">
-            <a:avLst/>
-          </a:prstGeom>
-          <a:solidFill>
-            <a:schemeClr val="bg1"/>
-          </a:solidFill>
-        </p:spPr>
-        <p:txBody>
-          <a:bodyPr wrap="square" lIns="0" tIns="0" rIns="0" bIns="0" rtlCol="0">
-            <a:spAutoFit/>
-          </a:bodyPr>
-          <a:lstStyle/>
-          <a:p>
-            <a:pPr algn="ctr"/>
-            <a:r>
-              <a:rPr lang="en-US" sz="1800" dirty="0">
-                <a:gradFill>
-                  <a:gsLst>
-                    <a:gs pos="2917">
-                      <a:schemeClr val="tx1"/>
-                    </a:gs>
-                    <a:gs pos="30000">
-                      <a:schemeClr val="tx1"/>
-                    </a:gs>
-                  </a:gsLst>
-                  <a:lin ang="5400000" scaled="0"/>
-                </a:gradFill>
-              </a:rPr>
-              <a:t>0.0            0.2            0.4            0.6            0.8            1.0</a:t>
-            </a:r>
-          </a:p>
-          <a:p>
-            <a:pPr algn="ctr"/>
-            <a:r>
-              <a:rPr lang="en-US" sz="2400" b="1" dirty="0">
-                <a:gradFill>
-                  <a:gsLst>
-                    <a:gs pos="2917">
-                      <a:schemeClr val="tx1"/>
-                    </a:gs>
-                    <a:gs pos="30000">
-                      <a:schemeClr val="tx1"/>
-                    </a:gs>
-                  </a:gsLst>
-                  <a:lin ang="5400000" scaled="0"/>
-                </a:gradFill>
-              </a:rPr>
-              <a:t>FPR</a:t>
-            </a:r>
-          </a:p>
-        </p:txBody>
-      </p:sp>
-      <p:sp>
-        <p:nvSpPr>
-          <p:cNvPr id="5" name="TextBox 4">
-            <a:extLst>
-              <a:ext uri="{FF2B5EF4-FFF2-40B4-BE49-F238E27FC236}">
-                <a16:creationId xmlns:a16="http://schemas.microsoft.com/office/drawing/2014/main" id="{29FF9A4C-2DF9-4F1B-B6CC-D794A3C87590}"/>
-              </a:ext>
-            </a:extLst>
-          </p:cNvPr>
-          <p:cNvSpPr txBox="1"/>
-          <p:nvPr/>
-        </p:nvSpPr>
-        <p:spPr>
-          <a:xfrm>
-            <a:off x="548640" y="1160901"/>
-            <a:ext cx="3495796" cy="5539978"/>
-          </a:xfrm>
-          <a:prstGeom prst="rect">
-            <a:avLst/>
-          </a:prstGeom>
-          <a:noFill/>
-        </p:spPr>
-        <p:txBody>
-          <a:bodyPr wrap="square" lIns="0" tIns="0" rIns="0" bIns="0" rtlCol="0">
-            <a:spAutoFit/>
-          </a:bodyPr>
-          <a:lstStyle/>
-          <a:p>
-            <a:pPr marL="342900" indent="-342900">
-              <a:buFont typeface="Arial" panose="020B0604020202020204" pitchFamily="34" charset="0"/>
-              <a:buChar char="•"/>
-            </a:pPr>
-            <a:r>
-              <a:rPr lang="en-US" sz="2400" dirty="0">
-                <a:gradFill>
-                  <a:gsLst>
-                    <a:gs pos="2917">
-                      <a:schemeClr val="tx1"/>
-                    </a:gs>
-                    <a:gs pos="30000">
-                      <a:schemeClr val="tx1"/>
-                    </a:gs>
-                  </a:gsLst>
-                  <a:lin ang="5400000" scaled="0"/>
-                </a:gradFill>
-              </a:rPr>
-              <a:t>sort test cases by their score from the model</a:t>
-            </a:r>
-          </a:p>
-          <a:p>
-            <a:pPr marL="342900" indent="-342900">
-              <a:buFont typeface="Arial" panose="020B0604020202020204" pitchFamily="34" charset="0"/>
-              <a:buChar char="•"/>
-            </a:pPr>
-            <a:endParaRPr lang="en-US" sz="2400" dirty="0">
-              <a:gradFill>
-                <a:gsLst>
-                  <a:gs pos="2917">
-                    <a:schemeClr val="tx1"/>
-                  </a:gs>
-                  <a:gs pos="30000">
-                    <a:schemeClr val="tx1"/>
-                  </a:gs>
-                </a:gsLst>
-                <a:lin ang="5400000" scaled="0"/>
-              </a:gradFill>
-            </a:endParaRPr>
-          </a:p>
-          <a:p>
-            <a:pPr marL="342900" indent="-342900">
-              <a:buFont typeface="Arial" panose="020B0604020202020204" pitchFamily="34" charset="0"/>
-              <a:buChar char="•"/>
-            </a:pPr>
-            <a:r>
-              <a:rPr lang="en-US" sz="2400" dirty="0">
-                <a:gradFill>
-                  <a:gsLst>
-                    <a:gs pos="2917">
-                      <a:schemeClr val="tx1"/>
-                    </a:gs>
-                    <a:gs pos="30000">
-                      <a:schemeClr val="tx1"/>
-                    </a:gs>
-                  </a:gsLst>
-                  <a:lin ang="5400000" scaled="0"/>
-                </a:gradFill>
-              </a:rPr>
-              <a:t>march along the sequence, stepping up for positives and right for negatives</a:t>
-            </a:r>
-          </a:p>
-          <a:p>
-            <a:endParaRPr lang="en-US" sz="2400" dirty="0">
-              <a:gradFill>
-                <a:gsLst>
-                  <a:gs pos="2917">
-                    <a:schemeClr val="tx1"/>
-                  </a:gs>
-                  <a:gs pos="30000">
-                    <a:schemeClr val="tx1"/>
-                  </a:gs>
-                </a:gsLst>
-                <a:lin ang="5400000" scaled="0"/>
-              </a:gradFill>
-            </a:endParaRPr>
-          </a:p>
-          <a:p>
-            <a:r>
-              <a:rPr lang="en-US" sz="2400" dirty="0">
-                <a:gradFill>
-                  <a:gsLst>
-                    <a:gs pos="2917">
-                      <a:schemeClr val="tx1"/>
-                    </a:gs>
-                    <a:gs pos="30000">
-                      <a:schemeClr val="tx1"/>
-                    </a:gs>
-                  </a:gsLst>
-                  <a:lin ang="5400000" scaled="0"/>
-                </a:gradFill>
-              </a:rPr>
-              <a:t>This is the same as scanning across possible cutoff threshold values.</a:t>
-            </a:r>
-          </a:p>
-          <a:p>
-            <a:endParaRPr lang="en-US" sz="2400" dirty="0">
-              <a:gradFill>
-                <a:gsLst>
-                  <a:gs pos="2917">
-                    <a:schemeClr val="tx1"/>
-                  </a:gs>
-                  <a:gs pos="30000">
-                    <a:schemeClr val="tx1"/>
-                  </a:gs>
-                </a:gsLst>
-                <a:lin ang="5400000" scaled="0"/>
-              </a:gradFill>
-            </a:endParaRPr>
-          </a:p>
-          <a:p>
-            <a:r>
-              <a:rPr lang="en-US" sz="2400" dirty="0">
-                <a:gradFill>
-                  <a:gsLst>
-                    <a:gs pos="2917">
-                      <a:schemeClr val="tx1"/>
-                    </a:gs>
-                    <a:gs pos="30000">
-                      <a:schemeClr val="tx1"/>
-                    </a:gs>
-                  </a:gsLst>
-                  <a:lin ang="5400000" scaled="0"/>
-                </a:gradFill>
-              </a:rPr>
-              <a:t>The slope of the curve shows the concentration of positives</a:t>
-            </a:r>
-            <a:r>
-              <a:rPr lang="en-US" sz="2000" dirty="0">
-                <a:gradFill>
-                  <a:gsLst>
-                    <a:gs pos="2917">
-                      <a:schemeClr val="tx1"/>
-                    </a:gs>
-                    <a:gs pos="30000">
-                      <a:schemeClr val="tx1"/>
-                    </a:gs>
-                  </a:gsLst>
-                  <a:lin ang="5400000" scaled="0"/>
-                </a:gradFill>
-              </a:rPr>
-              <a:t>.</a:t>
-            </a:r>
-          </a:p>
-        </p:txBody>
-      </p:sp>
-    </p:spTree>
-    <p:extLst>
-      <p:ext uri="{BB962C8B-B14F-4D97-AF65-F5344CB8AC3E}">
-        <p14:creationId xmlns:p14="http://schemas.microsoft.com/office/powerpoint/2010/main" val="1611868248"/>
-      </p:ext>
-    </p:extLst>
-  </p:cSld>
-  <p:clrMapOvr>
-    <a:masterClrMapping/>
-  </p:clrMapOvr>
-  <mc:AlternateContent xmlns:mc="http://schemas.openxmlformats.org/markup-compatibility/2006" xmlns:p14="http://schemas.microsoft.com/office/powerpoint/2010/main">
-    <mc:Choice Requires="p14">
-      <p:transition spd="med" p14:dur="700">
-        <p:fade/>
-      </p:transition>
-    </mc:Choice>
-    <mc:Fallback xmlns="">
-      <p:transition spd="med">
-        <p:fade/>
-      </p:transition>
-    </mc:Fallback>
-  </mc:AlternateContent>
-  <p:timing>
-    <p:tnLst>
-      <p:par>
-        <p:cTn id="1" dur="indefinite" restart="never" nodeType="tmRoot">
-          <p:childTnLst>
-            <p:seq concurrent="1" nextAc="seek">
-              <p:cTn id="2" dur="indefinite" nodeType="mainSeq">
-                <p:childTnLst>
-                  <p:par>
-                    <p:cTn id="3" fill="hold">
-                      <p:stCondLst>
-                        <p:cond delay="indefinite"/>
-                      </p:stCondLst>
-                      <p:childTnLst>
-                        <p:par>
-                          <p:cTn id="4" fill="hold">
-                            <p:stCondLst>
-                              <p:cond delay="0"/>
-                            </p:stCondLst>
-                            <p:childTnLst>
-                              <p:par>
-                                <p:cTn id="5" presetID="1" presetClass="entr" presetSubtype="0" fill="hold" grpId="0" nodeType="clickEffect">
-                                  <p:stCondLst>
-                                    <p:cond delay="0"/>
-                                  </p:stCondLst>
-                                  <p:childTnLst>
-                                    <p:set>
-                                      <p:cBhvr>
-                                        <p:cTn id="6" dur="1" fill="hold">
-                                          <p:stCondLst>
-                                            <p:cond delay="0"/>
-                                          </p:stCondLst>
-                                        </p:cTn>
-                                        <p:tgtEl>
-                                          <p:spTgt spid="6"/>
-                                        </p:tgtEl>
-                                        <p:attrNameLst>
-                                          <p:attrName>style.visibility</p:attrName>
-                                        </p:attrNameLst>
-                                      </p:cBhvr>
-                                      <p:to>
-                                        <p:strVal val="visible"/>
-                                      </p:to>
-                                    </p:set>
-                                  </p:childTnLst>
-                                </p:cTn>
-                              </p:par>
-                              <p:par>
-                                <p:cTn id="7" presetID="1" presetClass="entr" presetSubtype="0" fill="hold" grpId="0" nodeType="withEffect">
-                                  <p:stCondLst>
-                                    <p:cond delay="0"/>
-                                  </p:stCondLst>
-                                  <p:childTnLst>
-                                    <p:set>
-                                      <p:cBhvr>
-                                        <p:cTn id="8" dur="1" fill="hold">
-                                          <p:stCondLst>
-                                            <p:cond delay="0"/>
-                                          </p:stCondLst>
-                                        </p:cTn>
-                                        <p:tgtEl>
-                                          <p:spTgt spid="3"/>
-                                        </p:tgtEl>
-                                        <p:attrNameLst>
-                                          <p:attrName>style.visibility</p:attrName>
-                                        </p:attrNameLst>
-                                      </p:cBhvr>
-                                      <p:to>
-                                        <p:strVal val="visible"/>
-                                      </p:to>
-                                    </p:set>
-                                  </p:childTnLst>
-                                </p:cTn>
-                              </p:par>
-                            </p:childTnLst>
-                          </p:cTn>
-                        </p:par>
-                      </p:childTnLst>
-                    </p:cTn>
-                  </p:par>
-                </p:childTnLst>
-              </p:cTn>
-              <p:prevCondLst>
-                <p:cond evt="onPrev" delay="0">
-                  <p:tgtEl>
-                    <p:sldTgt/>
-                  </p:tgtEl>
-                </p:cond>
-              </p:prevCondLst>
-              <p:nextCondLst>
-                <p:cond evt="onNext" delay="0">
-                  <p:tgtEl>
-                    <p:sldTgt/>
-                  </p:tgtEl>
-                </p:cond>
-              </p:nextCondLst>
-            </p:seq>
-          </p:childTnLst>
-        </p:cTn>
-      </p:par>
-    </p:tnLst>
-    <p:bldLst>
-      <p:bldP spid="3" grpId="0" animBg="1"/>
-      <p:bldP spid="6" grpId="0" animBg="1"/>
-    </p:bldLst>
-  </p:timing>
-</p:sld>
-</file>
-
-<file path=ppt/slides/slide23.xml><?xml version="1.0" encoding="utf-8"?>
 <p:sld xmlns:a="http://schemas.openxmlformats.org/drawingml/2006/main" xmlns:r="http://schemas.openxmlformats.org/officeDocument/2006/relationships" xmlns:p="http://schemas.openxmlformats.org/presentationml/2006/main">
   <p:cSld>
     <p:spTree>
@@ -15031,43 +14244,86 @@
           <a:lstStyle/>
           <a:p>
             <a:r>
-              <a:rPr lang="en-US" dirty="0"/>
+              <a:rPr lang="en-US" dirty="0">
+                <a:solidFill>
+                  <a:srgbClr val="00B0F0"/>
+                </a:solidFill>
+              </a:rPr>
               <a:t>RL expands on statistical machine learning to include outcome values, in sequential models with feedback.  </a:t>
             </a:r>
           </a:p>
           <a:p>
-            <a:endParaRPr lang="en-US" dirty="0"/>
-          </a:p>
-          <a:p>
-            <a:r>
-              <a:rPr lang="en-US" dirty="0"/>
+            <a:endParaRPr lang="en-US" dirty="0">
+              <a:solidFill>
+                <a:srgbClr val="00B0F0"/>
+              </a:solidFill>
+            </a:endParaRPr>
+          </a:p>
+          <a:p>
+            <a:r>
+              <a:rPr lang="en-US" dirty="0">
+                <a:solidFill>
+                  <a:srgbClr val="00B0F0"/>
+                </a:solidFill>
+              </a:rPr>
+              <a:t>“Episodic” learning by “trail &amp; evaluation”</a:t>
+            </a:r>
+          </a:p>
+          <a:p>
+            <a:endParaRPr lang="en-US" dirty="0">
+              <a:solidFill>
+                <a:srgbClr val="00B0F0"/>
+              </a:solidFill>
+            </a:endParaRPr>
+          </a:p>
+          <a:p>
+            <a:r>
+              <a:rPr lang="en-US" dirty="0">
+                <a:solidFill>
+                  <a:srgbClr val="00B0F0"/>
+                </a:solidFill>
+              </a:rPr>
               <a:t>Think of learning a </a:t>
             </a:r>
             <a:r>
-              <a:rPr lang="en-US" i="1" dirty="0"/>
+              <a:rPr lang="en-US" i="1" dirty="0">
+                <a:solidFill>
+                  <a:srgbClr val="00B0F0"/>
+                </a:solidFill>
+              </a:rPr>
               <a:t>control </a:t>
             </a:r>
             <a:r>
-              <a:rPr lang="en-US" dirty="0"/>
+              <a:rPr lang="en-US" dirty="0">
+                <a:solidFill>
+                  <a:srgbClr val="00B0F0"/>
+                </a:solidFill>
+              </a:rPr>
               <a:t>or </a:t>
             </a:r>
             <a:r>
-              <a:rPr lang="en-US" i="1" dirty="0"/>
+              <a:rPr lang="en-US" i="1" dirty="0">
+                <a:solidFill>
+                  <a:srgbClr val="00B0F0"/>
+                </a:solidFill>
+              </a:rPr>
               <a:t>policy</a:t>
             </a:r>
             <a:r>
-              <a:rPr lang="en-US" dirty="0"/>
+              <a:rPr lang="en-US" dirty="0">
+                <a:solidFill>
+                  <a:srgbClr val="00B0F0"/>
+                </a:solidFill>
+              </a:rPr>
               <a:t> function.</a:t>
             </a:r>
           </a:p>
           <a:p>
-            <a:endParaRPr lang="en-US" dirty="0"/>
-          </a:p>
-          <a:p>
-            <a:r>
-              <a:rPr lang="en-US" dirty="0"/>
-              <a:t>“Episodic” learning by “trail &amp; evaluation”</a:t>
-            </a:r>
+            <a:endParaRPr lang="en-US" dirty="0">
+              <a:solidFill>
+                <a:srgbClr val="00B0F0"/>
+              </a:solidFill>
+            </a:endParaRPr>
           </a:p>
         </p:txBody>
       </p:sp>
@@ -19088,7 +18344,7 @@
         </p:nvGrpSpPr>
         <p:grpSpPr>
           <a:xfrm>
-            <a:off x="1212010" y="1563090"/>
+            <a:off x="1212010" y="1580675"/>
             <a:ext cx="3526971" cy="3904014"/>
             <a:chOff x="7667732" y="1638795"/>
             <a:chExt cx="3526971" cy="3904014"/>
@@ -19617,7 +18873,7 @@
         </p:nvCxnSpPr>
         <p:spPr>
           <a:xfrm>
-            <a:off x="3193209" y="5134595"/>
+            <a:off x="3193209" y="5152180"/>
             <a:ext cx="1469566" cy="46115"/>
           </a:xfrm>
           <a:prstGeom prst="straightConnector1">
@@ -19836,8 +19092,8 @@
         </p:nvSpPr>
         <p:spPr>
           <a:xfrm>
-            <a:off x="930960" y="609600"/>
-            <a:ext cx="11151451" cy="523220"/>
+            <a:off x="930961" y="199283"/>
+            <a:ext cx="10651440" cy="954107"/>
           </a:xfrm>
           <a:prstGeom prst="rect">
             <a:avLst/>
@@ -19845,7 +19101,7 @@
           <a:noFill/>
         </p:spPr>
         <p:txBody>
-          <a:bodyPr wrap="none" rtlCol="0">
+          <a:bodyPr wrap="square" rtlCol="0">
             <a:spAutoFit/>
           </a:bodyPr>
           <a:lstStyle/>
@@ -19882,8 +19138,107 @@
                 <a:ea typeface="+mn-ea"/>
                 <a:cs typeface="+mn-cs"/>
               </a:rPr>
-              <a:t>A Markov Decision Process (MDP) view of a Reinforcement Learning model</a:t>
-            </a:r>
+              <a:t>A Markov Decision Process (MDP) view of a Reinforcement Learning model consists of </a:t>
+            </a:r>
+            <a:r>
+              <a:rPr kumimoji="0" lang="en-US" sz="2800" b="0" i="1" u="none" strike="noStrike" kern="1200" cap="none" spc="0" normalizeH="0" baseline="0" noProof="0" dirty="0">
+                <a:ln>
+                  <a:noFill/>
+                </a:ln>
+                <a:solidFill>
+                  <a:prstClr val="black"/>
+                </a:solidFill>
+                <a:effectLst/>
+                <a:uLnTx/>
+                <a:uFillTx/>
+                <a:latin typeface="Gill Sans MT" panose="020B0502020104020203"/>
+                <a:ea typeface="+mn-ea"/>
+                <a:cs typeface="+mn-cs"/>
+              </a:rPr>
+              <a:t>state, </a:t>
+            </a:r>
+            <a:r>
+              <a:rPr kumimoji="0" lang="en-US" sz="2800" b="0" u="none" strike="noStrike" kern="1200" cap="none" spc="0" normalizeH="0" baseline="0" noProof="0" dirty="0">
+                <a:ln>
+                  <a:noFill/>
+                </a:ln>
+                <a:solidFill>
+                  <a:prstClr val="black"/>
+                </a:solidFill>
+                <a:effectLst/>
+                <a:uLnTx/>
+                <a:uFillTx/>
+                <a:latin typeface="Gill Sans MT" panose="020B0502020104020203"/>
+                <a:ea typeface="+mn-ea"/>
+                <a:cs typeface="+mn-cs"/>
+              </a:rPr>
+              <a:t> </a:t>
+            </a:r>
+            <a:r>
+              <a:rPr kumimoji="0" lang="en-US" sz="2800" b="0" i="1" u="none" strike="noStrike" kern="1200" cap="none" spc="0" normalizeH="0" baseline="0" noProof="0" dirty="0">
+                <a:ln>
+                  <a:noFill/>
+                </a:ln>
+                <a:solidFill>
+                  <a:prstClr val="black"/>
+                </a:solidFill>
+                <a:effectLst/>
+                <a:uLnTx/>
+                <a:uFillTx/>
+                <a:latin typeface="Gill Sans MT" panose="020B0502020104020203"/>
+                <a:ea typeface="+mn-ea"/>
+                <a:cs typeface="+mn-cs"/>
+              </a:rPr>
+              <a:t>actions, </a:t>
+            </a:r>
+            <a:r>
+              <a:rPr kumimoji="0" lang="en-US" sz="2800" b="0" u="none" strike="noStrike" kern="1200" cap="none" spc="0" normalizeH="0" baseline="0" noProof="0" dirty="0">
+                <a:ln>
+                  <a:noFill/>
+                </a:ln>
+                <a:solidFill>
+                  <a:prstClr val="black"/>
+                </a:solidFill>
+                <a:effectLst/>
+                <a:uLnTx/>
+                <a:uFillTx/>
+                <a:latin typeface="Gill Sans MT" panose="020B0502020104020203"/>
+                <a:ea typeface="+mn-ea"/>
+                <a:cs typeface="+mn-cs"/>
+              </a:rPr>
+              <a:t> and </a:t>
+            </a:r>
+            <a:r>
+              <a:rPr kumimoji="0" lang="en-US" sz="2800" b="0" i="1" u="none" strike="noStrike" kern="1200" cap="none" spc="0" normalizeH="0" baseline="0" noProof="0" dirty="0">
+                <a:ln>
+                  <a:noFill/>
+                </a:ln>
+                <a:solidFill>
+                  <a:prstClr val="black"/>
+                </a:solidFill>
+                <a:effectLst/>
+                <a:uLnTx/>
+                <a:uFillTx/>
+                <a:latin typeface="Gill Sans MT" panose="020B0502020104020203"/>
+                <a:ea typeface="+mn-ea"/>
+                <a:cs typeface="+mn-cs"/>
+              </a:rPr>
+              <a:t>rewards (values).</a:t>
+            </a:r>
+            <a:endParaRPr kumimoji="0" lang="en-US" sz="2800" b="0" i="0" u="none" strike="noStrike" kern="1200" cap="none" spc="0" normalizeH="0" baseline="0" noProof="0" dirty="0">
+              <a:ln>
+                <a:noFill/>
+              </a:ln>
+              <a:solidFill>
+                <a:prstClr val="black"/>
+              </a:solidFill>
+              <a:effectLst/>
+              <a:uLnTx/>
+              <a:uFillTx/>
+              <a:latin typeface="Gill Sans MT" panose="020B0502020104020203"/>
+              <a:ea typeface="+mn-ea"/>
+              <a:cs typeface="+mn-cs"/>
+            </a:endParaRPr>
           </a:p>
         </p:txBody>
       </p:sp>
@@ -20121,7 +19476,7 @@
         </p:nvCxnSpPr>
         <p:spPr>
           <a:xfrm>
-            <a:off x="2813930" y="4349040"/>
+            <a:off x="2813930" y="4366625"/>
             <a:ext cx="46770" cy="453045"/>
           </a:xfrm>
           <a:prstGeom prst="straightConnector1">

</xml_diff>